<commit_message>
Updating template ppt and adding logos to title slide.
</commit_message>
<xml_diff>
--- a/output/cpra_postproc/LSU_template.pptx
+++ b/output/cpra_postproc/LSU_template.pptx
@@ -211,7 +211,7 @@
           <a:p>
             <a:fld id="{D844CF58-73D2-4666-AB65-9E20151AB2CE}" type="datetimeFigureOut">
               <a:rPr lang="en-US" smtClean="0"/>
-              <a:t>5/18/2018</a:t>
+              <a:t>5/21/2018</a:t>
             </a:fld>
             <a:endParaRPr lang="en-US"/>
           </a:p>
@@ -376,7 +376,7 @@
           <a:p>
             <a:fld id="{A5C4824E-61BC-4FE8-B452-5DAE82D7E36E}" type="datetimeFigureOut">
               <a:rPr lang="en-US" smtClean="0"/>
-              <a:t>5/18/2018</a:t>
+              <a:t>5/21/2018</a:t>
             </a:fld>
             <a:endParaRPr lang="en-US"/>
           </a:p>
@@ -684,7 +684,7 @@
         <p:spPr>
           <a:xfrm>
             <a:off x="1304301" y="2203984"/>
-            <a:ext cx="9144000" cy="1512880"/>
+            <a:ext cx="9144000" cy="1123416"/>
           </a:xfrm>
         </p:spPr>
         <p:txBody>
@@ -813,289 +813,402 @@
           </a:p>
         </p:txBody>
       </p:sp>
-      <p:sp>
-        <p:nvSpPr>
-          <p:cNvPr id="6" name="TextBox 5"/>
-          <p:cNvSpPr txBox="1"/>
+      <p:grpSp>
+        <p:nvGrpSpPr>
+          <p:cNvPr id="4" name="Group 3"/>
+          <p:cNvGrpSpPr/>
           <p:nvPr userDrawn="1"/>
-        </p:nvSpPr>
-        <p:spPr>
-          <a:xfrm>
-            <a:off x="10007958" y="5827293"/>
-            <a:ext cx="2204444" cy="369332"/>
-          </a:xfrm>
-          <a:prstGeom prst="rect">
-            <a:avLst/>
-          </a:prstGeom>
-          <a:noFill/>
-        </p:spPr>
-        <p:txBody>
-          <a:bodyPr wrap="square" rtlCol="0">
-            <a:spAutoFit/>
-          </a:bodyPr>
-          <a:lstStyle/>
-          <a:p>
-            <a:r>
-              <a:rPr lang="en-US" dirty="0" err="1" smtClean="0">
+        </p:nvGrpSpPr>
+        <p:grpSpPr>
+          <a:xfrm>
+            <a:off x="970710" y="3632197"/>
+            <a:ext cx="10250581" cy="2664009"/>
+            <a:chOff x="1475751" y="3632197"/>
+            <a:chExt cx="10250581" cy="2664009"/>
+          </a:xfrm>
+        </p:grpSpPr>
+        <p:sp>
+          <p:nvSpPr>
+            <p:cNvPr id="6" name="TextBox 5"/>
+            <p:cNvSpPr txBox="1"/>
+            <p:nvPr userDrawn="1"/>
+          </p:nvSpPr>
+          <p:spPr>
+            <a:xfrm>
+              <a:off x="9021371" y="3931817"/>
+              <a:ext cx="2204444" cy="430887"/>
+            </a:xfrm>
+            <a:prstGeom prst="rect">
+              <a:avLst/>
+            </a:prstGeom>
+            <a:noFill/>
+          </p:spPr>
+          <p:txBody>
+            <a:bodyPr wrap="square" rtlCol="0">
+              <a:spAutoFit/>
+            </a:bodyPr>
+            <a:lstStyle/>
+            <a:p>
+              <a:r>
+                <a:rPr lang="en-US" sz="2200" dirty="0" err="1" smtClean="0">
+                  <a:solidFill>
+                    <a:schemeClr val="tx1"/>
+                  </a:solidFill>
+                  <a:latin typeface="Franklin Gothic Medium" panose="020B0603020102020204" pitchFamily="34" charset="0"/>
+                </a:rPr>
+                <a:t>Scimaritan</a:t>
+              </a:r>
+              <a:r>
+                <a:rPr lang="en-US" sz="2200" dirty="0" smtClean="0">
+                  <a:solidFill>
+                    <a:schemeClr val="tx1"/>
+                  </a:solidFill>
+                  <a:latin typeface="Franklin Gothic Medium" panose="020B0603020102020204" pitchFamily="34" charset="0"/>
+                </a:rPr>
+                <a:t>, L3C</a:t>
+              </a:r>
+              <a:endParaRPr lang="en-US" sz="2200" dirty="0">
                 <a:solidFill>
                   <a:schemeClr val="tx1"/>
                 </a:solidFill>
-                <a:latin typeface="Franklin Gothic Book" panose="020B0503020102020204" pitchFamily="34" charset="0"/>
-              </a:rPr>
-              <a:t>Scimaritan</a:t>
-            </a:r>
-            <a:r>
-              <a:rPr lang="en-US" dirty="0" smtClean="0">
-                <a:solidFill>
-                  <a:schemeClr val="tx1"/>
-                </a:solidFill>
-                <a:latin typeface="Franklin Gothic Book" panose="020B0503020102020204" pitchFamily="34" charset="0"/>
-              </a:rPr>
-              <a:t>, L3C</a:t>
-            </a:r>
-            <a:endParaRPr lang="en-US" dirty="0">
-              <a:solidFill>
-                <a:schemeClr val="tx1"/>
-              </a:solidFill>
-              <a:latin typeface="Franklin Gothic Book" panose="020B0503020102020204" pitchFamily="34" charset="0"/>
-            </a:endParaRPr>
-          </a:p>
-        </p:txBody>
-      </p:sp>
-      <p:pic>
-        <p:nvPicPr>
-          <p:cNvPr id="9" name="Picture 4" descr="Image result for cpra logo"/>
-          <p:cNvPicPr>
-            <a:picLocks noChangeAspect="1" noChangeArrowheads="1"/>
-          </p:cNvPicPr>
-          <p:nvPr userDrawn="1"/>
-        </p:nvPicPr>
-        <p:blipFill>
-          <a:blip r:embed="rId2">
-            <a:clrChange>
-              <a:clrFrom>
-                <a:srgbClr val="FFFFFF"/>
-              </a:clrFrom>
-              <a:clrTo>
-                <a:srgbClr val="FFFFFF">
-                  <a:alpha val="0"/>
-                </a:srgbClr>
-              </a:clrTo>
-            </a:clrChange>
+                <a:latin typeface="Franklin Gothic Medium" panose="020B0603020102020204" pitchFamily="34" charset="0"/>
+              </a:endParaRPr>
+            </a:p>
+          </p:txBody>
+        </p:sp>
+        <p:pic>
+          <p:nvPicPr>
+            <p:cNvPr id="9" name="Picture 4" descr="Image result for cpra logo"/>
+            <p:cNvPicPr>
+              <a:picLocks noChangeAspect="1" noChangeArrowheads="1"/>
+            </p:cNvPicPr>
+            <p:nvPr userDrawn="1"/>
+          </p:nvPicPr>
+          <p:blipFill>
+            <a:blip r:embed="rId2">
+              <a:clrChange>
+                <a:clrFrom>
+                  <a:srgbClr val="FFFFFF"/>
+                </a:clrFrom>
+                <a:clrTo>
+                  <a:srgbClr val="FFFFFF">
+                    <a:alpha val="0"/>
+                  </a:srgbClr>
+                </a:clrTo>
+              </a:clrChange>
+              <a:extLst>
+                <a:ext uri="{28A0092B-C50C-407E-A947-70E740481C1C}">
+                  <a14:useLocalDpi xmlns:a14="http://schemas.microsoft.com/office/drawing/2010/main" val="0"/>
+                </a:ext>
+              </a:extLst>
+            </a:blip>
+            <a:srcRect/>
+            <a:stretch>
+              <a:fillRect/>
+            </a:stretch>
+          </p:blipFill>
+          <p:spPr bwMode="auto">
+            <a:xfrm>
+              <a:off x="1547158" y="3632197"/>
+              <a:ext cx="1410398" cy="1327434"/>
+            </a:xfrm>
+            <a:prstGeom prst="rect">
+              <a:avLst/>
+            </a:prstGeom>
+            <a:noFill/>
             <a:extLst>
-              <a:ext uri="{28A0092B-C50C-407E-A947-70E740481C1C}">
-                <a14:useLocalDpi xmlns:a14="http://schemas.microsoft.com/office/drawing/2010/main" val="0"/>
+              <a:ext uri="{909E8E84-426E-40DD-AFC4-6F175D3DCCD1}">
+                <a14:hiddenFill xmlns:a14="http://schemas.microsoft.com/office/drawing/2010/main">
+                  <a:solidFill>
+                    <a:srgbClr val="FFFFFF"/>
+                  </a:solidFill>
+                </a14:hiddenFill>
               </a:ext>
             </a:extLst>
-          </a:blip>
-          <a:srcRect/>
-          <a:stretch>
-            <a:fillRect/>
-          </a:stretch>
-        </p:blipFill>
-        <p:spPr bwMode="auto">
-          <a:xfrm>
-            <a:off x="158620" y="5028652"/>
-            <a:ext cx="1240971" cy="1167973"/>
-          </a:xfrm>
-          <a:prstGeom prst="rect">
-            <a:avLst/>
-          </a:prstGeom>
-          <a:noFill/>
-          <a:extLst>
-            <a:ext uri="{909E8E84-426E-40DD-AFC4-6F175D3DCCD1}">
-              <a14:hiddenFill xmlns:a14="http://schemas.microsoft.com/office/drawing/2010/main">
-                <a:solidFill>
+          </p:spPr>
+        </p:pic>
+        <p:pic>
+          <p:nvPicPr>
+            <p:cNvPr id="2" name="Picture 1"/>
+            <p:cNvPicPr>
+              <a:picLocks noChangeAspect="1"/>
+            </p:cNvPicPr>
+            <p:nvPr userDrawn="1"/>
+          </p:nvPicPr>
+          <p:blipFill>
+            <a:blip r:embed="rId3">
+              <a:clrChange>
+                <a:clrFrom>
                   <a:srgbClr val="FFFFFF"/>
-                </a:solidFill>
-              </a14:hiddenFill>
-            </a:ext>
-          </a:extLst>
-        </p:spPr>
-      </p:pic>
-      <p:pic>
-        <p:nvPicPr>
-          <p:cNvPr id="2" name="Picture 1"/>
-          <p:cNvPicPr>
-            <a:picLocks noChangeAspect="1"/>
-          </p:cNvPicPr>
-          <p:nvPr userDrawn="1"/>
-        </p:nvPicPr>
-        <p:blipFill>
-          <a:blip r:embed="rId3">
-            <a:clrChange>
-              <a:clrFrom>
-                <a:srgbClr val="FFFFFF"/>
-              </a:clrFrom>
-              <a:clrTo>
-                <a:srgbClr val="FFFFFF">
-                  <a:alpha val="0"/>
-                </a:srgbClr>
-              </a:clrTo>
-            </a:clrChange>
+                </a:clrFrom>
+                <a:clrTo>
+                  <a:srgbClr val="FFFFFF">
+                    <a:alpha val="0"/>
+                  </a:srgbClr>
+                </a:clrTo>
+              </a:clrChange>
+              <a:extLst>
+                <a:ext uri="{28A0092B-C50C-407E-A947-70E740481C1C}">
+                  <a14:useLocalDpi xmlns:a14="http://schemas.microsoft.com/office/drawing/2010/main" val="0"/>
+                </a:ext>
+              </a:extLst>
+            </a:blip>
+            <a:stretch>
+              <a:fillRect/>
+            </a:stretch>
+          </p:blipFill>
+          <p:spPr>
+            <a:xfrm>
+              <a:off x="3141892" y="3771813"/>
+              <a:ext cx="2640308" cy="1048202"/>
+            </a:xfrm>
+            <a:prstGeom prst="rect">
+              <a:avLst/>
+            </a:prstGeom>
+          </p:spPr>
+        </p:pic>
+        <p:pic>
+          <p:nvPicPr>
+            <p:cNvPr id="2050" name="Picture 2" descr="Image result for unc chapel hill logo"/>
+            <p:cNvPicPr>
+              <a:picLocks noChangeAspect="1" noChangeArrowheads="1"/>
+            </p:cNvPicPr>
+            <p:nvPr userDrawn="1"/>
+          </p:nvPicPr>
+          <p:blipFill>
+            <a:blip r:embed="rId4">
+              <a:extLst>
+                <a:ext uri="{28A0092B-C50C-407E-A947-70E740481C1C}">
+                  <a14:useLocalDpi xmlns:a14="http://schemas.microsoft.com/office/drawing/2010/main" val="0"/>
+                </a:ext>
+              </a:extLst>
+            </a:blip>
+            <a:srcRect/>
+            <a:stretch>
+              <a:fillRect/>
+            </a:stretch>
+          </p:blipFill>
+          <p:spPr bwMode="auto">
+            <a:xfrm>
+              <a:off x="8520855" y="5123858"/>
+              <a:ext cx="3205477" cy="882947"/>
+            </a:xfrm>
+            <a:prstGeom prst="rect">
+              <a:avLst/>
+            </a:prstGeom>
+            <a:noFill/>
             <a:extLst>
-              <a:ext uri="{28A0092B-C50C-407E-A947-70E740481C1C}">
-                <a14:useLocalDpi xmlns:a14="http://schemas.microsoft.com/office/drawing/2010/main" val="0"/>
+              <a:ext uri="{909E8E84-426E-40DD-AFC4-6F175D3DCCD1}">
+                <a14:hiddenFill xmlns:a14="http://schemas.microsoft.com/office/drawing/2010/main">
+                  <a:solidFill>
+                    <a:srgbClr val="FFFFFF"/>
+                  </a:solidFill>
+                </a14:hiddenFill>
               </a:ext>
             </a:extLst>
-          </a:blip>
-          <a:stretch>
-            <a:fillRect/>
-          </a:stretch>
-        </p:blipFill>
-        <p:spPr>
-          <a:xfrm>
-            <a:off x="1448558" y="5158782"/>
-            <a:ext cx="2640308" cy="1048202"/>
-          </a:xfrm>
-          <a:prstGeom prst="rect">
-            <a:avLst/>
-          </a:prstGeom>
-        </p:spPr>
-      </p:pic>
-      <p:pic>
-        <p:nvPicPr>
-          <p:cNvPr id="2050" name="Picture 2" descr="Image result for unc chapel hill logo"/>
-          <p:cNvPicPr>
-            <a:picLocks noChangeAspect="1" noChangeArrowheads="1"/>
-          </p:cNvPicPr>
-          <p:nvPr userDrawn="1"/>
-        </p:nvPicPr>
-        <p:blipFill>
-          <a:blip r:embed="rId4">
+          </p:spPr>
+        </p:pic>
+        <p:pic>
+          <p:nvPicPr>
+            <p:cNvPr id="2052" name="Picture 4" descr="Image result for lsu cct logo"/>
+            <p:cNvPicPr>
+              <a:picLocks noChangeAspect="1" noChangeArrowheads="1"/>
+            </p:cNvPicPr>
+            <p:nvPr userDrawn="1"/>
+          </p:nvPicPr>
+          <p:blipFill>
+            <a:blip r:embed="rId5">
+              <a:clrChange>
+                <a:clrFrom>
+                  <a:srgbClr val="FFFFFF"/>
+                </a:clrFrom>
+                <a:clrTo>
+                  <a:srgbClr val="FFFFFF">
+                    <a:alpha val="0"/>
+                  </a:srgbClr>
+                </a:clrTo>
+              </a:clrChange>
+              <a:extLst>
+                <a:ext uri="{28A0092B-C50C-407E-A947-70E740481C1C}">
+                  <a14:useLocalDpi xmlns:a14="http://schemas.microsoft.com/office/drawing/2010/main" val="0"/>
+                </a:ext>
+              </a:extLst>
+            </a:blip>
+            <a:srcRect/>
+            <a:stretch>
+              <a:fillRect/>
+            </a:stretch>
+          </p:blipFill>
+          <p:spPr bwMode="auto">
+            <a:xfrm>
+              <a:off x="3221074" y="5214381"/>
+              <a:ext cx="2481944" cy="1023537"/>
+            </a:xfrm>
+            <a:prstGeom prst="rect">
+              <a:avLst/>
+            </a:prstGeom>
+            <a:noFill/>
             <a:extLst>
-              <a:ext uri="{28A0092B-C50C-407E-A947-70E740481C1C}">
-                <a14:useLocalDpi xmlns:a14="http://schemas.microsoft.com/office/drawing/2010/main" val="0"/>
+              <a:ext uri="{909E8E84-426E-40DD-AFC4-6F175D3DCCD1}">
+                <a14:hiddenFill xmlns:a14="http://schemas.microsoft.com/office/drawing/2010/main">
+                  <a:solidFill>
+                    <a:srgbClr val="FFFFFF"/>
+                  </a:solidFill>
+                </a14:hiddenFill>
               </a:ext>
             </a:extLst>
-          </a:blip>
-          <a:srcRect/>
-          <a:stretch>
-            <a:fillRect/>
-          </a:stretch>
-        </p:blipFill>
-        <p:spPr bwMode="auto">
-          <a:xfrm>
-            <a:off x="6619777" y="5300082"/>
-            <a:ext cx="2584420" cy="711877"/>
-          </a:xfrm>
-          <a:prstGeom prst="rect">
-            <a:avLst/>
-          </a:prstGeom>
-          <a:noFill/>
-          <a:extLst>
-            <a:ext uri="{909E8E84-426E-40DD-AFC4-6F175D3DCCD1}">
-              <a14:hiddenFill xmlns:a14="http://schemas.microsoft.com/office/drawing/2010/main">
-                <a:solidFill>
+          </p:spPr>
+        </p:pic>
+        <p:pic>
+          <p:nvPicPr>
+            <p:cNvPr id="2058" name="Picture 10" descr="http://www.laseagrant.org/wp-content/uploads/LSG-logo-blue.jpeg"/>
+            <p:cNvPicPr>
+              <a:picLocks noChangeAspect="1" noChangeArrowheads="1"/>
+            </p:cNvPicPr>
+            <p:nvPr userDrawn="1"/>
+          </p:nvPicPr>
+          <p:blipFill>
+            <a:blip r:embed="rId6">
+              <a:clrChange>
+                <a:clrFrom>
                   <a:srgbClr val="FFFFFF"/>
-                </a:solidFill>
-              </a14:hiddenFill>
-            </a:ext>
-          </a:extLst>
-        </p:spPr>
-      </p:pic>
-      <p:pic>
-        <p:nvPicPr>
-          <p:cNvPr id="2052" name="Picture 4" descr="Image result for lsu cct logo"/>
-          <p:cNvPicPr>
-            <a:picLocks noChangeAspect="1" noChangeArrowheads="1"/>
-          </p:cNvPicPr>
-          <p:nvPr userDrawn="1"/>
-        </p:nvPicPr>
-        <p:blipFill>
-          <a:blip r:embed="rId5">
-            <a:clrChange>
-              <a:clrFrom>
-                <a:srgbClr val="FFFFFF"/>
-              </a:clrFrom>
-              <a:clrTo>
-                <a:srgbClr val="FFFFFF">
-                  <a:alpha val="0"/>
-                </a:srgbClr>
-              </a:clrTo>
-            </a:clrChange>
+                </a:clrFrom>
+                <a:clrTo>
+                  <a:srgbClr val="FFFFFF">
+                    <a:alpha val="0"/>
+                  </a:srgbClr>
+                </a:clrTo>
+              </a:clrChange>
+              <a:extLst>
+                <a:ext uri="{28A0092B-C50C-407E-A947-70E740481C1C}">
+                  <a14:useLocalDpi xmlns:a14="http://schemas.microsoft.com/office/drawing/2010/main" val="0"/>
+                </a:ext>
+              </a:extLst>
+            </a:blip>
+            <a:srcRect/>
+            <a:stretch>
+              <a:fillRect/>
+            </a:stretch>
+          </p:blipFill>
+          <p:spPr bwMode="auto">
+            <a:xfrm>
+              <a:off x="1475751" y="5156092"/>
+              <a:ext cx="1553213" cy="1140114"/>
+            </a:xfrm>
+            <a:prstGeom prst="rect">
+              <a:avLst/>
+            </a:prstGeom>
+            <a:noFill/>
             <a:extLst>
-              <a:ext uri="{28A0092B-C50C-407E-A947-70E740481C1C}">
-                <a14:useLocalDpi xmlns:a14="http://schemas.microsoft.com/office/drawing/2010/main" val="0"/>
+              <a:ext uri="{909E8E84-426E-40DD-AFC4-6F175D3DCCD1}">
+                <a14:hiddenFill xmlns:a14="http://schemas.microsoft.com/office/drawing/2010/main">
+                  <a:solidFill>
+                    <a:srgbClr val="FFFFFF"/>
+                  </a:solidFill>
+                </a14:hiddenFill>
               </a:ext>
             </a:extLst>
-          </a:blip>
-          <a:srcRect/>
-          <a:stretch>
-            <a:fillRect/>
-          </a:stretch>
-        </p:blipFill>
-        <p:spPr bwMode="auto">
-          <a:xfrm>
-            <a:off x="4137833" y="5173088"/>
-            <a:ext cx="2481944" cy="1023537"/>
-          </a:xfrm>
-          <a:prstGeom prst="rect">
-            <a:avLst/>
-          </a:prstGeom>
-          <a:noFill/>
-          <a:extLst>
-            <a:ext uri="{909E8E84-426E-40DD-AFC4-6F175D3DCCD1}">
-              <a14:hiddenFill xmlns:a14="http://schemas.microsoft.com/office/drawing/2010/main">
-                <a:solidFill>
+          </p:spPr>
+        </p:pic>
+        <p:pic>
+          <p:nvPicPr>
+            <p:cNvPr id="1026" name="Picture 2" descr="Image result for lsu hpc"/>
+            <p:cNvPicPr>
+              <a:picLocks noChangeAspect="1" noChangeArrowheads="1"/>
+            </p:cNvPicPr>
+            <p:nvPr userDrawn="1"/>
+          </p:nvPicPr>
+          <p:blipFill rotWithShape="1">
+            <a:blip r:embed="rId7">
+              <a:clrChange>
+                <a:clrFrom>
                   <a:srgbClr val="FFFFFF"/>
-                </a:solidFill>
-              </a14:hiddenFill>
-            </a:ext>
-          </a:extLst>
-        </p:spPr>
-      </p:pic>
-      <p:pic>
-        <p:nvPicPr>
-          <p:cNvPr id="2058" name="Picture 10" descr="http://www.laseagrant.org/wp-content/uploads/LSG-logo-blue.jpeg"/>
-          <p:cNvPicPr>
-            <a:picLocks noChangeAspect="1" noChangeArrowheads="1"/>
-          </p:cNvPicPr>
-          <p:nvPr userDrawn="1"/>
-        </p:nvPicPr>
-        <p:blipFill>
-          <a:blip r:embed="rId6">
-            <a:clrChange>
-              <a:clrFrom>
-                <a:srgbClr val="FFFFFF"/>
-              </a:clrFrom>
-              <a:clrTo>
-                <a:srgbClr val="FFFFFF">
-                  <a:alpha val="0"/>
-                </a:srgbClr>
-              </a:clrTo>
-            </a:clrChange>
+                </a:clrFrom>
+                <a:clrTo>
+                  <a:srgbClr val="FFFFFF">
+                    <a:alpha val="0"/>
+                  </a:srgbClr>
+                </a:clrTo>
+              </a:clrChange>
+              <a:extLst>
+                <a:ext uri="{28A0092B-C50C-407E-A947-70E740481C1C}">
+                  <a14:useLocalDpi xmlns:a14="http://schemas.microsoft.com/office/drawing/2010/main" val="0"/>
+                </a:ext>
+              </a:extLst>
+            </a:blip>
+            <a:srcRect r="711"/>
+            <a:stretch/>
+          </p:blipFill>
+          <p:spPr bwMode="auto">
+            <a:xfrm>
+              <a:off x="5820075" y="5227040"/>
+              <a:ext cx="2511124" cy="998218"/>
+            </a:xfrm>
+            <a:prstGeom prst="rect">
+              <a:avLst/>
+            </a:prstGeom>
+            <a:noFill/>
             <a:extLst>
-              <a:ext uri="{28A0092B-C50C-407E-A947-70E740481C1C}">
-                <a14:useLocalDpi xmlns:a14="http://schemas.microsoft.com/office/drawing/2010/main" val="0"/>
+              <a:ext uri="{909E8E84-426E-40DD-AFC4-6F175D3DCCD1}">
+                <a14:hiddenFill xmlns:a14="http://schemas.microsoft.com/office/drawing/2010/main">
+                  <a:solidFill>
+                    <a:srgbClr val="FFFFFF"/>
+                  </a:solidFill>
+                </a14:hiddenFill>
               </a:ext>
             </a:extLst>
-          </a:blip>
-          <a:srcRect/>
-          <a:stretch>
-            <a:fillRect/>
-          </a:stretch>
-        </p:blipFill>
-        <p:spPr bwMode="auto">
-          <a:xfrm>
-            <a:off x="9264555" y="4276332"/>
-            <a:ext cx="1988982" cy="1459984"/>
-          </a:xfrm>
-          <a:prstGeom prst="rect">
-            <a:avLst/>
-          </a:prstGeom>
-          <a:noFill/>
-          <a:extLst>
-            <a:ext uri="{909E8E84-426E-40DD-AFC4-6F175D3DCCD1}">
-              <a14:hiddenFill xmlns:a14="http://schemas.microsoft.com/office/drawing/2010/main">
-                <a:solidFill>
+          </p:spPr>
+        </p:pic>
+        <p:pic>
+          <p:nvPicPr>
+            <p:cNvPr id="1028" name="Picture 4" descr="Image result for lsu loni"/>
+            <p:cNvPicPr>
+              <a:picLocks noChangeAspect="1" noChangeArrowheads="1"/>
+            </p:cNvPicPr>
+            <p:nvPr userDrawn="1"/>
+          </p:nvPicPr>
+          <p:blipFill rotWithShape="1">
+            <a:blip r:embed="rId8">
+              <a:clrChange>
+                <a:clrFrom>
                   <a:srgbClr val="FFFFFF"/>
-                </a:solidFill>
-              </a14:hiddenFill>
-            </a:ext>
-          </a:extLst>
-        </p:spPr>
-      </p:pic>
+                </a:clrFrom>
+                <a:clrTo>
+                  <a:srgbClr val="FFFFFF">
+                    <a:alpha val="0"/>
+                  </a:srgbClr>
+                </a:clrTo>
+              </a:clrChange>
+              <a:extLst>
+                <a:ext uri="{28A0092B-C50C-407E-A947-70E740481C1C}">
+                  <a14:useLocalDpi xmlns:a14="http://schemas.microsoft.com/office/drawing/2010/main" val="0"/>
+                </a:ext>
+              </a:extLst>
+            </a:blip>
+            <a:srcRect r="60039" b="5978"/>
+            <a:stretch/>
+          </p:blipFill>
+          <p:spPr bwMode="auto">
+            <a:xfrm>
+              <a:off x="5785969" y="3652304"/>
+              <a:ext cx="2597331" cy="1287220"/>
+            </a:xfrm>
+            <a:prstGeom prst="rect">
+              <a:avLst/>
+            </a:prstGeom>
+            <a:noFill/>
+            <a:extLst>
+              <a:ext uri="{909E8E84-426E-40DD-AFC4-6F175D3DCCD1}">
+                <a14:hiddenFill xmlns:a14="http://schemas.microsoft.com/office/drawing/2010/main">
+                  <a:solidFill>
+                    <a:srgbClr val="FFFFFF"/>
+                  </a:solidFill>
+                </a14:hiddenFill>
+              </a:ext>
+            </a:extLst>
+          </p:spPr>
+        </p:pic>
+      </p:grpSp>
     </p:spTree>
     <p:extLst>
       <p:ext uri="{BB962C8B-B14F-4D97-AF65-F5344CB8AC3E}">
@@ -1117,6 +1230,268 @@
 </file>
 
 <file path=ppt/slideLayouts/slideLayout10.xml><?xml version="1.0" encoding="utf-8"?>
+<p:sldLayout xmlns:a="http://schemas.openxmlformats.org/drawingml/2006/main" xmlns:r="http://schemas.openxmlformats.org/officeDocument/2006/relationships" xmlns:p="http://schemas.openxmlformats.org/presentationml/2006/main" type="picTx" preserve="1">
+  <p:cSld name="Picture with Caption">
+    <p:spTree>
+      <p:nvGrpSpPr>
+        <p:cNvPr id="1" name=""/>
+        <p:cNvGrpSpPr/>
+        <p:nvPr/>
+      </p:nvGrpSpPr>
+      <p:grpSpPr>
+        <a:xfrm>
+          <a:off x="0" y="0"/>
+          <a:ext cx="0" cy="0"/>
+          <a:chOff x="0" y="0"/>
+          <a:chExt cx="0" cy="0"/>
+        </a:xfrm>
+      </p:grpSpPr>
+      <p:sp>
+        <p:nvSpPr>
+          <p:cNvPr id="2" name="Title 1"/>
+          <p:cNvSpPr>
+            <a:spLocks noGrp="1"/>
+          </p:cNvSpPr>
+          <p:nvPr>
+            <p:ph type="title"/>
+          </p:nvPr>
+        </p:nvSpPr>
+        <p:spPr>
+          <a:xfrm>
+            <a:off x="839788" y="457200"/>
+            <a:ext cx="3932237" cy="1600200"/>
+          </a:xfrm>
+        </p:spPr>
+        <p:txBody>
+          <a:bodyPr anchor="b"/>
+          <a:lstStyle>
+            <a:lvl1pPr>
+              <a:defRPr sz="3200"/>
+            </a:lvl1pPr>
+          </a:lstStyle>
+          <a:p>
+            <a:r>
+              <a:rPr lang="en-US" smtClean="0"/>
+              <a:t>Click to edit Master title style</a:t>
+            </a:r>
+            <a:endParaRPr lang="en-US"/>
+          </a:p>
+        </p:txBody>
+      </p:sp>
+      <p:sp>
+        <p:nvSpPr>
+          <p:cNvPr id="3" name="Picture Placeholder 2"/>
+          <p:cNvSpPr>
+            <a:spLocks noGrp="1"/>
+          </p:cNvSpPr>
+          <p:nvPr>
+            <p:ph type="pic" idx="1"/>
+          </p:nvPr>
+        </p:nvSpPr>
+        <p:spPr>
+          <a:xfrm>
+            <a:off x="5183188" y="987425"/>
+            <a:ext cx="6172200" cy="4873625"/>
+          </a:xfrm>
+        </p:spPr>
+        <p:txBody>
+          <a:bodyPr/>
+          <a:lstStyle>
+            <a:lvl1pPr marL="0" indent="0">
+              <a:buNone/>
+              <a:defRPr sz="3200"/>
+            </a:lvl1pPr>
+            <a:lvl2pPr marL="457200" indent="0">
+              <a:buNone/>
+              <a:defRPr sz="2800"/>
+            </a:lvl2pPr>
+            <a:lvl3pPr marL="914400" indent="0">
+              <a:buNone/>
+              <a:defRPr sz="2400"/>
+            </a:lvl3pPr>
+            <a:lvl4pPr marL="1371600" indent="0">
+              <a:buNone/>
+              <a:defRPr sz="2000"/>
+            </a:lvl4pPr>
+            <a:lvl5pPr marL="1828800" indent="0">
+              <a:buNone/>
+              <a:defRPr sz="2000"/>
+            </a:lvl5pPr>
+            <a:lvl6pPr marL="2286000" indent="0">
+              <a:buNone/>
+              <a:defRPr sz="2000"/>
+            </a:lvl6pPr>
+            <a:lvl7pPr marL="2743200" indent="0">
+              <a:buNone/>
+              <a:defRPr sz="2000"/>
+            </a:lvl7pPr>
+            <a:lvl8pPr marL="3200400" indent="0">
+              <a:buNone/>
+              <a:defRPr sz="2000"/>
+            </a:lvl8pPr>
+            <a:lvl9pPr marL="3657600" indent="0">
+              <a:buNone/>
+              <a:defRPr sz="2000"/>
+            </a:lvl9pPr>
+          </a:lstStyle>
+          <a:p>
+            <a:r>
+              <a:rPr lang="en-US" smtClean="0"/>
+              <a:t>Click icon to add picture</a:t>
+            </a:r>
+            <a:endParaRPr lang="en-US"/>
+          </a:p>
+        </p:txBody>
+      </p:sp>
+      <p:sp>
+        <p:nvSpPr>
+          <p:cNvPr id="4" name="Text Placeholder 3"/>
+          <p:cNvSpPr>
+            <a:spLocks noGrp="1"/>
+          </p:cNvSpPr>
+          <p:nvPr>
+            <p:ph type="body" sz="half" idx="2"/>
+          </p:nvPr>
+        </p:nvSpPr>
+        <p:spPr>
+          <a:xfrm>
+            <a:off x="839788" y="2057400"/>
+            <a:ext cx="3932237" cy="3811588"/>
+          </a:xfrm>
+        </p:spPr>
+        <p:txBody>
+          <a:bodyPr/>
+          <a:lstStyle>
+            <a:lvl1pPr marL="0" indent="0">
+              <a:buNone/>
+              <a:defRPr sz="1600"/>
+            </a:lvl1pPr>
+            <a:lvl2pPr marL="457200" indent="0">
+              <a:buNone/>
+              <a:defRPr sz="1400"/>
+            </a:lvl2pPr>
+            <a:lvl3pPr marL="914400" indent="0">
+              <a:buNone/>
+              <a:defRPr sz="1200"/>
+            </a:lvl3pPr>
+            <a:lvl4pPr marL="1371600" indent="0">
+              <a:buNone/>
+              <a:defRPr sz="1000"/>
+            </a:lvl4pPr>
+            <a:lvl5pPr marL="1828800" indent="0">
+              <a:buNone/>
+              <a:defRPr sz="1000"/>
+            </a:lvl5pPr>
+            <a:lvl6pPr marL="2286000" indent="0">
+              <a:buNone/>
+              <a:defRPr sz="1000"/>
+            </a:lvl6pPr>
+            <a:lvl7pPr marL="2743200" indent="0">
+              <a:buNone/>
+              <a:defRPr sz="1000"/>
+            </a:lvl7pPr>
+            <a:lvl8pPr marL="3200400" indent="0">
+              <a:buNone/>
+              <a:defRPr sz="1000"/>
+            </a:lvl8pPr>
+            <a:lvl9pPr marL="3657600" indent="0">
+              <a:buNone/>
+              <a:defRPr sz="1000"/>
+            </a:lvl9pPr>
+          </a:lstStyle>
+          <a:p>
+            <a:pPr lvl="0"/>
+            <a:r>
+              <a:rPr lang="en-US" smtClean="0"/>
+              <a:t>Click to edit Master text styles</a:t>
+            </a:r>
+          </a:p>
+        </p:txBody>
+      </p:sp>
+      <p:sp>
+        <p:nvSpPr>
+          <p:cNvPr id="8" name="Date Placeholder 3"/>
+          <p:cNvSpPr>
+            <a:spLocks noGrp="1"/>
+          </p:cNvSpPr>
+          <p:nvPr>
+            <p:ph type="dt" sz="half" idx="10"/>
+          </p:nvPr>
+        </p:nvSpPr>
+        <p:spPr>
+          <a:xfrm>
+            <a:off x="57150" y="6378580"/>
+            <a:ext cx="2743200" cy="365125"/>
+          </a:xfrm>
+          <a:prstGeom prst="rect">
+            <a:avLst/>
+          </a:prstGeom>
+        </p:spPr>
+        <p:txBody>
+          <a:bodyPr/>
+          <a:lstStyle>
+            <a:lvl1pPr>
+              <a:defRPr/>
+            </a:lvl1pPr>
+          </a:lstStyle>
+          <a:p>
+            <a:endParaRPr lang="en-US" dirty="0"/>
+          </a:p>
+        </p:txBody>
+      </p:sp>
+      <p:sp>
+        <p:nvSpPr>
+          <p:cNvPr id="10" name="Slide Number Placeholder 5"/>
+          <p:cNvSpPr>
+            <a:spLocks noGrp="1"/>
+          </p:cNvSpPr>
+          <p:nvPr>
+            <p:ph type="sldNum" sz="quarter" idx="12"/>
+          </p:nvPr>
+        </p:nvSpPr>
+        <p:spPr>
+          <a:xfrm>
+            <a:off x="10515602" y="6378580"/>
+            <a:ext cx="1578429" cy="365125"/>
+          </a:xfrm>
+          <a:prstGeom prst="rect">
+            <a:avLst/>
+          </a:prstGeom>
+        </p:spPr>
+        <p:txBody>
+          <a:bodyPr/>
+          <a:lstStyle/>
+          <a:p>
+            <a:fld id="{9138CEF9-5D5B-4151-AB46-3590332F1DB6}" type="slidenum">
+              <a:rPr lang="en-US" smtClean="0"/>
+              <a:pPr/>
+              <a:t>‹#›</a:t>
+            </a:fld>
+            <a:endParaRPr lang="en-US" dirty="0"/>
+          </a:p>
+        </p:txBody>
+      </p:sp>
+    </p:spTree>
+    <p:extLst>
+      <p:ext uri="{BB962C8B-B14F-4D97-AF65-F5344CB8AC3E}">
+        <p14:creationId xmlns:p14="http://schemas.microsoft.com/office/powerpoint/2010/main" val="3154000746"/>
+      </p:ext>
+    </p:extLst>
+  </p:cSld>
+  <p:clrMapOvr>
+    <a:masterClrMapping/>
+  </p:clrMapOvr>
+  <p:timing>
+    <p:tnLst>
+      <p:par>
+        <p:cTn id="1" dur="indefinite" restart="never" nodeType="tmRoot"/>
+      </p:par>
+    </p:tnLst>
+  </p:timing>
+</p:sldLayout>
+</file>
+
+<file path=ppt/slideLayouts/slideLayout11.xml><?xml version="1.0" encoding="utf-8"?>
 <p:sldLayout xmlns:a="http://schemas.openxmlformats.org/drawingml/2006/main" xmlns:r="http://schemas.openxmlformats.org/officeDocument/2006/relationships" xmlns:p="http://schemas.openxmlformats.org/presentationml/2006/main" type="vertTx" preserve="1">
   <p:cSld name="Title and Vertical Text">
     <p:spTree>
@@ -1296,7 +1671,7 @@
 </p:sldLayout>
 </file>
 
-<file path=ppt/slideLayouts/slideLayout11.xml><?xml version="1.0" encoding="utf-8"?>
+<file path=ppt/slideLayouts/slideLayout12.xml><?xml version="1.0" encoding="utf-8"?>
 <p:sldLayout xmlns:a="http://schemas.openxmlformats.org/drawingml/2006/main" xmlns:r="http://schemas.openxmlformats.org/officeDocument/2006/relationships" xmlns:p="http://schemas.openxmlformats.org/presentationml/2006/main" type="vertTitleAndTx" preserve="1">
   <p:cSld name="Vertical Title and Text">
     <p:spTree>
@@ -2503,7 +2878,7 @@
 </file>
 
 <file path=ppt/slideLayouts/slideLayout6.xml><?xml version="1.0" encoding="utf-8"?>
-<p:sldLayout xmlns:a="http://schemas.openxmlformats.org/drawingml/2006/main" xmlns:r="http://schemas.openxmlformats.org/officeDocument/2006/relationships" xmlns:p="http://schemas.openxmlformats.org/presentationml/2006/main" type="titleOnly" preserve="1">
+<p:sldLayout xmlns:a="http://schemas.openxmlformats.org/drawingml/2006/main" xmlns:r="http://schemas.openxmlformats.org/officeDocument/2006/relationships" xmlns:p="http://schemas.openxmlformats.org/presentationml/2006/main" preserve="1" userDrawn="1">
   <p:cSld name="Title Only">
     <p:spTree>
       <p:nvGrpSpPr>
@@ -2532,7 +2907,7 @@
         <p:spPr>
           <a:xfrm>
             <a:off x="1227667" y="1"/>
-            <a:ext cx="10423071" cy="1219200"/>
+            <a:ext cx="10423071" cy="745066"/>
           </a:xfrm>
         </p:spPr>
         <p:txBody>
@@ -2575,6 +2950,74 @@
               <a:pPr/>
               <a:t>‹#›</a:t>
             </a:fld>
+            <a:endParaRPr lang="en-US" dirty="0"/>
+          </a:p>
+        </p:txBody>
+      </p:sp>
+      <p:sp>
+        <p:nvSpPr>
+          <p:cNvPr id="4" name="Subtitle 2"/>
+          <p:cNvSpPr>
+            <a:spLocks noGrp="1"/>
+          </p:cNvSpPr>
+          <p:nvPr>
+            <p:ph type="subTitle" idx="1" hasCustomPrompt="1"/>
+          </p:nvPr>
+        </p:nvSpPr>
+        <p:spPr>
+          <a:xfrm>
+            <a:off x="1465168" y="745067"/>
+            <a:ext cx="10185570" cy="702733"/>
+          </a:xfrm>
+        </p:spPr>
+        <p:txBody>
+          <a:bodyPr/>
+          <a:lstStyle>
+            <a:lvl1pPr marL="0" indent="0" algn="l">
+              <a:buNone/>
+              <a:defRPr sz="2000">
+                <a:latin typeface="Arial" panose="020B0604020202020204" pitchFamily="34" charset="0"/>
+                <a:cs typeface="Arial" panose="020B0604020202020204" pitchFamily="34" charset="0"/>
+              </a:defRPr>
+            </a:lvl1pPr>
+            <a:lvl2pPr marL="457200" indent="0" algn="ctr">
+              <a:buNone/>
+              <a:defRPr sz="2000"/>
+            </a:lvl2pPr>
+            <a:lvl3pPr marL="914400" indent="0" algn="ctr">
+              <a:buNone/>
+              <a:defRPr sz="1800"/>
+            </a:lvl3pPr>
+            <a:lvl4pPr marL="1371600" indent="0" algn="ctr">
+              <a:buNone/>
+              <a:defRPr sz="1600"/>
+            </a:lvl4pPr>
+            <a:lvl5pPr marL="1828800" indent="0" algn="ctr">
+              <a:buNone/>
+              <a:defRPr sz="1600"/>
+            </a:lvl5pPr>
+            <a:lvl6pPr marL="2286000" indent="0" algn="ctr">
+              <a:buNone/>
+              <a:defRPr sz="1600"/>
+            </a:lvl6pPr>
+            <a:lvl7pPr marL="2743200" indent="0" algn="ctr">
+              <a:buNone/>
+              <a:defRPr sz="1600"/>
+            </a:lvl7pPr>
+            <a:lvl8pPr marL="3200400" indent="0" algn="ctr">
+              <a:buNone/>
+              <a:defRPr sz="1600"/>
+            </a:lvl8pPr>
+            <a:lvl9pPr marL="3657600" indent="0" algn="ctr">
+              <a:buNone/>
+              <a:defRPr sz="1600"/>
+            </a:lvl9pPr>
+          </a:lstStyle>
+          <a:p>
+            <a:r>
+              <a:rPr lang="en-US" dirty="0" smtClean="0"/>
+              <a:t>Click to add authors</a:t>
+            </a:r>
             <a:endParaRPr lang="en-US" dirty="0"/>
           </a:p>
         </p:txBody>
@@ -2600,6 +3043,103 @@
 </file>
 
 <file path=ppt/slideLayouts/slideLayout7.xml><?xml version="1.0" encoding="utf-8"?>
+<p:sldLayout xmlns:a="http://schemas.openxmlformats.org/drawingml/2006/main" xmlns:r="http://schemas.openxmlformats.org/officeDocument/2006/relationships" xmlns:p="http://schemas.openxmlformats.org/presentationml/2006/main" preserve="1" userDrawn="1">
+  <p:cSld name="1_Title Only">
+    <p:spTree>
+      <p:nvGrpSpPr>
+        <p:cNvPr id="1" name=""/>
+        <p:cNvGrpSpPr/>
+        <p:nvPr/>
+      </p:nvGrpSpPr>
+      <p:grpSpPr>
+        <a:xfrm>
+          <a:off x="0" y="0"/>
+          <a:ext cx="0" cy="0"/>
+          <a:chOff x="0" y="0"/>
+          <a:chExt cx="0" cy="0"/>
+        </a:xfrm>
+      </p:grpSpPr>
+      <p:sp>
+        <p:nvSpPr>
+          <p:cNvPr id="2" name="Title 1"/>
+          <p:cNvSpPr>
+            <a:spLocks noGrp="1"/>
+          </p:cNvSpPr>
+          <p:nvPr>
+            <p:ph type="title"/>
+          </p:nvPr>
+        </p:nvSpPr>
+        <p:spPr>
+          <a:xfrm>
+            <a:off x="1227667" y="1"/>
+            <a:ext cx="10423071" cy="745066"/>
+          </a:xfrm>
+        </p:spPr>
+        <p:txBody>
+          <a:bodyPr/>
+          <a:lstStyle/>
+          <a:p>
+            <a:r>
+              <a:rPr lang="en-US" dirty="0" smtClean="0"/>
+              <a:t>Click to edit Master title style</a:t>
+            </a:r>
+            <a:endParaRPr lang="en-US" dirty="0"/>
+          </a:p>
+        </p:txBody>
+      </p:sp>
+      <p:sp>
+        <p:nvSpPr>
+          <p:cNvPr id="8" name="Slide Number Placeholder 5"/>
+          <p:cNvSpPr>
+            <a:spLocks noGrp="1"/>
+          </p:cNvSpPr>
+          <p:nvPr>
+            <p:ph type="sldNum" sz="quarter" idx="12"/>
+          </p:nvPr>
+        </p:nvSpPr>
+        <p:spPr>
+          <a:xfrm>
+            <a:off x="10515602" y="6378580"/>
+            <a:ext cx="1578429" cy="365125"/>
+          </a:xfrm>
+          <a:prstGeom prst="rect">
+            <a:avLst/>
+          </a:prstGeom>
+        </p:spPr>
+        <p:txBody>
+          <a:bodyPr/>
+          <a:lstStyle/>
+          <a:p>
+            <a:fld id="{9138CEF9-5D5B-4151-AB46-3590332F1DB6}" type="slidenum">
+              <a:rPr lang="en-US" smtClean="0"/>
+              <a:pPr/>
+              <a:t>‹#›</a:t>
+            </a:fld>
+            <a:endParaRPr lang="en-US" dirty="0"/>
+          </a:p>
+        </p:txBody>
+      </p:sp>
+    </p:spTree>
+    <p:extLst>
+      <p:ext uri="{BB962C8B-B14F-4D97-AF65-F5344CB8AC3E}">
+        <p14:creationId xmlns:p14="http://schemas.microsoft.com/office/powerpoint/2010/main" val="3278657235"/>
+      </p:ext>
+    </p:extLst>
+  </p:cSld>
+  <p:clrMapOvr>
+    <a:masterClrMapping/>
+  </p:clrMapOvr>
+  <p:timing>
+    <p:tnLst>
+      <p:par>
+        <p:cTn id="1" dur="indefinite" restart="never" nodeType="tmRoot"/>
+      </p:par>
+    </p:tnLst>
+  </p:timing>
+</p:sldLayout>
+</file>
+
+<file path=ppt/slideLayouts/slideLayout8.xml><?xml version="1.0" encoding="utf-8"?>
 <p:sldLayout xmlns:a="http://schemas.openxmlformats.org/drawingml/2006/main" xmlns:r="http://schemas.openxmlformats.org/officeDocument/2006/relationships" xmlns:p="http://schemas.openxmlformats.org/presentationml/2006/main" type="blank" preserve="1">
   <p:cSld name="Blank">
     <p:spTree>
@@ -2699,7 +3239,7 @@
 </p:sldLayout>
 </file>
 
-<file path=ppt/slideLayouts/slideLayout8.xml><?xml version="1.0" encoding="utf-8"?>
+<file path=ppt/slideLayouts/slideLayout9.xml><?xml version="1.0" encoding="utf-8"?>
 <p:sldLayout xmlns:a="http://schemas.openxmlformats.org/drawingml/2006/main" xmlns:r="http://schemas.openxmlformats.org/officeDocument/2006/relationships" xmlns:p="http://schemas.openxmlformats.org/presentationml/2006/main" type="objTx" preserve="1">
   <p:cSld name="Content with Caption">
     <p:spTree>
@@ -2965,268 +3505,6 @@
     <p:extLst>
       <p:ext uri="{BB962C8B-B14F-4D97-AF65-F5344CB8AC3E}">
         <p14:creationId xmlns:p14="http://schemas.microsoft.com/office/powerpoint/2010/main" val="2139077687"/>
-      </p:ext>
-    </p:extLst>
-  </p:cSld>
-  <p:clrMapOvr>
-    <a:masterClrMapping/>
-  </p:clrMapOvr>
-  <p:timing>
-    <p:tnLst>
-      <p:par>
-        <p:cTn id="1" dur="indefinite" restart="never" nodeType="tmRoot"/>
-      </p:par>
-    </p:tnLst>
-  </p:timing>
-</p:sldLayout>
-</file>
-
-<file path=ppt/slideLayouts/slideLayout9.xml><?xml version="1.0" encoding="utf-8"?>
-<p:sldLayout xmlns:a="http://schemas.openxmlformats.org/drawingml/2006/main" xmlns:r="http://schemas.openxmlformats.org/officeDocument/2006/relationships" xmlns:p="http://schemas.openxmlformats.org/presentationml/2006/main" type="picTx" preserve="1">
-  <p:cSld name="Picture with Caption">
-    <p:spTree>
-      <p:nvGrpSpPr>
-        <p:cNvPr id="1" name=""/>
-        <p:cNvGrpSpPr/>
-        <p:nvPr/>
-      </p:nvGrpSpPr>
-      <p:grpSpPr>
-        <a:xfrm>
-          <a:off x="0" y="0"/>
-          <a:ext cx="0" cy="0"/>
-          <a:chOff x="0" y="0"/>
-          <a:chExt cx="0" cy="0"/>
-        </a:xfrm>
-      </p:grpSpPr>
-      <p:sp>
-        <p:nvSpPr>
-          <p:cNvPr id="2" name="Title 1"/>
-          <p:cNvSpPr>
-            <a:spLocks noGrp="1"/>
-          </p:cNvSpPr>
-          <p:nvPr>
-            <p:ph type="title"/>
-          </p:nvPr>
-        </p:nvSpPr>
-        <p:spPr>
-          <a:xfrm>
-            <a:off x="839788" y="457200"/>
-            <a:ext cx="3932237" cy="1600200"/>
-          </a:xfrm>
-        </p:spPr>
-        <p:txBody>
-          <a:bodyPr anchor="b"/>
-          <a:lstStyle>
-            <a:lvl1pPr>
-              <a:defRPr sz="3200"/>
-            </a:lvl1pPr>
-          </a:lstStyle>
-          <a:p>
-            <a:r>
-              <a:rPr lang="en-US" smtClean="0"/>
-              <a:t>Click to edit Master title style</a:t>
-            </a:r>
-            <a:endParaRPr lang="en-US"/>
-          </a:p>
-        </p:txBody>
-      </p:sp>
-      <p:sp>
-        <p:nvSpPr>
-          <p:cNvPr id="3" name="Picture Placeholder 2"/>
-          <p:cNvSpPr>
-            <a:spLocks noGrp="1"/>
-          </p:cNvSpPr>
-          <p:nvPr>
-            <p:ph type="pic" idx="1"/>
-          </p:nvPr>
-        </p:nvSpPr>
-        <p:spPr>
-          <a:xfrm>
-            <a:off x="5183188" y="987425"/>
-            <a:ext cx="6172200" cy="4873625"/>
-          </a:xfrm>
-        </p:spPr>
-        <p:txBody>
-          <a:bodyPr/>
-          <a:lstStyle>
-            <a:lvl1pPr marL="0" indent="0">
-              <a:buNone/>
-              <a:defRPr sz="3200"/>
-            </a:lvl1pPr>
-            <a:lvl2pPr marL="457200" indent="0">
-              <a:buNone/>
-              <a:defRPr sz="2800"/>
-            </a:lvl2pPr>
-            <a:lvl3pPr marL="914400" indent="0">
-              <a:buNone/>
-              <a:defRPr sz="2400"/>
-            </a:lvl3pPr>
-            <a:lvl4pPr marL="1371600" indent="0">
-              <a:buNone/>
-              <a:defRPr sz="2000"/>
-            </a:lvl4pPr>
-            <a:lvl5pPr marL="1828800" indent="0">
-              <a:buNone/>
-              <a:defRPr sz="2000"/>
-            </a:lvl5pPr>
-            <a:lvl6pPr marL="2286000" indent="0">
-              <a:buNone/>
-              <a:defRPr sz="2000"/>
-            </a:lvl6pPr>
-            <a:lvl7pPr marL="2743200" indent="0">
-              <a:buNone/>
-              <a:defRPr sz="2000"/>
-            </a:lvl7pPr>
-            <a:lvl8pPr marL="3200400" indent="0">
-              <a:buNone/>
-              <a:defRPr sz="2000"/>
-            </a:lvl8pPr>
-            <a:lvl9pPr marL="3657600" indent="0">
-              <a:buNone/>
-              <a:defRPr sz="2000"/>
-            </a:lvl9pPr>
-          </a:lstStyle>
-          <a:p>
-            <a:r>
-              <a:rPr lang="en-US" smtClean="0"/>
-              <a:t>Click icon to add picture</a:t>
-            </a:r>
-            <a:endParaRPr lang="en-US"/>
-          </a:p>
-        </p:txBody>
-      </p:sp>
-      <p:sp>
-        <p:nvSpPr>
-          <p:cNvPr id="4" name="Text Placeholder 3"/>
-          <p:cNvSpPr>
-            <a:spLocks noGrp="1"/>
-          </p:cNvSpPr>
-          <p:nvPr>
-            <p:ph type="body" sz="half" idx="2"/>
-          </p:nvPr>
-        </p:nvSpPr>
-        <p:spPr>
-          <a:xfrm>
-            <a:off x="839788" y="2057400"/>
-            <a:ext cx="3932237" cy="3811588"/>
-          </a:xfrm>
-        </p:spPr>
-        <p:txBody>
-          <a:bodyPr/>
-          <a:lstStyle>
-            <a:lvl1pPr marL="0" indent="0">
-              <a:buNone/>
-              <a:defRPr sz="1600"/>
-            </a:lvl1pPr>
-            <a:lvl2pPr marL="457200" indent="0">
-              <a:buNone/>
-              <a:defRPr sz="1400"/>
-            </a:lvl2pPr>
-            <a:lvl3pPr marL="914400" indent="0">
-              <a:buNone/>
-              <a:defRPr sz="1200"/>
-            </a:lvl3pPr>
-            <a:lvl4pPr marL="1371600" indent="0">
-              <a:buNone/>
-              <a:defRPr sz="1000"/>
-            </a:lvl4pPr>
-            <a:lvl5pPr marL="1828800" indent="0">
-              <a:buNone/>
-              <a:defRPr sz="1000"/>
-            </a:lvl5pPr>
-            <a:lvl6pPr marL="2286000" indent="0">
-              <a:buNone/>
-              <a:defRPr sz="1000"/>
-            </a:lvl6pPr>
-            <a:lvl7pPr marL="2743200" indent="0">
-              <a:buNone/>
-              <a:defRPr sz="1000"/>
-            </a:lvl7pPr>
-            <a:lvl8pPr marL="3200400" indent="0">
-              <a:buNone/>
-              <a:defRPr sz="1000"/>
-            </a:lvl8pPr>
-            <a:lvl9pPr marL="3657600" indent="0">
-              <a:buNone/>
-              <a:defRPr sz="1000"/>
-            </a:lvl9pPr>
-          </a:lstStyle>
-          <a:p>
-            <a:pPr lvl="0"/>
-            <a:r>
-              <a:rPr lang="en-US" smtClean="0"/>
-              <a:t>Click to edit Master text styles</a:t>
-            </a:r>
-          </a:p>
-        </p:txBody>
-      </p:sp>
-      <p:sp>
-        <p:nvSpPr>
-          <p:cNvPr id="8" name="Date Placeholder 3"/>
-          <p:cNvSpPr>
-            <a:spLocks noGrp="1"/>
-          </p:cNvSpPr>
-          <p:nvPr>
-            <p:ph type="dt" sz="half" idx="10"/>
-          </p:nvPr>
-        </p:nvSpPr>
-        <p:spPr>
-          <a:xfrm>
-            <a:off x="57150" y="6378580"/>
-            <a:ext cx="2743200" cy="365125"/>
-          </a:xfrm>
-          <a:prstGeom prst="rect">
-            <a:avLst/>
-          </a:prstGeom>
-        </p:spPr>
-        <p:txBody>
-          <a:bodyPr/>
-          <a:lstStyle>
-            <a:lvl1pPr>
-              <a:defRPr/>
-            </a:lvl1pPr>
-          </a:lstStyle>
-          <a:p>
-            <a:endParaRPr lang="en-US" dirty="0"/>
-          </a:p>
-        </p:txBody>
-      </p:sp>
-      <p:sp>
-        <p:nvSpPr>
-          <p:cNvPr id="10" name="Slide Number Placeholder 5"/>
-          <p:cNvSpPr>
-            <a:spLocks noGrp="1"/>
-          </p:cNvSpPr>
-          <p:nvPr>
-            <p:ph type="sldNum" sz="quarter" idx="12"/>
-          </p:nvPr>
-        </p:nvSpPr>
-        <p:spPr>
-          <a:xfrm>
-            <a:off x="10515602" y="6378580"/>
-            <a:ext cx="1578429" cy="365125"/>
-          </a:xfrm>
-          <a:prstGeom prst="rect">
-            <a:avLst/>
-          </a:prstGeom>
-        </p:spPr>
-        <p:txBody>
-          <a:bodyPr/>
-          <a:lstStyle/>
-          <a:p>
-            <a:fld id="{9138CEF9-5D5B-4151-AB46-3590332F1DB6}" type="slidenum">
-              <a:rPr lang="en-US" smtClean="0"/>
-              <a:pPr/>
-              <a:t>‹#›</a:t>
-            </a:fld>
-            <a:endParaRPr lang="en-US" dirty="0"/>
-          </a:p>
-        </p:txBody>
-      </p:sp>
-    </p:spTree>
-    <p:extLst>
-      <p:ext uri="{BB962C8B-B14F-4D97-AF65-F5344CB8AC3E}">
-        <p14:creationId xmlns:p14="http://schemas.microsoft.com/office/powerpoint/2010/main" val="3154000746"/>
       </p:ext>
     </p:extLst>
   </p:cSld>
@@ -3507,11 +3785,12 @@
     <p:sldLayoutId id="2147483652" r:id="rId4"/>
     <p:sldLayoutId id="2147483653" r:id="rId5"/>
     <p:sldLayoutId id="2147483654" r:id="rId6"/>
-    <p:sldLayoutId id="2147483655" r:id="rId7"/>
-    <p:sldLayoutId id="2147483656" r:id="rId8"/>
-    <p:sldLayoutId id="2147483657" r:id="rId9"/>
-    <p:sldLayoutId id="2147483658" r:id="rId10"/>
-    <p:sldLayoutId id="2147483659" r:id="rId11"/>
+    <p:sldLayoutId id="2147483660" r:id="rId7"/>
+    <p:sldLayoutId id="2147483655" r:id="rId8"/>
+    <p:sldLayoutId id="2147483656" r:id="rId9"/>
+    <p:sldLayoutId id="2147483657" r:id="rId10"/>
+    <p:sldLayoutId id="2147483658" r:id="rId11"/>
+    <p:sldLayoutId id="2147483659" r:id="rId12"/>
   </p:sldLayoutIdLst>
   <p:timing>
     <p:tnLst>

</xml_diff>

<commit_message>
Updating slide master template.
</commit_message>
<xml_diff>
--- a/output/cpra_postproc/LSU_template.pptx
+++ b/output/cpra_postproc/LSU_template.pptx
@@ -211,7 +211,7 @@
           <a:p>
             <a:fld id="{D844CF58-73D2-4666-AB65-9E20151AB2CE}" type="datetimeFigureOut">
               <a:rPr lang="en-US" smtClean="0"/>
-              <a:t>5/25/2018</a:t>
+              <a:t>6/7/2018</a:t>
             </a:fld>
             <a:endParaRPr lang="en-US"/>
           </a:p>
@@ -376,7 +376,7 @@
           <a:p>
             <a:fld id="{A5C4824E-61BC-4FE8-B452-5DAE82D7E36E}" type="datetimeFigureOut">
               <a:rPr lang="en-US" smtClean="0"/>
-              <a:t>5/25/2018</a:t>
+              <a:t>6/7/2018</a:t>
             </a:fld>
             <a:endParaRPr lang="en-US"/>
           </a:p>
@@ -683,7 +683,7 @@
         </p:nvSpPr>
         <p:spPr>
           <a:xfrm>
-            <a:off x="1304301" y="2203984"/>
+            <a:off x="1304301" y="2237852"/>
             <a:ext cx="9144000" cy="1123416"/>
           </a:xfrm>
         </p:spPr>
@@ -777,42 +777,6 @@
           </a:p>
         </p:txBody>
       </p:sp>
-      <p:sp>
-        <p:nvSpPr>
-          <p:cNvPr id="17" name="Slide Number Placeholder 5"/>
-          <p:cNvSpPr>
-            <a:spLocks noGrp="1"/>
-          </p:cNvSpPr>
-          <p:nvPr>
-            <p:ph type="sldNum" sz="quarter" idx="12"/>
-          </p:nvPr>
-        </p:nvSpPr>
-        <p:spPr>
-          <a:xfrm>
-            <a:off x="10515602" y="6378580"/>
-            <a:ext cx="1578429" cy="365125"/>
-          </a:xfrm>
-          <a:prstGeom prst="rect">
-            <a:avLst/>
-          </a:prstGeom>
-        </p:spPr>
-        <p:txBody>
-          <a:bodyPr/>
-          <a:lstStyle>
-            <a:lvl1pPr algn="r">
-              <a:defRPr/>
-            </a:lvl1pPr>
-          </a:lstStyle>
-          <a:p>
-            <a:fld id="{9138CEF9-5D5B-4151-AB46-3590332F1DB6}" type="slidenum">
-              <a:rPr lang="en-US" smtClean="0"/>
-              <a:pPr/>
-              <a:t>‹#›</a:t>
-            </a:fld>
-            <a:endParaRPr lang="en-US" dirty="0"/>
-          </a:p>
-        </p:txBody>
-      </p:sp>
       <p:grpSp>
         <p:nvGrpSpPr>
           <p:cNvPr id="4" name="Group 3"/>
@@ -821,7 +785,7 @@
         </p:nvGrpSpPr>
         <p:grpSpPr>
           <a:xfrm>
-            <a:off x="970710" y="3632197"/>
+            <a:off x="970710" y="3826938"/>
             <a:ext cx="10250581" cy="2664009"/>
             <a:chOff x="1475751" y="3632197"/>
             <a:chExt cx="10250581" cy="2664009"/>
@@ -1886,7 +1850,7 @@
         <p:spPr>
           <a:xfrm>
             <a:off x="0" y="-13909"/>
-            <a:ext cx="10473871" cy="804484"/>
+            <a:ext cx="12192000" cy="804484"/>
           </a:xfrm>
         </p:spPr>
         <p:txBody>
@@ -2906,8 +2870,8 @@
         </p:nvSpPr>
         <p:spPr>
           <a:xfrm>
-            <a:off x="1227667" y="1"/>
-            <a:ext cx="10423071" cy="745066"/>
+            <a:off x="0" y="1"/>
+            <a:ext cx="12191999" cy="745066"/>
           </a:xfrm>
         </p:spPr>
         <p:txBody>
@@ -3071,8 +3035,8 @@
         </p:nvSpPr>
         <p:spPr>
           <a:xfrm>
-            <a:off x="1227667" y="1"/>
-            <a:ext cx="10423071" cy="745066"/>
+            <a:off x="0" y="1"/>
+            <a:ext cx="12191999" cy="745066"/>
           </a:xfrm>
         </p:spPr>
         <p:txBody>
@@ -3666,41 +3630,6 @@
           </a:p>
         </p:txBody>
       </p:sp>
-      <p:cxnSp>
-        <p:nvCxnSpPr>
-          <p:cNvPr id="16" name="Straight Connector 15"/>
-          <p:cNvCxnSpPr/>
-          <p:nvPr userDrawn="1"/>
-        </p:nvCxnSpPr>
-        <p:spPr>
-          <a:xfrm>
-            <a:off x="0" y="6272463"/>
-            <a:ext cx="12192000" cy="4511"/>
-          </a:xfrm>
-          <a:prstGeom prst="line">
-            <a:avLst/>
-          </a:prstGeom>
-          <a:ln w="38100">
-            <a:solidFill>
-              <a:srgbClr val="501781"/>
-            </a:solidFill>
-          </a:ln>
-        </p:spPr>
-        <p:style>
-          <a:lnRef idx="1">
-            <a:schemeClr val="accent1"/>
-          </a:lnRef>
-          <a:fillRef idx="0">
-            <a:schemeClr val="accent1"/>
-          </a:fillRef>
-          <a:effectRef idx="0">
-            <a:schemeClr val="accent1"/>
-          </a:effectRef>
-          <a:fontRef idx="minor">
-            <a:schemeClr val="tx1"/>
-          </a:fontRef>
-        </p:style>
-      </p:cxnSp>
       <p:sp>
         <p:nvSpPr>
           <p:cNvPr id="13" name="Slide Number Placeholder 5"/>

</xml_diff>

<commit_message>
Adding nhcConsensus maxele of southeastern LA to slide deck and text box for OFUO statement.
</commit_message>
<xml_diff>
--- a/output/cpra_postproc/LSU_template.pptx
+++ b/output/cpra_postproc/LSU_template.pptx
@@ -211,7 +211,7 @@
           <a:p>
             <a:fld id="{D844CF58-73D2-4666-AB65-9E20151AB2CE}" type="datetimeFigureOut">
               <a:rPr lang="en-US" smtClean="0"/>
-              <a:t>6/7/2018</a:t>
+              <a:t>6/9/18</a:t>
             </a:fld>
             <a:endParaRPr lang="en-US"/>
           </a:p>
@@ -376,7 +376,7 @@
           <a:p>
             <a:fld id="{A5C4824E-61BC-4FE8-B452-5DAE82D7E36E}" type="datetimeFigureOut">
               <a:rPr lang="en-US" smtClean="0"/>
-              <a:t>6/7/2018</a:t>
+              <a:t>6/9/18</a:t>
             </a:fld>
             <a:endParaRPr lang="en-US"/>
           </a:p>
@@ -777,402 +777,402 @@
           </a:p>
         </p:txBody>
       </p:sp>
-      <p:grpSp>
-        <p:nvGrpSpPr>
-          <p:cNvPr id="4" name="Group 3"/>
-          <p:cNvGrpSpPr/>
+      <p:sp>
+        <p:nvSpPr>
+          <p:cNvPr id="13" name="Subtitle 2"/>
+          <p:cNvSpPr txBox="1">
+            <a:spLocks/>
+          </p:cNvSpPr>
           <p:nvPr userDrawn="1"/>
-        </p:nvGrpSpPr>
-        <p:grpSpPr>
-          <a:xfrm>
-            <a:off x="970710" y="3826938"/>
-            <a:ext cx="10250581" cy="2664009"/>
-            <a:chOff x="1475751" y="3632197"/>
-            <a:chExt cx="10250581" cy="2664009"/>
-          </a:xfrm>
-        </p:grpSpPr>
-        <p:sp>
-          <p:nvSpPr>
-            <p:cNvPr id="6" name="TextBox 5"/>
-            <p:cNvSpPr txBox="1"/>
-            <p:nvPr userDrawn="1"/>
-          </p:nvSpPr>
-          <p:spPr>
-            <a:xfrm>
-              <a:off x="9021371" y="3931817"/>
-              <a:ext cx="2204444" cy="430887"/>
-            </a:xfrm>
-            <a:prstGeom prst="rect">
-              <a:avLst/>
-            </a:prstGeom>
-            <a:noFill/>
-          </p:spPr>
-          <p:txBody>
-            <a:bodyPr wrap="square" rtlCol="0">
-              <a:spAutoFit/>
-            </a:bodyPr>
-            <a:lstStyle/>
-            <a:p>
-              <a:r>
-                <a:rPr lang="en-US" sz="2200" dirty="0" err="1" smtClean="0">
-                  <a:solidFill>
-                    <a:schemeClr val="tx1"/>
-                  </a:solidFill>
-                  <a:latin typeface="Franklin Gothic Medium" panose="020B0603020102020204" pitchFamily="34" charset="0"/>
-                </a:rPr>
-                <a:t>Scimaritan</a:t>
-              </a:r>
-              <a:r>
-                <a:rPr lang="en-US" sz="2200" dirty="0" smtClean="0">
-                  <a:solidFill>
-                    <a:schemeClr val="tx1"/>
-                  </a:solidFill>
-                  <a:latin typeface="Franklin Gothic Medium" panose="020B0603020102020204" pitchFamily="34" charset="0"/>
-                </a:rPr>
-                <a:t>, L3C</a:t>
-              </a:r>
-              <a:endParaRPr lang="en-US" sz="2200" dirty="0">
+        </p:nvSpPr>
+        <p:spPr>
+          <a:xfrm>
+            <a:off x="1465169" y="2547908"/>
+            <a:ext cx="9144000" cy="1123416"/>
+          </a:xfrm>
+          <a:prstGeom prst="rect">
+            <a:avLst/>
+          </a:prstGeom>
+        </p:spPr>
+        <p:txBody>
+          <a:bodyPr vert="horz" lIns="91440" tIns="45720" rIns="91440" bIns="45720" rtlCol="0">
+            <a:normAutofit/>
+          </a:bodyPr>
+          <a:lstStyle>
+            <a:lvl1pPr marL="0" indent="0" algn="ctr" defTabSz="914400" rtl="0" eaLnBrk="1" latinLnBrk="0" hangingPunct="1">
+              <a:lnSpc>
+                <a:spcPct val="90000"/>
+              </a:lnSpc>
+              <a:spcBef>
+                <a:spcPts val="1000"/>
+              </a:spcBef>
+              <a:buFont typeface="Arial" panose="020B0604020202020204" pitchFamily="34" charset="0"/>
+              <a:buNone/>
+              <a:defRPr sz="2000" kern="1200">
                 <a:solidFill>
                   <a:schemeClr val="tx1"/>
                 </a:solidFill>
-                <a:latin typeface="Franklin Gothic Medium" panose="020B0603020102020204" pitchFamily="34" charset="0"/>
-              </a:endParaRPr>
-            </a:p>
-          </p:txBody>
-        </p:sp>
-        <p:pic>
-          <p:nvPicPr>
-            <p:cNvPr id="9" name="Picture 4" descr="Image result for cpra logo"/>
-            <p:cNvPicPr>
-              <a:picLocks noChangeAspect="1" noChangeArrowheads="1"/>
-            </p:cNvPicPr>
-            <p:nvPr userDrawn="1"/>
-          </p:nvPicPr>
-          <p:blipFill>
-            <a:blip r:embed="rId2">
-              <a:clrChange>
-                <a:clrFrom>
-                  <a:srgbClr val="FFFFFF"/>
-                </a:clrFrom>
-                <a:clrTo>
-                  <a:srgbClr val="FFFFFF">
-                    <a:alpha val="0"/>
-                  </a:srgbClr>
-                </a:clrTo>
-              </a:clrChange>
-              <a:extLst>
-                <a:ext uri="{28A0092B-C50C-407E-A947-70E740481C1C}">
-                  <a14:useLocalDpi xmlns:a14="http://schemas.microsoft.com/office/drawing/2010/main" val="0"/>
-                </a:ext>
-              </a:extLst>
-            </a:blip>
-            <a:srcRect/>
-            <a:stretch>
-              <a:fillRect/>
-            </a:stretch>
-          </p:blipFill>
-          <p:spPr bwMode="auto">
-            <a:xfrm>
-              <a:off x="1547158" y="3632197"/>
-              <a:ext cx="1410398" cy="1327434"/>
-            </a:xfrm>
-            <a:prstGeom prst="rect">
-              <a:avLst/>
-            </a:prstGeom>
-            <a:noFill/>
-            <a:extLst>
-              <a:ext uri="{909E8E84-426E-40DD-AFC4-6F175D3DCCD1}">
-                <a14:hiddenFill xmlns:a14="http://schemas.microsoft.com/office/drawing/2010/main">
-                  <a:solidFill>
-                    <a:srgbClr val="FFFFFF"/>
-                  </a:solidFill>
-                </a14:hiddenFill>
-              </a:ext>
-            </a:extLst>
-          </p:spPr>
-        </p:pic>
-        <p:pic>
-          <p:nvPicPr>
-            <p:cNvPr id="2" name="Picture 1"/>
-            <p:cNvPicPr>
-              <a:picLocks noChangeAspect="1"/>
-            </p:cNvPicPr>
-            <p:nvPr userDrawn="1"/>
-          </p:nvPicPr>
-          <p:blipFill>
-            <a:blip r:embed="rId3">
-              <a:clrChange>
-                <a:clrFrom>
-                  <a:srgbClr val="FFFFFF"/>
-                </a:clrFrom>
-                <a:clrTo>
-                  <a:srgbClr val="FFFFFF">
-                    <a:alpha val="0"/>
-                  </a:srgbClr>
-                </a:clrTo>
-              </a:clrChange>
-              <a:extLst>
-                <a:ext uri="{28A0092B-C50C-407E-A947-70E740481C1C}">
-                  <a14:useLocalDpi xmlns:a14="http://schemas.microsoft.com/office/drawing/2010/main" val="0"/>
-                </a:ext>
-              </a:extLst>
-            </a:blip>
-            <a:stretch>
-              <a:fillRect/>
-            </a:stretch>
-          </p:blipFill>
-          <p:spPr>
-            <a:xfrm>
-              <a:off x="3141892" y="3771813"/>
-              <a:ext cx="2640308" cy="1048202"/>
-            </a:xfrm>
-            <a:prstGeom prst="rect">
-              <a:avLst/>
-            </a:prstGeom>
-          </p:spPr>
-        </p:pic>
-        <p:pic>
-          <p:nvPicPr>
-            <p:cNvPr id="2050" name="Picture 2" descr="Image result for unc chapel hill logo"/>
-            <p:cNvPicPr>
-              <a:picLocks noChangeAspect="1" noChangeArrowheads="1"/>
-            </p:cNvPicPr>
-            <p:nvPr userDrawn="1"/>
-          </p:nvPicPr>
-          <p:blipFill>
-            <a:blip r:embed="rId4">
-              <a:extLst>
-                <a:ext uri="{28A0092B-C50C-407E-A947-70E740481C1C}">
-                  <a14:useLocalDpi xmlns:a14="http://schemas.microsoft.com/office/drawing/2010/main" val="0"/>
-                </a:ext>
-              </a:extLst>
-            </a:blip>
-            <a:srcRect/>
-            <a:stretch>
-              <a:fillRect/>
-            </a:stretch>
-          </p:blipFill>
-          <p:spPr bwMode="auto">
-            <a:xfrm>
-              <a:off x="8520855" y="5123858"/>
-              <a:ext cx="3205477" cy="882947"/>
-            </a:xfrm>
-            <a:prstGeom prst="rect">
-              <a:avLst/>
-            </a:prstGeom>
-            <a:noFill/>
-            <a:extLst>
-              <a:ext uri="{909E8E84-426E-40DD-AFC4-6F175D3DCCD1}">
-                <a14:hiddenFill xmlns:a14="http://schemas.microsoft.com/office/drawing/2010/main">
-                  <a:solidFill>
-                    <a:srgbClr val="FFFFFF"/>
-                  </a:solidFill>
-                </a14:hiddenFill>
-              </a:ext>
-            </a:extLst>
-          </p:spPr>
-        </p:pic>
-        <p:pic>
-          <p:nvPicPr>
-            <p:cNvPr id="2052" name="Picture 4" descr="Image result for lsu cct logo"/>
-            <p:cNvPicPr>
-              <a:picLocks noChangeAspect="1" noChangeArrowheads="1"/>
-            </p:cNvPicPr>
-            <p:nvPr userDrawn="1"/>
-          </p:nvPicPr>
-          <p:blipFill>
-            <a:blip r:embed="rId5">
-              <a:clrChange>
-                <a:clrFrom>
-                  <a:srgbClr val="FFFFFF"/>
-                </a:clrFrom>
-                <a:clrTo>
-                  <a:srgbClr val="FFFFFF">
-                    <a:alpha val="0"/>
-                  </a:srgbClr>
-                </a:clrTo>
-              </a:clrChange>
-              <a:extLst>
-                <a:ext uri="{28A0092B-C50C-407E-A947-70E740481C1C}">
-                  <a14:useLocalDpi xmlns:a14="http://schemas.microsoft.com/office/drawing/2010/main" val="0"/>
-                </a:ext>
-              </a:extLst>
-            </a:blip>
-            <a:srcRect/>
-            <a:stretch>
-              <a:fillRect/>
-            </a:stretch>
-          </p:blipFill>
-          <p:spPr bwMode="auto">
-            <a:xfrm>
-              <a:off x="3221074" y="5214381"/>
-              <a:ext cx="2481944" cy="1023537"/>
-            </a:xfrm>
-            <a:prstGeom prst="rect">
-              <a:avLst/>
-            </a:prstGeom>
-            <a:noFill/>
-            <a:extLst>
-              <a:ext uri="{909E8E84-426E-40DD-AFC4-6F175D3DCCD1}">
-                <a14:hiddenFill xmlns:a14="http://schemas.microsoft.com/office/drawing/2010/main">
-                  <a:solidFill>
-                    <a:srgbClr val="FFFFFF"/>
-                  </a:solidFill>
-                </a14:hiddenFill>
-              </a:ext>
-            </a:extLst>
-          </p:spPr>
-        </p:pic>
-        <p:pic>
-          <p:nvPicPr>
-            <p:cNvPr id="2058" name="Picture 10" descr="http://www.laseagrant.org/wp-content/uploads/LSG-logo-blue.jpeg"/>
-            <p:cNvPicPr>
-              <a:picLocks noChangeAspect="1" noChangeArrowheads="1"/>
-            </p:cNvPicPr>
-            <p:nvPr userDrawn="1"/>
-          </p:nvPicPr>
-          <p:blipFill>
-            <a:blip r:embed="rId6">
-              <a:clrChange>
-                <a:clrFrom>
-                  <a:srgbClr val="FFFFFF"/>
-                </a:clrFrom>
-                <a:clrTo>
-                  <a:srgbClr val="FFFFFF">
-                    <a:alpha val="0"/>
-                  </a:srgbClr>
-                </a:clrTo>
-              </a:clrChange>
-              <a:extLst>
-                <a:ext uri="{28A0092B-C50C-407E-A947-70E740481C1C}">
-                  <a14:useLocalDpi xmlns:a14="http://schemas.microsoft.com/office/drawing/2010/main" val="0"/>
-                </a:ext>
-              </a:extLst>
-            </a:blip>
-            <a:srcRect/>
-            <a:stretch>
-              <a:fillRect/>
-            </a:stretch>
-          </p:blipFill>
-          <p:spPr bwMode="auto">
-            <a:xfrm>
-              <a:off x="1475751" y="5156092"/>
-              <a:ext cx="1553213" cy="1140114"/>
-            </a:xfrm>
-            <a:prstGeom prst="rect">
-              <a:avLst/>
-            </a:prstGeom>
-            <a:noFill/>
-            <a:extLst>
-              <a:ext uri="{909E8E84-426E-40DD-AFC4-6F175D3DCCD1}">
-                <a14:hiddenFill xmlns:a14="http://schemas.microsoft.com/office/drawing/2010/main">
-                  <a:solidFill>
-                    <a:srgbClr val="FFFFFF"/>
-                  </a:solidFill>
-                </a14:hiddenFill>
-              </a:ext>
-            </a:extLst>
-          </p:spPr>
-        </p:pic>
-        <p:pic>
-          <p:nvPicPr>
-            <p:cNvPr id="1026" name="Picture 2" descr="Image result for lsu hpc"/>
-            <p:cNvPicPr>
-              <a:picLocks noChangeAspect="1" noChangeArrowheads="1"/>
-            </p:cNvPicPr>
-            <p:nvPr userDrawn="1"/>
-          </p:nvPicPr>
-          <p:blipFill rotWithShape="1">
-            <a:blip r:embed="rId7">
-              <a:clrChange>
-                <a:clrFrom>
-                  <a:srgbClr val="FFFFFF"/>
-                </a:clrFrom>
-                <a:clrTo>
-                  <a:srgbClr val="FFFFFF">
-                    <a:alpha val="0"/>
-                  </a:srgbClr>
-                </a:clrTo>
-              </a:clrChange>
-              <a:extLst>
-                <a:ext uri="{28A0092B-C50C-407E-A947-70E740481C1C}">
-                  <a14:useLocalDpi xmlns:a14="http://schemas.microsoft.com/office/drawing/2010/main" val="0"/>
-                </a:ext>
-              </a:extLst>
-            </a:blip>
-            <a:srcRect r="711"/>
-            <a:stretch/>
-          </p:blipFill>
-          <p:spPr bwMode="auto">
-            <a:xfrm>
-              <a:off x="5820075" y="5227040"/>
-              <a:ext cx="2511124" cy="998218"/>
-            </a:xfrm>
-            <a:prstGeom prst="rect">
-              <a:avLst/>
-            </a:prstGeom>
-            <a:noFill/>
-            <a:extLst>
-              <a:ext uri="{909E8E84-426E-40DD-AFC4-6F175D3DCCD1}">
-                <a14:hiddenFill xmlns:a14="http://schemas.microsoft.com/office/drawing/2010/main">
-                  <a:solidFill>
-                    <a:srgbClr val="FFFFFF"/>
-                  </a:solidFill>
-                </a14:hiddenFill>
-              </a:ext>
-            </a:extLst>
-          </p:spPr>
-        </p:pic>
-        <p:pic>
-          <p:nvPicPr>
-            <p:cNvPr id="1028" name="Picture 4" descr="Image result for lsu loni"/>
-            <p:cNvPicPr>
-              <a:picLocks noChangeAspect="1" noChangeArrowheads="1"/>
-            </p:cNvPicPr>
-            <p:nvPr userDrawn="1"/>
-          </p:nvPicPr>
-          <p:blipFill rotWithShape="1">
-            <a:blip r:embed="rId8">
-              <a:clrChange>
-                <a:clrFrom>
-                  <a:srgbClr val="FFFFFF"/>
-                </a:clrFrom>
-                <a:clrTo>
-                  <a:srgbClr val="FFFFFF">
-                    <a:alpha val="0"/>
-                  </a:srgbClr>
-                </a:clrTo>
-              </a:clrChange>
-              <a:extLst>
-                <a:ext uri="{28A0092B-C50C-407E-A947-70E740481C1C}">
-                  <a14:useLocalDpi xmlns:a14="http://schemas.microsoft.com/office/drawing/2010/main" val="0"/>
-                </a:ext>
-              </a:extLst>
-            </a:blip>
-            <a:srcRect r="60039" b="5978"/>
-            <a:stretch/>
-          </p:blipFill>
-          <p:spPr bwMode="auto">
-            <a:xfrm>
-              <a:off x="5785969" y="3652304"/>
-              <a:ext cx="2597331" cy="1287220"/>
-            </a:xfrm>
-            <a:prstGeom prst="rect">
-              <a:avLst/>
-            </a:prstGeom>
-            <a:noFill/>
-            <a:extLst>
-              <a:ext uri="{909E8E84-426E-40DD-AFC4-6F175D3DCCD1}">
-                <a14:hiddenFill xmlns:a14="http://schemas.microsoft.com/office/drawing/2010/main">
-                  <a:solidFill>
-                    <a:srgbClr val="FFFFFF"/>
-                  </a:solidFill>
-                </a14:hiddenFill>
-              </a:ext>
-            </a:extLst>
-          </p:spPr>
-        </p:pic>
-      </p:grpSp>
+                <a:latin typeface="Arial" panose="020B0604020202020204" pitchFamily="34" charset="0"/>
+                <a:ea typeface="+mn-ea"/>
+                <a:cs typeface="Arial" panose="020B0604020202020204" pitchFamily="34" charset="0"/>
+              </a:defRPr>
+            </a:lvl1pPr>
+            <a:lvl2pPr marL="457200" indent="0" algn="ctr" defTabSz="914400" rtl="0" eaLnBrk="1" latinLnBrk="0" hangingPunct="1">
+              <a:lnSpc>
+                <a:spcPct val="90000"/>
+              </a:lnSpc>
+              <a:spcBef>
+                <a:spcPts val="500"/>
+              </a:spcBef>
+              <a:buFont typeface="Arial" panose="020B0604020202020204" pitchFamily="34" charset="0"/>
+              <a:buNone/>
+              <a:defRPr sz="2000" kern="1200">
+                <a:solidFill>
+                  <a:schemeClr val="tx1"/>
+                </a:solidFill>
+                <a:latin typeface="Arial" panose="020B0604020202020204" pitchFamily="34" charset="0"/>
+                <a:ea typeface="+mn-ea"/>
+                <a:cs typeface="Arial" panose="020B0604020202020204" pitchFamily="34" charset="0"/>
+              </a:defRPr>
+            </a:lvl2pPr>
+            <a:lvl3pPr marL="914400" indent="0" algn="ctr" defTabSz="914400" rtl="0" eaLnBrk="1" latinLnBrk="0" hangingPunct="1">
+              <a:lnSpc>
+                <a:spcPct val="90000"/>
+              </a:lnSpc>
+              <a:spcBef>
+                <a:spcPts val="500"/>
+              </a:spcBef>
+              <a:buFont typeface="Arial" panose="020B0604020202020204" pitchFamily="34" charset="0"/>
+              <a:buNone/>
+              <a:defRPr sz="1800" kern="1200">
+                <a:solidFill>
+                  <a:schemeClr val="tx1"/>
+                </a:solidFill>
+                <a:latin typeface="Arial" panose="020B0604020202020204" pitchFamily="34" charset="0"/>
+                <a:ea typeface="+mn-ea"/>
+                <a:cs typeface="Arial" panose="020B0604020202020204" pitchFamily="34" charset="0"/>
+              </a:defRPr>
+            </a:lvl3pPr>
+            <a:lvl4pPr marL="1371600" indent="0" algn="ctr" defTabSz="914400" rtl="0" eaLnBrk="1" latinLnBrk="0" hangingPunct="1">
+              <a:lnSpc>
+                <a:spcPct val="90000"/>
+              </a:lnSpc>
+              <a:spcBef>
+                <a:spcPts val="500"/>
+              </a:spcBef>
+              <a:buFont typeface="Arial" panose="020B0604020202020204" pitchFamily="34" charset="0"/>
+              <a:buNone/>
+              <a:defRPr sz="1600" kern="1200">
+                <a:solidFill>
+                  <a:schemeClr val="tx1"/>
+                </a:solidFill>
+                <a:latin typeface="Arial" panose="020B0604020202020204" pitchFamily="34" charset="0"/>
+                <a:ea typeface="+mn-ea"/>
+                <a:cs typeface="Arial" panose="020B0604020202020204" pitchFamily="34" charset="0"/>
+              </a:defRPr>
+            </a:lvl4pPr>
+            <a:lvl5pPr marL="1828800" indent="0" algn="ctr" defTabSz="914400" rtl="0" eaLnBrk="1" latinLnBrk="0" hangingPunct="1">
+              <a:lnSpc>
+                <a:spcPct val="90000"/>
+              </a:lnSpc>
+              <a:spcBef>
+                <a:spcPts val="500"/>
+              </a:spcBef>
+              <a:buFont typeface="Arial" panose="020B0604020202020204" pitchFamily="34" charset="0"/>
+              <a:buNone/>
+              <a:defRPr sz="1600" kern="1200">
+                <a:solidFill>
+                  <a:schemeClr val="tx1"/>
+                </a:solidFill>
+                <a:latin typeface="Arial" panose="020B0604020202020204" pitchFamily="34" charset="0"/>
+                <a:ea typeface="+mn-ea"/>
+                <a:cs typeface="Arial" panose="020B0604020202020204" pitchFamily="34" charset="0"/>
+              </a:defRPr>
+            </a:lvl5pPr>
+            <a:lvl6pPr marL="2286000" indent="0" algn="ctr" defTabSz="914400" rtl="0" eaLnBrk="1" latinLnBrk="0" hangingPunct="1">
+              <a:lnSpc>
+                <a:spcPct val="90000"/>
+              </a:lnSpc>
+              <a:spcBef>
+                <a:spcPts val="500"/>
+              </a:spcBef>
+              <a:buFont typeface="Arial" panose="020B0604020202020204" pitchFamily="34" charset="0"/>
+              <a:buNone/>
+              <a:defRPr sz="1600" kern="1200">
+                <a:solidFill>
+                  <a:schemeClr val="tx1"/>
+                </a:solidFill>
+                <a:latin typeface="+mn-lt"/>
+                <a:ea typeface="+mn-ea"/>
+                <a:cs typeface="+mn-cs"/>
+              </a:defRPr>
+            </a:lvl6pPr>
+            <a:lvl7pPr marL="2743200" indent="0" algn="ctr" defTabSz="914400" rtl="0" eaLnBrk="1" latinLnBrk="0" hangingPunct="1">
+              <a:lnSpc>
+                <a:spcPct val="90000"/>
+              </a:lnSpc>
+              <a:spcBef>
+                <a:spcPts val="500"/>
+              </a:spcBef>
+              <a:buFont typeface="Arial" panose="020B0604020202020204" pitchFamily="34" charset="0"/>
+              <a:buNone/>
+              <a:defRPr sz="1600" kern="1200">
+                <a:solidFill>
+                  <a:schemeClr val="tx1"/>
+                </a:solidFill>
+                <a:latin typeface="+mn-lt"/>
+                <a:ea typeface="+mn-ea"/>
+                <a:cs typeface="+mn-cs"/>
+              </a:defRPr>
+            </a:lvl7pPr>
+            <a:lvl8pPr marL="3200400" indent="0" algn="ctr" defTabSz="914400" rtl="0" eaLnBrk="1" latinLnBrk="0" hangingPunct="1">
+              <a:lnSpc>
+                <a:spcPct val="90000"/>
+              </a:lnSpc>
+              <a:spcBef>
+                <a:spcPts val="500"/>
+              </a:spcBef>
+              <a:buFont typeface="Arial" panose="020B0604020202020204" pitchFamily="34" charset="0"/>
+              <a:buNone/>
+              <a:defRPr sz="1600" kern="1200">
+                <a:solidFill>
+                  <a:schemeClr val="tx1"/>
+                </a:solidFill>
+                <a:latin typeface="+mn-lt"/>
+                <a:ea typeface="+mn-ea"/>
+                <a:cs typeface="+mn-cs"/>
+              </a:defRPr>
+            </a:lvl8pPr>
+            <a:lvl9pPr marL="3657600" indent="0" algn="ctr" defTabSz="914400" rtl="0" eaLnBrk="1" latinLnBrk="0" hangingPunct="1">
+              <a:lnSpc>
+                <a:spcPct val="90000"/>
+              </a:lnSpc>
+              <a:spcBef>
+                <a:spcPts val="500"/>
+              </a:spcBef>
+              <a:buFont typeface="Arial" panose="020B0604020202020204" pitchFamily="34" charset="0"/>
+              <a:buNone/>
+              <a:defRPr sz="1600" kern="1200">
+                <a:solidFill>
+                  <a:schemeClr val="tx1"/>
+                </a:solidFill>
+                <a:latin typeface="+mn-lt"/>
+                <a:ea typeface="+mn-ea"/>
+                <a:cs typeface="+mn-cs"/>
+              </a:defRPr>
+            </a:lvl9pPr>
+          </a:lstStyle>
+          <a:p>
+            <a:r>
+              <a:rPr lang="en-US" smtClean="0"/>
+              <a:t>Click to add authors</a:t>
+            </a:r>
+            <a:endParaRPr lang="en-US" dirty="0"/>
+          </a:p>
+        </p:txBody>
+      </p:sp>
+      <p:sp>
+        <p:nvSpPr>
+          <p:cNvPr id="14" name="Subtitle 2"/>
+          <p:cNvSpPr txBox="1">
+            <a:spLocks/>
+          </p:cNvSpPr>
+          <p:nvPr userDrawn="1"/>
+        </p:nvSpPr>
+        <p:spPr>
+          <a:xfrm>
+            <a:off x="1304301" y="4376708"/>
+            <a:ext cx="9144000" cy="1123416"/>
+          </a:xfrm>
+          <a:prstGeom prst="rect">
+            <a:avLst/>
+          </a:prstGeom>
+        </p:spPr>
+        <p:txBody>
+          <a:bodyPr vert="horz" lIns="91440" tIns="45720" rIns="91440" bIns="45720" rtlCol="0">
+            <a:normAutofit/>
+          </a:bodyPr>
+          <a:lstStyle>
+            <a:lvl1pPr marL="0" indent="0" algn="ctr" defTabSz="914400" rtl="0" eaLnBrk="1" latinLnBrk="0" hangingPunct="1">
+              <a:lnSpc>
+                <a:spcPct val="90000"/>
+              </a:lnSpc>
+              <a:spcBef>
+                <a:spcPts val="1000"/>
+              </a:spcBef>
+              <a:buFont typeface="Arial" panose="020B0604020202020204" pitchFamily="34" charset="0"/>
+              <a:buNone/>
+              <a:defRPr sz="2000" kern="1200">
+                <a:solidFill>
+                  <a:schemeClr val="tx1"/>
+                </a:solidFill>
+                <a:latin typeface="Arial" panose="020B0604020202020204" pitchFamily="34" charset="0"/>
+                <a:ea typeface="+mn-ea"/>
+                <a:cs typeface="Arial" panose="020B0604020202020204" pitchFamily="34" charset="0"/>
+              </a:defRPr>
+            </a:lvl1pPr>
+            <a:lvl2pPr marL="457200" indent="0" algn="ctr" defTabSz="914400" rtl="0" eaLnBrk="1" latinLnBrk="0" hangingPunct="1">
+              <a:lnSpc>
+                <a:spcPct val="90000"/>
+              </a:lnSpc>
+              <a:spcBef>
+                <a:spcPts val="500"/>
+              </a:spcBef>
+              <a:buFont typeface="Arial" panose="020B0604020202020204" pitchFamily="34" charset="0"/>
+              <a:buNone/>
+              <a:defRPr sz="2000" kern="1200">
+                <a:solidFill>
+                  <a:schemeClr val="tx1"/>
+                </a:solidFill>
+                <a:latin typeface="Arial" panose="020B0604020202020204" pitchFamily="34" charset="0"/>
+                <a:ea typeface="+mn-ea"/>
+                <a:cs typeface="Arial" panose="020B0604020202020204" pitchFamily="34" charset="0"/>
+              </a:defRPr>
+            </a:lvl2pPr>
+            <a:lvl3pPr marL="914400" indent="0" algn="ctr" defTabSz="914400" rtl="0" eaLnBrk="1" latinLnBrk="0" hangingPunct="1">
+              <a:lnSpc>
+                <a:spcPct val="90000"/>
+              </a:lnSpc>
+              <a:spcBef>
+                <a:spcPts val="500"/>
+              </a:spcBef>
+              <a:buFont typeface="Arial" panose="020B0604020202020204" pitchFamily="34" charset="0"/>
+              <a:buNone/>
+              <a:defRPr sz="1800" kern="1200">
+                <a:solidFill>
+                  <a:schemeClr val="tx1"/>
+                </a:solidFill>
+                <a:latin typeface="Arial" panose="020B0604020202020204" pitchFamily="34" charset="0"/>
+                <a:ea typeface="+mn-ea"/>
+                <a:cs typeface="Arial" panose="020B0604020202020204" pitchFamily="34" charset="0"/>
+              </a:defRPr>
+            </a:lvl3pPr>
+            <a:lvl4pPr marL="1371600" indent="0" algn="ctr" defTabSz="914400" rtl="0" eaLnBrk="1" latinLnBrk="0" hangingPunct="1">
+              <a:lnSpc>
+                <a:spcPct val="90000"/>
+              </a:lnSpc>
+              <a:spcBef>
+                <a:spcPts val="500"/>
+              </a:spcBef>
+              <a:buFont typeface="Arial" panose="020B0604020202020204" pitchFamily="34" charset="0"/>
+              <a:buNone/>
+              <a:defRPr sz="1600" kern="1200">
+                <a:solidFill>
+                  <a:schemeClr val="tx1"/>
+                </a:solidFill>
+                <a:latin typeface="Arial" panose="020B0604020202020204" pitchFamily="34" charset="0"/>
+                <a:ea typeface="+mn-ea"/>
+                <a:cs typeface="Arial" panose="020B0604020202020204" pitchFamily="34" charset="0"/>
+              </a:defRPr>
+            </a:lvl4pPr>
+            <a:lvl5pPr marL="1828800" indent="0" algn="ctr" defTabSz="914400" rtl="0" eaLnBrk="1" latinLnBrk="0" hangingPunct="1">
+              <a:lnSpc>
+                <a:spcPct val="90000"/>
+              </a:lnSpc>
+              <a:spcBef>
+                <a:spcPts val="500"/>
+              </a:spcBef>
+              <a:buFont typeface="Arial" panose="020B0604020202020204" pitchFamily="34" charset="0"/>
+              <a:buNone/>
+              <a:defRPr sz="1600" kern="1200">
+                <a:solidFill>
+                  <a:schemeClr val="tx1"/>
+                </a:solidFill>
+                <a:latin typeface="Arial" panose="020B0604020202020204" pitchFamily="34" charset="0"/>
+                <a:ea typeface="+mn-ea"/>
+                <a:cs typeface="Arial" panose="020B0604020202020204" pitchFamily="34" charset="0"/>
+              </a:defRPr>
+            </a:lvl5pPr>
+            <a:lvl6pPr marL="2286000" indent="0" algn="ctr" defTabSz="914400" rtl="0" eaLnBrk="1" latinLnBrk="0" hangingPunct="1">
+              <a:lnSpc>
+                <a:spcPct val="90000"/>
+              </a:lnSpc>
+              <a:spcBef>
+                <a:spcPts val="500"/>
+              </a:spcBef>
+              <a:buFont typeface="Arial" panose="020B0604020202020204" pitchFamily="34" charset="0"/>
+              <a:buNone/>
+              <a:defRPr sz="1600" kern="1200">
+                <a:solidFill>
+                  <a:schemeClr val="tx1"/>
+                </a:solidFill>
+                <a:latin typeface="+mn-lt"/>
+                <a:ea typeface="+mn-ea"/>
+                <a:cs typeface="+mn-cs"/>
+              </a:defRPr>
+            </a:lvl6pPr>
+            <a:lvl7pPr marL="2743200" indent="0" algn="ctr" defTabSz="914400" rtl="0" eaLnBrk="1" latinLnBrk="0" hangingPunct="1">
+              <a:lnSpc>
+                <a:spcPct val="90000"/>
+              </a:lnSpc>
+              <a:spcBef>
+                <a:spcPts val="500"/>
+              </a:spcBef>
+              <a:buFont typeface="Arial" panose="020B0604020202020204" pitchFamily="34" charset="0"/>
+              <a:buNone/>
+              <a:defRPr sz="1600" kern="1200">
+                <a:solidFill>
+                  <a:schemeClr val="tx1"/>
+                </a:solidFill>
+                <a:latin typeface="+mn-lt"/>
+                <a:ea typeface="+mn-ea"/>
+                <a:cs typeface="+mn-cs"/>
+              </a:defRPr>
+            </a:lvl7pPr>
+            <a:lvl8pPr marL="3200400" indent="0" algn="ctr" defTabSz="914400" rtl="0" eaLnBrk="1" latinLnBrk="0" hangingPunct="1">
+              <a:lnSpc>
+                <a:spcPct val="90000"/>
+              </a:lnSpc>
+              <a:spcBef>
+                <a:spcPts val="500"/>
+              </a:spcBef>
+              <a:buFont typeface="Arial" panose="020B0604020202020204" pitchFamily="34" charset="0"/>
+              <a:buNone/>
+              <a:defRPr sz="1600" kern="1200">
+                <a:solidFill>
+                  <a:schemeClr val="tx1"/>
+                </a:solidFill>
+                <a:latin typeface="+mn-lt"/>
+                <a:ea typeface="+mn-ea"/>
+                <a:cs typeface="+mn-cs"/>
+              </a:defRPr>
+            </a:lvl8pPr>
+            <a:lvl9pPr marL="3657600" indent="0" algn="ctr" defTabSz="914400" rtl="0" eaLnBrk="1" latinLnBrk="0" hangingPunct="1">
+              <a:lnSpc>
+                <a:spcPct val="90000"/>
+              </a:lnSpc>
+              <a:spcBef>
+                <a:spcPts val="500"/>
+              </a:spcBef>
+              <a:buFont typeface="Arial" panose="020B0604020202020204" pitchFamily="34" charset="0"/>
+              <a:buNone/>
+              <a:defRPr sz="1600" kern="1200">
+                <a:solidFill>
+                  <a:schemeClr val="tx1"/>
+                </a:solidFill>
+                <a:latin typeface="+mn-lt"/>
+                <a:ea typeface="+mn-ea"/>
+                <a:cs typeface="+mn-cs"/>
+              </a:defRPr>
+            </a:lvl9pPr>
+          </a:lstStyle>
+          <a:p>
+            <a:r>
+              <a:rPr lang="en-US" dirty="0" smtClean="0"/>
+              <a:t>OFO</a:t>
+            </a:r>
+            <a:r>
+              <a:rPr lang="en-US" baseline="0" dirty="0" smtClean="0"/>
+              <a:t> STATEMENT GOES HERE</a:t>
+            </a:r>
+            <a:r>
+              <a:rPr lang="mr-IN" baseline="0" dirty="0" smtClean="0"/>
+              <a:t>…</a:t>
+            </a:r>
+            <a:endParaRPr lang="en-US" dirty="0"/>
+          </a:p>
+        </p:txBody>
+      </p:sp>
     </p:spTree>
     <p:extLst>
       <p:ext uri="{BB962C8B-B14F-4D97-AF65-F5344CB8AC3E}">
@@ -2986,6 +2986,208 @@
           </a:p>
         </p:txBody>
       </p:sp>
+      <p:sp>
+        <p:nvSpPr>
+          <p:cNvPr id="5" name="Subtitle 2"/>
+          <p:cNvSpPr txBox="1">
+            <a:spLocks/>
+          </p:cNvSpPr>
+          <p:nvPr userDrawn="1"/>
+        </p:nvSpPr>
+        <p:spPr>
+          <a:xfrm>
+            <a:off x="835571" y="6101255"/>
+            <a:ext cx="9680031" cy="756745"/>
+          </a:xfrm>
+          <a:prstGeom prst="rect">
+            <a:avLst/>
+          </a:prstGeom>
+        </p:spPr>
+        <p:txBody>
+          <a:bodyPr vert="horz" lIns="91440" tIns="45720" rIns="91440" bIns="45720" rtlCol="0">
+            <a:normAutofit/>
+          </a:bodyPr>
+          <a:lstStyle>
+            <a:lvl1pPr marL="0" indent="0" algn="ctr" defTabSz="914400" rtl="0" eaLnBrk="1" latinLnBrk="0" hangingPunct="1">
+              <a:lnSpc>
+                <a:spcPct val="90000"/>
+              </a:lnSpc>
+              <a:spcBef>
+                <a:spcPts val="1000"/>
+              </a:spcBef>
+              <a:buFont typeface="Arial" panose="020B0604020202020204" pitchFamily="34" charset="0"/>
+              <a:buNone/>
+              <a:defRPr sz="2000" kern="1200">
+                <a:solidFill>
+                  <a:schemeClr val="tx1"/>
+                </a:solidFill>
+                <a:latin typeface="Arial" panose="020B0604020202020204" pitchFamily="34" charset="0"/>
+                <a:ea typeface="+mn-ea"/>
+                <a:cs typeface="Arial" panose="020B0604020202020204" pitchFamily="34" charset="0"/>
+              </a:defRPr>
+            </a:lvl1pPr>
+            <a:lvl2pPr marL="457200" indent="0" algn="ctr" defTabSz="914400" rtl="0" eaLnBrk="1" latinLnBrk="0" hangingPunct="1">
+              <a:lnSpc>
+                <a:spcPct val="90000"/>
+              </a:lnSpc>
+              <a:spcBef>
+                <a:spcPts val="500"/>
+              </a:spcBef>
+              <a:buFont typeface="Arial" panose="020B0604020202020204" pitchFamily="34" charset="0"/>
+              <a:buNone/>
+              <a:defRPr sz="2000" kern="1200">
+                <a:solidFill>
+                  <a:schemeClr val="tx1"/>
+                </a:solidFill>
+                <a:latin typeface="Arial" panose="020B0604020202020204" pitchFamily="34" charset="0"/>
+                <a:ea typeface="+mn-ea"/>
+                <a:cs typeface="Arial" panose="020B0604020202020204" pitchFamily="34" charset="0"/>
+              </a:defRPr>
+            </a:lvl2pPr>
+            <a:lvl3pPr marL="914400" indent="0" algn="ctr" defTabSz="914400" rtl="0" eaLnBrk="1" latinLnBrk="0" hangingPunct="1">
+              <a:lnSpc>
+                <a:spcPct val="90000"/>
+              </a:lnSpc>
+              <a:spcBef>
+                <a:spcPts val="500"/>
+              </a:spcBef>
+              <a:buFont typeface="Arial" panose="020B0604020202020204" pitchFamily="34" charset="0"/>
+              <a:buNone/>
+              <a:defRPr sz="1800" kern="1200">
+                <a:solidFill>
+                  <a:schemeClr val="tx1"/>
+                </a:solidFill>
+                <a:latin typeface="Arial" panose="020B0604020202020204" pitchFamily="34" charset="0"/>
+                <a:ea typeface="+mn-ea"/>
+                <a:cs typeface="Arial" panose="020B0604020202020204" pitchFamily="34" charset="0"/>
+              </a:defRPr>
+            </a:lvl3pPr>
+            <a:lvl4pPr marL="1371600" indent="0" algn="ctr" defTabSz="914400" rtl="0" eaLnBrk="1" latinLnBrk="0" hangingPunct="1">
+              <a:lnSpc>
+                <a:spcPct val="90000"/>
+              </a:lnSpc>
+              <a:spcBef>
+                <a:spcPts val="500"/>
+              </a:spcBef>
+              <a:buFont typeface="Arial" panose="020B0604020202020204" pitchFamily="34" charset="0"/>
+              <a:buNone/>
+              <a:defRPr sz="1600" kern="1200">
+                <a:solidFill>
+                  <a:schemeClr val="tx1"/>
+                </a:solidFill>
+                <a:latin typeface="Arial" panose="020B0604020202020204" pitchFamily="34" charset="0"/>
+                <a:ea typeface="+mn-ea"/>
+                <a:cs typeface="Arial" panose="020B0604020202020204" pitchFamily="34" charset="0"/>
+              </a:defRPr>
+            </a:lvl4pPr>
+            <a:lvl5pPr marL="1828800" indent="0" algn="ctr" defTabSz="914400" rtl="0" eaLnBrk="1" latinLnBrk="0" hangingPunct="1">
+              <a:lnSpc>
+                <a:spcPct val="90000"/>
+              </a:lnSpc>
+              <a:spcBef>
+                <a:spcPts val="500"/>
+              </a:spcBef>
+              <a:buFont typeface="Arial" panose="020B0604020202020204" pitchFamily="34" charset="0"/>
+              <a:buNone/>
+              <a:defRPr sz="1600" kern="1200">
+                <a:solidFill>
+                  <a:schemeClr val="tx1"/>
+                </a:solidFill>
+                <a:latin typeface="Arial" panose="020B0604020202020204" pitchFamily="34" charset="0"/>
+                <a:ea typeface="+mn-ea"/>
+                <a:cs typeface="Arial" panose="020B0604020202020204" pitchFamily="34" charset="0"/>
+              </a:defRPr>
+            </a:lvl5pPr>
+            <a:lvl6pPr marL="2286000" indent="0" algn="ctr" defTabSz="914400" rtl="0" eaLnBrk="1" latinLnBrk="0" hangingPunct="1">
+              <a:lnSpc>
+                <a:spcPct val="90000"/>
+              </a:lnSpc>
+              <a:spcBef>
+                <a:spcPts val="500"/>
+              </a:spcBef>
+              <a:buFont typeface="Arial" panose="020B0604020202020204" pitchFamily="34" charset="0"/>
+              <a:buNone/>
+              <a:defRPr sz="1600" kern="1200">
+                <a:solidFill>
+                  <a:schemeClr val="tx1"/>
+                </a:solidFill>
+                <a:latin typeface="+mn-lt"/>
+                <a:ea typeface="+mn-ea"/>
+                <a:cs typeface="+mn-cs"/>
+              </a:defRPr>
+            </a:lvl6pPr>
+            <a:lvl7pPr marL="2743200" indent="0" algn="ctr" defTabSz="914400" rtl="0" eaLnBrk="1" latinLnBrk="0" hangingPunct="1">
+              <a:lnSpc>
+                <a:spcPct val="90000"/>
+              </a:lnSpc>
+              <a:spcBef>
+                <a:spcPts val="500"/>
+              </a:spcBef>
+              <a:buFont typeface="Arial" panose="020B0604020202020204" pitchFamily="34" charset="0"/>
+              <a:buNone/>
+              <a:defRPr sz="1600" kern="1200">
+                <a:solidFill>
+                  <a:schemeClr val="tx1"/>
+                </a:solidFill>
+                <a:latin typeface="+mn-lt"/>
+                <a:ea typeface="+mn-ea"/>
+                <a:cs typeface="+mn-cs"/>
+              </a:defRPr>
+            </a:lvl7pPr>
+            <a:lvl8pPr marL="3200400" indent="0" algn="ctr" defTabSz="914400" rtl="0" eaLnBrk="1" latinLnBrk="0" hangingPunct="1">
+              <a:lnSpc>
+                <a:spcPct val="90000"/>
+              </a:lnSpc>
+              <a:spcBef>
+                <a:spcPts val="500"/>
+              </a:spcBef>
+              <a:buFont typeface="Arial" panose="020B0604020202020204" pitchFamily="34" charset="0"/>
+              <a:buNone/>
+              <a:defRPr sz="1600" kern="1200">
+                <a:solidFill>
+                  <a:schemeClr val="tx1"/>
+                </a:solidFill>
+                <a:latin typeface="+mn-lt"/>
+                <a:ea typeface="+mn-ea"/>
+                <a:cs typeface="+mn-cs"/>
+              </a:defRPr>
+            </a:lvl8pPr>
+            <a:lvl9pPr marL="3657600" indent="0" algn="ctr" defTabSz="914400" rtl="0" eaLnBrk="1" latinLnBrk="0" hangingPunct="1">
+              <a:lnSpc>
+                <a:spcPct val="90000"/>
+              </a:lnSpc>
+              <a:spcBef>
+                <a:spcPts val="500"/>
+              </a:spcBef>
+              <a:buFont typeface="Arial" panose="020B0604020202020204" pitchFamily="34" charset="0"/>
+              <a:buNone/>
+              <a:defRPr sz="1600" kern="1200">
+                <a:solidFill>
+                  <a:schemeClr val="tx1"/>
+                </a:solidFill>
+                <a:latin typeface="+mn-lt"/>
+                <a:ea typeface="+mn-ea"/>
+                <a:cs typeface="+mn-cs"/>
+              </a:defRPr>
+            </a:lvl9pPr>
+          </a:lstStyle>
+          <a:p>
+            <a:r>
+              <a:rPr lang="en-US" dirty="0" smtClean="0"/>
+              <a:t>OFO</a:t>
+            </a:r>
+            <a:r>
+              <a:rPr lang="en-US" baseline="0" dirty="0" smtClean="0"/>
+              <a:t> STATEMENT GOES HERE</a:t>
+            </a:r>
+            <a:r>
+              <a:rPr lang="mr-IN" baseline="0" dirty="0" smtClean="0"/>
+              <a:t>…</a:t>
+            </a:r>
+            <a:endParaRPr lang="en-US" dirty="0"/>
+          </a:p>
+        </p:txBody>
+      </p:sp>
     </p:spTree>
     <p:extLst>
       <p:ext uri="{BB962C8B-B14F-4D97-AF65-F5344CB8AC3E}">
@@ -3079,6 +3281,208 @@
               <a:pPr/>
               <a:t>‹#›</a:t>
             </a:fld>
+            <a:endParaRPr lang="en-US" dirty="0"/>
+          </a:p>
+        </p:txBody>
+      </p:sp>
+      <p:sp>
+        <p:nvSpPr>
+          <p:cNvPr id="4" name="Subtitle 2"/>
+          <p:cNvSpPr txBox="1">
+            <a:spLocks/>
+          </p:cNvSpPr>
+          <p:nvPr userDrawn="1"/>
+        </p:nvSpPr>
+        <p:spPr>
+          <a:xfrm>
+            <a:off x="835571" y="6101255"/>
+            <a:ext cx="9680031" cy="756745"/>
+          </a:xfrm>
+          <a:prstGeom prst="rect">
+            <a:avLst/>
+          </a:prstGeom>
+        </p:spPr>
+        <p:txBody>
+          <a:bodyPr vert="horz" lIns="91440" tIns="45720" rIns="91440" bIns="45720" rtlCol="0">
+            <a:normAutofit/>
+          </a:bodyPr>
+          <a:lstStyle>
+            <a:lvl1pPr marL="0" indent="0" algn="ctr" defTabSz="914400" rtl="0" eaLnBrk="1" latinLnBrk="0" hangingPunct="1">
+              <a:lnSpc>
+                <a:spcPct val="90000"/>
+              </a:lnSpc>
+              <a:spcBef>
+                <a:spcPts val="1000"/>
+              </a:spcBef>
+              <a:buFont typeface="Arial" panose="020B0604020202020204" pitchFamily="34" charset="0"/>
+              <a:buNone/>
+              <a:defRPr sz="2000" kern="1200">
+                <a:solidFill>
+                  <a:schemeClr val="tx1"/>
+                </a:solidFill>
+                <a:latin typeface="Arial" panose="020B0604020202020204" pitchFamily="34" charset="0"/>
+                <a:ea typeface="+mn-ea"/>
+                <a:cs typeface="Arial" panose="020B0604020202020204" pitchFamily="34" charset="0"/>
+              </a:defRPr>
+            </a:lvl1pPr>
+            <a:lvl2pPr marL="457200" indent="0" algn="ctr" defTabSz="914400" rtl="0" eaLnBrk="1" latinLnBrk="0" hangingPunct="1">
+              <a:lnSpc>
+                <a:spcPct val="90000"/>
+              </a:lnSpc>
+              <a:spcBef>
+                <a:spcPts val="500"/>
+              </a:spcBef>
+              <a:buFont typeface="Arial" panose="020B0604020202020204" pitchFamily="34" charset="0"/>
+              <a:buNone/>
+              <a:defRPr sz="2000" kern="1200">
+                <a:solidFill>
+                  <a:schemeClr val="tx1"/>
+                </a:solidFill>
+                <a:latin typeface="Arial" panose="020B0604020202020204" pitchFamily="34" charset="0"/>
+                <a:ea typeface="+mn-ea"/>
+                <a:cs typeface="Arial" panose="020B0604020202020204" pitchFamily="34" charset="0"/>
+              </a:defRPr>
+            </a:lvl2pPr>
+            <a:lvl3pPr marL="914400" indent="0" algn="ctr" defTabSz="914400" rtl="0" eaLnBrk="1" latinLnBrk="0" hangingPunct="1">
+              <a:lnSpc>
+                <a:spcPct val="90000"/>
+              </a:lnSpc>
+              <a:spcBef>
+                <a:spcPts val="500"/>
+              </a:spcBef>
+              <a:buFont typeface="Arial" panose="020B0604020202020204" pitchFamily="34" charset="0"/>
+              <a:buNone/>
+              <a:defRPr sz="1800" kern="1200">
+                <a:solidFill>
+                  <a:schemeClr val="tx1"/>
+                </a:solidFill>
+                <a:latin typeface="Arial" panose="020B0604020202020204" pitchFamily="34" charset="0"/>
+                <a:ea typeface="+mn-ea"/>
+                <a:cs typeface="Arial" panose="020B0604020202020204" pitchFamily="34" charset="0"/>
+              </a:defRPr>
+            </a:lvl3pPr>
+            <a:lvl4pPr marL="1371600" indent="0" algn="ctr" defTabSz="914400" rtl="0" eaLnBrk="1" latinLnBrk="0" hangingPunct="1">
+              <a:lnSpc>
+                <a:spcPct val="90000"/>
+              </a:lnSpc>
+              <a:spcBef>
+                <a:spcPts val="500"/>
+              </a:spcBef>
+              <a:buFont typeface="Arial" panose="020B0604020202020204" pitchFamily="34" charset="0"/>
+              <a:buNone/>
+              <a:defRPr sz="1600" kern="1200">
+                <a:solidFill>
+                  <a:schemeClr val="tx1"/>
+                </a:solidFill>
+                <a:latin typeface="Arial" panose="020B0604020202020204" pitchFamily="34" charset="0"/>
+                <a:ea typeface="+mn-ea"/>
+                <a:cs typeface="Arial" panose="020B0604020202020204" pitchFamily="34" charset="0"/>
+              </a:defRPr>
+            </a:lvl4pPr>
+            <a:lvl5pPr marL="1828800" indent="0" algn="ctr" defTabSz="914400" rtl="0" eaLnBrk="1" latinLnBrk="0" hangingPunct="1">
+              <a:lnSpc>
+                <a:spcPct val="90000"/>
+              </a:lnSpc>
+              <a:spcBef>
+                <a:spcPts val="500"/>
+              </a:spcBef>
+              <a:buFont typeface="Arial" panose="020B0604020202020204" pitchFamily="34" charset="0"/>
+              <a:buNone/>
+              <a:defRPr sz="1600" kern="1200">
+                <a:solidFill>
+                  <a:schemeClr val="tx1"/>
+                </a:solidFill>
+                <a:latin typeface="Arial" panose="020B0604020202020204" pitchFamily="34" charset="0"/>
+                <a:ea typeface="+mn-ea"/>
+                <a:cs typeface="Arial" panose="020B0604020202020204" pitchFamily="34" charset="0"/>
+              </a:defRPr>
+            </a:lvl5pPr>
+            <a:lvl6pPr marL="2286000" indent="0" algn="ctr" defTabSz="914400" rtl="0" eaLnBrk="1" latinLnBrk="0" hangingPunct="1">
+              <a:lnSpc>
+                <a:spcPct val="90000"/>
+              </a:lnSpc>
+              <a:spcBef>
+                <a:spcPts val="500"/>
+              </a:spcBef>
+              <a:buFont typeface="Arial" panose="020B0604020202020204" pitchFamily="34" charset="0"/>
+              <a:buNone/>
+              <a:defRPr sz="1600" kern="1200">
+                <a:solidFill>
+                  <a:schemeClr val="tx1"/>
+                </a:solidFill>
+                <a:latin typeface="+mn-lt"/>
+                <a:ea typeface="+mn-ea"/>
+                <a:cs typeface="+mn-cs"/>
+              </a:defRPr>
+            </a:lvl6pPr>
+            <a:lvl7pPr marL="2743200" indent="0" algn="ctr" defTabSz="914400" rtl="0" eaLnBrk="1" latinLnBrk="0" hangingPunct="1">
+              <a:lnSpc>
+                <a:spcPct val="90000"/>
+              </a:lnSpc>
+              <a:spcBef>
+                <a:spcPts val="500"/>
+              </a:spcBef>
+              <a:buFont typeface="Arial" panose="020B0604020202020204" pitchFamily="34" charset="0"/>
+              <a:buNone/>
+              <a:defRPr sz="1600" kern="1200">
+                <a:solidFill>
+                  <a:schemeClr val="tx1"/>
+                </a:solidFill>
+                <a:latin typeface="+mn-lt"/>
+                <a:ea typeface="+mn-ea"/>
+                <a:cs typeface="+mn-cs"/>
+              </a:defRPr>
+            </a:lvl7pPr>
+            <a:lvl8pPr marL="3200400" indent="0" algn="ctr" defTabSz="914400" rtl="0" eaLnBrk="1" latinLnBrk="0" hangingPunct="1">
+              <a:lnSpc>
+                <a:spcPct val="90000"/>
+              </a:lnSpc>
+              <a:spcBef>
+                <a:spcPts val="500"/>
+              </a:spcBef>
+              <a:buFont typeface="Arial" panose="020B0604020202020204" pitchFamily="34" charset="0"/>
+              <a:buNone/>
+              <a:defRPr sz="1600" kern="1200">
+                <a:solidFill>
+                  <a:schemeClr val="tx1"/>
+                </a:solidFill>
+                <a:latin typeface="+mn-lt"/>
+                <a:ea typeface="+mn-ea"/>
+                <a:cs typeface="+mn-cs"/>
+              </a:defRPr>
+            </a:lvl8pPr>
+            <a:lvl9pPr marL="3657600" indent="0" algn="ctr" defTabSz="914400" rtl="0" eaLnBrk="1" latinLnBrk="0" hangingPunct="1">
+              <a:lnSpc>
+                <a:spcPct val="90000"/>
+              </a:lnSpc>
+              <a:spcBef>
+                <a:spcPts val="500"/>
+              </a:spcBef>
+              <a:buFont typeface="Arial" panose="020B0604020202020204" pitchFamily="34" charset="0"/>
+              <a:buNone/>
+              <a:defRPr sz="1600" kern="1200">
+                <a:solidFill>
+                  <a:schemeClr val="tx1"/>
+                </a:solidFill>
+                <a:latin typeface="+mn-lt"/>
+                <a:ea typeface="+mn-ea"/>
+                <a:cs typeface="+mn-cs"/>
+              </a:defRPr>
+            </a:lvl9pPr>
+          </a:lstStyle>
+          <a:p>
+            <a:r>
+              <a:rPr lang="en-US" dirty="0" smtClean="0"/>
+              <a:t>OFO</a:t>
+            </a:r>
+            <a:r>
+              <a:rPr lang="en-US" baseline="0" dirty="0" smtClean="0"/>
+              <a:t> STATEMENT GOES HERE</a:t>
+            </a:r>
+            <a:r>
+              <a:rPr lang="mr-IN" baseline="0" dirty="0" smtClean="0"/>
+              <a:t>…</a:t>
+            </a:r>
             <a:endParaRPr lang="en-US" dirty="0"/>
           </a:p>
         </p:txBody>

</xml_diff>

<commit_message>
Adding official use only statement. Adding slide numbers.
</commit_message>
<xml_diff>
--- a/output/cpra_postproc/LSU_template.pptx
+++ b/output/cpra_postproc/LSU_template.pptx
@@ -211,7 +211,7 @@
           <a:p>
             <a:fld id="{D844CF58-73D2-4666-AB65-9E20151AB2CE}" type="datetimeFigureOut">
               <a:rPr lang="en-US" smtClean="0"/>
-              <a:t>6/9/18</a:t>
+              <a:t>6/11/2018</a:t>
             </a:fld>
             <a:endParaRPr lang="en-US"/>
           </a:p>
@@ -376,7 +376,7 @@
           <a:p>
             <a:fld id="{A5C4824E-61BC-4FE8-B452-5DAE82D7E36E}" type="datetimeFigureOut">
               <a:rPr lang="en-US" smtClean="0"/>
-              <a:t>6/9/18</a:t>
+              <a:t>6/11/2018</a:t>
             </a:fld>
             <a:endParaRPr lang="en-US"/>
           </a:p>
@@ -779,397 +779,36 @@
       </p:sp>
       <p:sp>
         <p:nvSpPr>
-          <p:cNvPr id="13" name="Subtitle 2"/>
-          <p:cNvSpPr txBox="1">
-            <a:spLocks/>
-          </p:cNvSpPr>
-          <p:nvPr userDrawn="1"/>
-        </p:nvSpPr>
-        <p:spPr>
-          <a:xfrm>
-            <a:off x="1465169" y="2547908"/>
-            <a:ext cx="9144000" cy="1123416"/>
-          </a:xfrm>
-          <a:prstGeom prst="rect">
-            <a:avLst/>
-          </a:prstGeom>
-        </p:spPr>
-        <p:txBody>
-          <a:bodyPr vert="horz" lIns="91440" tIns="45720" rIns="91440" bIns="45720" rtlCol="0">
+          <p:cNvPr id="4" name="Text Placeholder 3"/>
+          <p:cNvSpPr>
+            <a:spLocks noGrp="1"/>
+          </p:cNvSpPr>
+          <p:nvPr>
+            <p:ph type="body" sz="quarter" idx="10"/>
+          </p:nvPr>
+        </p:nvSpPr>
+        <p:spPr>
+          <a:xfrm>
+            <a:off x="1304301" y="4224338"/>
+            <a:ext cx="9211299" cy="1127125"/>
+          </a:xfrm>
+        </p:spPr>
+        <p:txBody>
+          <a:bodyPr>
             <a:normAutofit/>
           </a:bodyPr>
           <a:lstStyle>
-            <a:lvl1pPr marL="0" indent="0" algn="ctr" defTabSz="914400" rtl="0" eaLnBrk="1" latinLnBrk="0" hangingPunct="1">
-              <a:lnSpc>
-                <a:spcPct val="90000"/>
-              </a:lnSpc>
-              <a:spcBef>
-                <a:spcPts val="1000"/>
-              </a:spcBef>
-              <a:buFont typeface="Arial" panose="020B0604020202020204" pitchFamily="34" charset="0"/>
-              <a:buNone/>
-              <a:defRPr sz="2000" kern="1200">
-                <a:solidFill>
-                  <a:schemeClr val="tx1"/>
-                </a:solidFill>
-                <a:latin typeface="Arial" panose="020B0604020202020204" pitchFamily="34" charset="0"/>
-                <a:ea typeface="+mn-ea"/>
-                <a:cs typeface="Arial" panose="020B0604020202020204" pitchFamily="34" charset="0"/>
-              </a:defRPr>
+            <a:lvl1pPr marL="0" indent="0" algn="ctr">
+              <a:buNone/>
+              <a:defRPr sz="2000" i="1"/>
             </a:lvl1pPr>
-            <a:lvl2pPr marL="457200" indent="0" algn="ctr" defTabSz="914400" rtl="0" eaLnBrk="1" latinLnBrk="0" hangingPunct="1">
-              <a:lnSpc>
-                <a:spcPct val="90000"/>
-              </a:lnSpc>
-              <a:spcBef>
-                <a:spcPts val="500"/>
-              </a:spcBef>
-              <a:buFont typeface="Arial" panose="020B0604020202020204" pitchFamily="34" charset="0"/>
-              <a:buNone/>
-              <a:defRPr sz="2000" kern="1200">
-                <a:solidFill>
-                  <a:schemeClr val="tx1"/>
-                </a:solidFill>
-                <a:latin typeface="Arial" panose="020B0604020202020204" pitchFamily="34" charset="0"/>
-                <a:ea typeface="+mn-ea"/>
-                <a:cs typeface="Arial" panose="020B0604020202020204" pitchFamily="34" charset="0"/>
-              </a:defRPr>
-            </a:lvl2pPr>
-            <a:lvl3pPr marL="914400" indent="0" algn="ctr" defTabSz="914400" rtl="0" eaLnBrk="1" latinLnBrk="0" hangingPunct="1">
-              <a:lnSpc>
-                <a:spcPct val="90000"/>
-              </a:lnSpc>
-              <a:spcBef>
-                <a:spcPts val="500"/>
-              </a:spcBef>
-              <a:buFont typeface="Arial" panose="020B0604020202020204" pitchFamily="34" charset="0"/>
-              <a:buNone/>
-              <a:defRPr sz="1800" kern="1200">
-                <a:solidFill>
-                  <a:schemeClr val="tx1"/>
-                </a:solidFill>
-                <a:latin typeface="Arial" panose="020B0604020202020204" pitchFamily="34" charset="0"/>
-                <a:ea typeface="+mn-ea"/>
-                <a:cs typeface="Arial" panose="020B0604020202020204" pitchFamily="34" charset="0"/>
-              </a:defRPr>
-            </a:lvl3pPr>
-            <a:lvl4pPr marL="1371600" indent="0" algn="ctr" defTabSz="914400" rtl="0" eaLnBrk="1" latinLnBrk="0" hangingPunct="1">
-              <a:lnSpc>
-                <a:spcPct val="90000"/>
-              </a:lnSpc>
-              <a:spcBef>
-                <a:spcPts val="500"/>
-              </a:spcBef>
-              <a:buFont typeface="Arial" panose="020B0604020202020204" pitchFamily="34" charset="0"/>
-              <a:buNone/>
-              <a:defRPr sz="1600" kern="1200">
-                <a:solidFill>
-                  <a:schemeClr val="tx1"/>
-                </a:solidFill>
-                <a:latin typeface="Arial" panose="020B0604020202020204" pitchFamily="34" charset="0"/>
-                <a:ea typeface="+mn-ea"/>
-                <a:cs typeface="Arial" panose="020B0604020202020204" pitchFamily="34" charset="0"/>
-              </a:defRPr>
-            </a:lvl4pPr>
-            <a:lvl5pPr marL="1828800" indent="0" algn="ctr" defTabSz="914400" rtl="0" eaLnBrk="1" latinLnBrk="0" hangingPunct="1">
-              <a:lnSpc>
-                <a:spcPct val="90000"/>
-              </a:lnSpc>
-              <a:spcBef>
-                <a:spcPts val="500"/>
-              </a:spcBef>
-              <a:buFont typeface="Arial" panose="020B0604020202020204" pitchFamily="34" charset="0"/>
-              <a:buNone/>
-              <a:defRPr sz="1600" kern="1200">
-                <a:solidFill>
-                  <a:schemeClr val="tx1"/>
-                </a:solidFill>
-                <a:latin typeface="Arial" panose="020B0604020202020204" pitchFamily="34" charset="0"/>
-                <a:ea typeface="+mn-ea"/>
-                <a:cs typeface="Arial" panose="020B0604020202020204" pitchFamily="34" charset="0"/>
-              </a:defRPr>
-            </a:lvl5pPr>
-            <a:lvl6pPr marL="2286000" indent="0" algn="ctr" defTabSz="914400" rtl="0" eaLnBrk="1" latinLnBrk="0" hangingPunct="1">
-              <a:lnSpc>
-                <a:spcPct val="90000"/>
-              </a:lnSpc>
-              <a:spcBef>
-                <a:spcPts val="500"/>
-              </a:spcBef>
-              <a:buFont typeface="Arial" panose="020B0604020202020204" pitchFamily="34" charset="0"/>
-              <a:buNone/>
-              <a:defRPr sz="1600" kern="1200">
-                <a:solidFill>
-                  <a:schemeClr val="tx1"/>
-                </a:solidFill>
-                <a:latin typeface="+mn-lt"/>
-                <a:ea typeface="+mn-ea"/>
-                <a:cs typeface="+mn-cs"/>
-              </a:defRPr>
-            </a:lvl6pPr>
-            <a:lvl7pPr marL="2743200" indent="0" algn="ctr" defTabSz="914400" rtl="0" eaLnBrk="1" latinLnBrk="0" hangingPunct="1">
-              <a:lnSpc>
-                <a:spcPct val="90000"/>
-              </a:lnSpc>
-              <a:spcBef>
-                <a:spcPts val="500"/>
-              </a:spcBef>
-              <a:buFont typeface="Arial" panose="020B0604020202020204" pitchFamily="34" charset="0"/>
-              <a:buNone/>
-              <a:defRPr sz="1600" kern="1200">
-                <a:solidFill>
-                  <a:schemeClr val="tx1"/>
-                </a:solidFill>
-                <a:latin typeface="+mn-lt"/>
-                <a:ea typeface="+mn-ea"/>
-                <a:cs typeface="+mn-cs"/>
-              </a:defRPr>
-            </a:lvl7pPr>
-            <a:lvl8pPr marL="3200400" indent="0" algn="ctr" defTabSz="914400" rtl="0" eaLnBrk="1" latinLnBrk="0" hangingPunct="1">
-              <a:lnSpc>
-                <a:spcPct val="90000"/>
-              </a:lnSpc>
-              <a:spcBef>
-                <a:spcPts val="500"/>
-              </a:spcBef>
-              <a:buFont typeface="Arial" panose="020B0604020202020204" pitchFamily="34" charset="0"/>
-              <a:buNone/>
-              <a:defRPr sz="1600" kern="1200">
-                <a:solidFill>
-                  <a:schemeClr val="tx1"/>
-                </a:solidFill>
-                <a:latin typeface="+mn-lt"/>
-                <a:ea typeface="+mn-ea"/>
-                <a:cs typeface="+mn-cs"/>
-              </a:defRPr>
-            </a:lvl8pPr>
-            <a:lvl9pPr marL="3657600" indent="0" algn="ctr" defTabSz="914400" rtl="0" eaLnBrk="1" latinLnBrk="0" hangingPunct="1">
-              <a:lnSpc>
-                <a:spcPct val="90000"/>
-              </a:lnSpc>
-              <a:spcBef>
-                <a:spcPts val="500"/>
-              </a:spcBef>
-              <a:buFont typeface="Arial" panose="020B0604020202020204" pitchFamily="34" charset="0"/>
-              <a:buNone/>
-              <a:defRPr sz="1600" kern="1200">
-                <a:solidFill>
-                  <a:schemeClr val="tx1"/>
-                </a:solidFill>
-                <a:latin typeface="+mn-lt"/>
-                <a:ea typeface="+mn-ea"/>
-                <a:cs typeface="+mn-cs"/>
-              </a:defRPr>
-            </a:lvl9pPr>
           </a:lstStyle>
           <a:p>
-            <a:r>
-              <a:rPr lang="en-US" smtClean="0"/>
-              <a:t>Click to add authors</a:t>
-            </a:r>
-            <a:endParaRPr lang="en-US" dirty="0"/>
-          </a:p>
-        </p:txBody>
-      </p:sp>
-      <p:sp>
-        <p:nvSpPr>
-          <p:cNvPr id="14" name="Subtitle 2"/>
-          <p:cNvSpPr txBox="1">
-            <a:spLocks/>
-          </p:cNvSpPr>
-          <p:nvPr userDrawn="1"/>
-        </p:nvSpPr>
-        <p:spPr>
-          <a:xfrm>
-            <a:off x="1304301" y="4376708"/>
-            <a:ext cx="9144000" cy="1123416"/>
-          </a:xfrm>
-          <a:prstGeom prst="rect">
-            <a:avLst/>
-          </a:prstGeom>
-        </p:spPr>
-        <p:txBody>
-          <a:bodyPr vert="horz" lIns="91440" tIns="45720" rIns="91440" bIns="45720" rtlCol="0">
-            <a:normAutofit/>
-          </a:bodyPr>
-          <a:lstStyle>
-            <a:lvl1pPr marL="0" indent="0" algn="ctr" defTabSz="914400" rtl="0" eaLnBrk="1" latinLnBrk="0" hangingPunct="1">
-              <a:lnSpc>
-                <a:spcPct val="90000"/>
-              </a:lnSpc>
-              <a:spcBef>
-                <a:spcPts val="1000"/>
-              </a:spcBef>
-              <a:buFont typeface="Arial" panose="020B0604020202020204" pitchFamily="34" charset="0"/>
-              <a:buNone/>
-              <a:defRPr sz="2000" kern="1200">
-                <a:solidFill>
-                  <a:schemeClr val="tx1"/>
-                </a:solidFill>
-                <a:latin typeface="Arial" panose="020B0604020202020204" pitchFamily="34" charset="0"/>
-                <a:ea typeface="+mn-ea"/>
-                <a:cs typeface="Arial" panose="020B0604020202020204" pitchFamily="34" charset="0"/>
-              </a:defRPr>
-            </a:lvl1pPr>
-            <a:lvl2pPr marL="457200" indent="0" algn="ctr" defTabSz="914400" rtl="0" eaLnBrk="1" latinLnBrk="0" hangingPunct="1">
-              <a:lnSpc>
-                <a:spcPct val="90000"/>
-              </a:lnSpc>
-              <a:spcBef>
-                <a:spcPts val="500"/>
-              </a:spcBef>
-              <a:buFont typeface="Arial" panose="020B0604020202020204" pitchFamily="34" charset="0"/>
-              <a:buNone/>
-              <a:defRPr sz="2000" kern="1200">
-                <a:solidFill>
-                  <a:schemeClr val="tx1"/>
-                </a:solidFill>
-                <a:latin typeface="Arial" panose="020B0604020202020204" pitchFamily="34" charset="0"/>
-                <a:ea typeface="+mn-ea"/>
-                <a:cs typeface="Arial" panose="020B0604020202020204" pitchFamily="34" charset="0"/>
-              </a:defRPr>
-            </a:lvl2pPr>
-            <a:lvl3pPr marL="914400" indent="0" algn="ctr" defTabSz="914400" rtl="0" eaLnBrk="1" latinLnBrk="0" hangingPunct="1">
-              <a:lnSpc>
-                <a:spcPct val="90000"/>
-              </a:lnSpc>
-              <a:spcBef>
-                <a:spcPts val="500"/>
-              </a:spcBef>
-              <a:buFont typeface="Arial" panose="020B0604020202020204" pitchFamily="34" charset="0"/>
-              <a:buNone/>
-              <a:defRPr sz="1800" kern="1200">
-                <a:solidFill>
-                  <a:schemeClr val="tx1"/>
-                </a:solidFill>
-                <a:latin typeface="Arial" panose="020B0604020202020204" pitchFamily="34" charset="0"/>
-                <a:ea typeface="+mn-ea"/>
-                <a:cs typeface="Arial" panose="020B0604020202020204" pitchFamily="34" charset="0"/>
-              </a:defRPr>
-            </a:lvl3pPr>
-            <a:lvl4pPr marL="1371600" indent="0" algn="ctr" defTabSz="914400" rtl="0" eaLnBrk="1" latinLnBrk="0" hangingPunct="1">
-              <a:lnSpc>
-                <a:spcPct val="90000"/>
-              </a:lnSpc>
-              <a:spcBef>
-                <a:spcPts val="500"/>
-              </a:spcBef>
-              <a:buFont typeface="Arial" panose="020B0604020202020204" pitchFamily="34" charset="0"/>
-              <a:buNone/>
-              <a:defRPr sz="1600" kern="1200">
-                <a:solidFill>
-                  <a:schemeClr val="tx1"/>
-                </a:solidFill>
-                <a:latin typeface="Arial" panose="020B0604020202020204" pitchFamily="34" charset="0"/>
-                <a:ea typeface="+mn-ea"/>
-                <a:cs typeface="Arial" panose="020B0604020202020204" pitchFamily="34" charset="0"/>
-              </a:defRPr>
-            </a:lvl4pPr>
-            <a:lvl5pPr marL="1828800" indent="0" algn="ctr" defTabSz="914400" rtl="0" eaLnBrk="1" latinLnBrk="0" hangingPunct="1">
-              <a:lnSpc>
-                <a:spcPct val="90000"/>
-              </a:lnSpc>
-              <a:spcBef>
-                <a:spcPts val="500"/>
-              </a:spcBef>
-              <a:buFont typeface="Arial" panose="020B0604020202020204" pitchFamily="34" charset="0"/>
-              <a:buNone/>
-              <a:defRPr sz="1600" kern="1200">
-                <a:solidFill>
-                  <a:schemeClr val="tx1"/>
-                </a:solidFill>
-                <a:latin typeface="Arial" panose="020B0604020202020204" pitchFamily="34" charset="0"/>
-                <a:ea typeface="+mn-ea"/>
-                <a:cs typeface="Arial" panose="020B0604020202020204" pitchFamily="34" charset="0"/>
-              </a:defRPr>
-            </a:lvl5pPr>
-            <a:lvl6pPr marL="2286000" indent="0" algn="ctr" defTabSz="914400" rtl="0" eaLnBrk="1" latinLnBrk="0" hangingPunct="1">
-              <a:lnSpc>
-                <a:spcPct val="90000"/>
-              </a:lnSpc>
-              <a:spcBef>
-                <a:spcPts val="500"/>
-              </a:spcBef>
-              <a:buFont typeface="Arial" panose="020B0604020202020204" pitchFamily="34" charset="0"/>
-              <a:buNone/>
-              <a:defRPr sz="1600" kern="1200">
-                <a:solidFill>
-                  <a:schemeClr val="tx1"/>
-                </a:solidFill>
-                <a:latin typeface="+mn-lt"/>
-                <a:ea typeface="+mn-ea"/>
-                <a:cs typeface="+mn-cs"/>
-              </a:defRPr>
-            </a:lvl6pPr>
-            <a:lvl7pPr marL="2743200" indent="0" algn="ctr" defTabSz="914400" rtl="0" eaLnBrk="1" latinLnBrk="0" hangingPunct="1">
-              <a:lnSpc>
-                <a:spcPct val="90000"/>
-              </a:lnSpc>
-              <a:spcBef>
-                <a:spcPts val="500"/>
-              </a:spcBef>
-              <a:buFont typeface="Arial" panose="020B0604020202020204" pitchFamily="34" charset="0"/>
-              <a:buNone/>
-              <a:defRPr sz="1600" kern="1200">
-                <a:solidFill>
-                  <a:schemeClr val="tx1"/>
-                </a:solidFill>
-                <a:latin typeface="+mn-lt"/>
-                <a:ea typeface="+mn-ea"/>
-                <a:cs typeface="+mn-cs"/>
-              </a:defRPr>
-            </a:lvl7pPr>
-            <a:lvl8pPr marL="3200400" indent="0" algn="ctr" defTabSz="914400" rtl="0" eaLnBrk="1" latinLnBrk="0" hangingPunct="1">
-              <a:lnSpc>
-                <a:spcPct val="90000"/>
-              </a:lnSpc>
-              <a:spcBef>
-                <a:spcPts val="500"/>
-              </a:spcBef>
-              <a:buFont typeface="Arial" panose="020B0604020202020204" pitchFamily="34" charset="0"/>
-              <a:buNone/>
-              <a:defRPr sz="1600" kern="1200">
-                <a:solidFill>
-                  <a:schemeClr val="tx1"/>
-                </a:solidFill>
-                <a:latin typeface="+mn-lt"/>
-                <a:ea typeface="+mn-ea"/>
-                <a:cs typeface="+mn-cs"/>
-              </a:defRPr>
-            </a:lvl8pPr>
-            <a:lvl9pPr marL="3657600" indent="0" algn="ctr" defTabSz="914400" rtl="0" eaLnBrk="1" latinLnBrk="0" hangingPunct="1">
-              <a:lnSpc>
-                <a:spcPct val="90000"/>
-              </a:lnSpc>
-              <a:spcBef>
-                <a:spcPts val="500"/>
-              </a:spcBef>
-              <a:buFont typeface="Arial" panose="020B0604020202020204" pitchFamily="34" charset="0"/>
-              <a:buNone/>
-              <a:defRPr sz="1600" kern="1200">
-                <a:solidFill>
-                  <a:schemeClr val="tx1"/>
-                </a:solidFill>
-                <a:latin typeface="+mn-lt"/>
-                <a:ea typeface="+mn-ea"/>
-                <a:cs typeface="+mn-cs"/>
-              </a:defRPr>
-            </a:lvl9pPr>
-          </a:lstStyle>
-          <a:p>
+            <a:pPr lvl="0"/>
             <a:r>
               <a:rPr lang="en-US" dirty="0" smtClean="0"/>
-              <a:t>OFO</a:t>
-            </a:r>
-            <a:r>
-              <a:rPr lang="en-US" baseline="0" dirty="0" smtClean="0"/>
-              <a:t> STATEMENT GOES HERE</a:t>
-            </a:r>
-            <a:r>
-              <a:rPr lang="mr-IN" baseline="0" dirty="0" smtClean="0"/>
-              <a:t>…</a:t>
-            </a:r>
-            <a:endParaRPr lang="en-US" dirty="0"/>
+              <a:t>Edit Master text styles</a:t>
+            </a:r>
           </a:p>
         </p:txBody>
       </p:sp>
@@ -1951,42 +1590,6 @@
           </a:p>
         </p:txBody>
       </p:sp>
-      <p:sp>
-        <p:nvSpPr>
-          <p:cNvPr id="12" name="Slide Number Placeholder 5"/>
-          <p:cNvSpPr>
-            <a:spLocks noGrp="1"/>
-          </p:cNvSpPr>
-          <p:nvPr>
-            <p:ph type="sldNum" sz="quarter" idx="12"/>
-          </p:nvPr>
-        </p:nvSpPr>
-        <p:spPr>
-          <a:xfrm>
-            <a:off x="10539230" y="6437847"/>
-            <a:ext cx="1578429" cy="365125"/>
-          </a:xfrm>
-          <a:prstGeom prst="rect">
-            <a:avLst/>
-          </a:prstGeom>
-        </p:spPr>
-        <p:txBody>
-          <a:bodyPr/>
-          <a:lstStyle>
-            <a:lvl1pPr algn="r">
-              <a:defRPr/>
-            </a:lvl1pPr>
-          </a:lstStyle>
-          <a:p>
-            <a:fld id="{9138CEF9-5D5B-4151-AB46-3590332F1DB6}" type="slidenum">
-              <a:rPr lang="en-US" smtClean="0"/>
-              <a:pPr/>
-              <a:t>‹#›</a:t>
-            </a:fld>
-            <a:endParaRPr lang="en-US" dirty="0"/>
-          </a:p>
-        </p:txBody>
-      </p:sp>
     </p:spTree>
     <p:extLst>
       <p:ext uri="{BB962C8B-B14F-4D97-AF65-F5344CB8AC3E}">
@@ -2175,42 +1778,6 @@
           </a:p>
         </p:txBody>
       </p:sp>
-      <p:sp>
-        <p:nvSpPr>
-          <p:cNvPr id="9" name="Slide Number Placeholder 5"/>
-          <p:cNvSpPr>
-            <a:spLocks noGrp="1"/>
-          </p:cNvSpPr>
-          <p:nvPr>
-            <p:ph type="sldNum" sz="quarter" idx="12"/>
-          </p:nvPr>
-        </p:nvSpPr>
-        <p:spPr>
-          <a:xfrm>
-            <a:off x="10515602" y="6378580"/>
-            <a:ext cx="1578429" cy="365125"/>
-          </a:xfrm>
-          <a:prstGeom prst="rect">
-            <a:avLst/>
-          </a:prstGeom>
-        </p:spPr>
-        <p:txBody>
-          <a:bodyPr/>
-          <a:lstStyle>
-            <a:lvl1pPr algn="r">
-              <a:defRPr/>
-            </a:lvl1pPr>
-          </a:lstStyle>
-          <a:p>
-            <a:fld id="{9138CEF9-5D5B-4151-AB46-3590332F1DB6}" type="slidenum">
-              <a:rPr lang="en-US" smtClean="0"/>
-              <a:pPr/>
-              <a:t>‹#›</a:t>
-            </a:fld>
-            <a:endParaRPr lang="en-US" dirty="0"/>
-          </a:p>
-        </p:txBody>
-      </p:sp>
     </p:spTree>
     <p:extLst>
       <p:ext uri="{BB962C8B-B14F-4D97-AF65-F5344CB8AC3E}">
@@ -2888,38 +2455,6 @@
       </p:sp>
       <p:sp>
         <p:nvSpPr>
-          <p:cNvPr id="8" name="Slide Number Placeholder 5"/>
-          <p:cNvSpPr>
-            <a:spLocks noGrp="1"/>
-          </p:cNvSpPr>
-          <p:nvPr>
-            <p:ph type="sldNum" sz="quarter" idx="12"/>
-          </p:nvPr>
-        </p:nvSpPr>
-        <p:spPr>
-          <a:xfrm>
-            <a:off x="10515602" y="6378580"/>
-            <a:ext cx="1578429" cy="365125"/>
-          </a:xfrm>
-          <a:prstGeom prst="rect">
-            <a:avLst/>
-          </a:prstGeom>
-        </p:spPr>
-        <p:txBody>
-          <a:bodyPr/>
-          <a:lstStyle/>
-          <a:p>
-            <a:fld id="{9138CEF9-5D5B-4151-AB46-3590332F1DB6}" type="slidenum">
-              <a:rPr lang="en-US" smtClean="0"/>
-              <a:pPr/>
-              <a:t>‹#›</a:t>
-            </a:fld>
-            <a:endParaRPr lang="en-US" dirty="0"/>
-          </a:p>
-        </p:txBody>
-      </p:sp>
-      <p:sp>
-        <p:nvSpPr>
           <p:cNvPr id="4" name="Subtitle 2"/>
           <p:cNvSpPr>
             <a:spLocks noGrp="1"/>
@@ -2988,203 +2523,83 @@
       </p:sp>
       <p:sp>
         <p:nvSpPr>
-          <p:cNvPr id="5" name="Subtitle 2"/>
-          <p:cNvSpPr txBox="1">
-            <a:spLocks/>
-          </p:cNvSpPr>
-          <p:nvPr userDrawn="1"/>
-        </p:nvSpPr>
-        <p:spPr>
-          <a:xfrm>
-            <a:off x="835571" y="6101255"/>
-            <a:ext cx="9680031" cy="756745"/>
-          </a:xfrm>
-          <a:prstGeom prst="rect">
-            <a:avLst/>
-          </a:prstGeom>
-        </p:spPr>
-        <p:txBody>
-          <a:bodyPr vert="horz" lIns="91440" tIns="45720" rIns="91440" bIns="45720" rtlCol="0">
+          <p:cNvPr id="6" name="Text Placeholder 5"/>
+          <p:cNvSpPr>
+            <a:spLocks noGrp="1"/>
+          </p:cNvSpPr>
+          <p:nvPr>
+            <p:ph type="body" sz="quarter" idx="13"/>
+          </p:nvPr>
+        </p:nvSpPr>
+        <p:spPr>
+          <a:xfrm>
+            <a:off x="643467" y="5943600"/>
+            <a:ext cx="8568266" cy="914400"/>
+          </a:xfrm>
+        </p:spPr>
+        <p:txBody>
+          <a:bodyPr>
             <a:normAutofit/>
           </a:bodyPr>
           <a:lstStyle>
-            <a:lvl1pPr marL="0" indent="0" algn="ctr" defTabSz="914400" rtl="0" eaLnBrk="1" latinLnBrk="0" hangingPunct="1">
+            <a:lvl1pPr marL="0" indent="0" algn="l">
               <a:lnSpc>
-                <a:spcPct val="90000"/>
-              </a:lnSpc>
-              <a:spcBef>
-                <a:spcPts val="1000"/>
-              </a:spcBef>
-              <a:buFont typeface="Arial" panose="020B0604020202020204" pitchFamily="34" charset="0"/>
-              <a:buNone/>
-              <a:defRPr sz="2000" kern="1200">
-                <a:solidFill>
-                  <a:schemeClr val="tx1"/>
-                </a:solidFill>
-                <a:latin typeface="Arial" panose="020B0604020202020204" pitchFamily="34" charset="0"/>
-                <a:ea typeface="+mn-ea"/>
-                <a:cs typeface="Arial" panose="020B0604020202020204" pitchFamily="34" charset="0"/>
-              </a:defRPr>
-            </a:lvl1pPr>
-            <a:lvl2pPr marL="457200" indent="0" algn="ctr" defTabSz="914400" rtl="0" eaLnBrk="1" latinLnBrk="0" hangingPunct="1">
-              <a:lnSpc>
-                <a:spcPct val="90000"/>
+                <a:spcPct val="100000"/>
               </a:lnSpc>
               <a:spcBef>
                 <a:spcPts val="500"/>
               </a:spcBef>
-              <a:buFont typeface="Arial" panose="020B0604020202020204" pitchFamily="34" charset="0"/>
-              <a:buNone/>
-              <a:defRPr sz="2000" kern="1200">
-                <a:solidFill>
-                  <a:schemeClr val="tx1"/>
-                </a:solidFill>
-                <a:latin typeface="Arial" panose="020B0604020202020204" pitchFamily="34" charset="0"/>
-                <a:ea typeface="+mn-ea"/>
-                <a:cs typeface="Arial" panose="020B0604020202020204" pitchFamily="34" charset="0"/>
-              </a:defRPr>
-            </a:lvl2pPr>
-            <a:lvl3pPr marL="914400" indent="0" algn="ctr" defTabSz="914400" rtl="0" eaLnBrk="1" latinLnBrk="0" hangingPunct="1">
+              <a:buNone/>
+              <a:defRPr sz="1400" i="1"/>
+            </a:lvl1pPr>
+          </a:lstStyle>
+          <a:p>
+            <a:pPr lvl="0"/>
+            <a:r>
+              <a:rPr lang="en-US" dirty="0" smtClean="0"/>
+              <a:t>Edit Master text styles</a:t>
+            </a:r>
+          </a:p>
+        </p:txBody>
+      </p:sp>
+      <p:sp>
+        <p:nvSpPr>
+          <p:cNvPr id="7" name="Text Placeholder 5"/>
+          <p:cNvSpPr>
+            <a:spLocks noGrp="1"/>
+          </p:cNvSpPr>
+          <p:nvPr>
+            <p:ph type="body" sz="quarter" idx="14" hasCustomPrompt="1"/>
+          </p:nvPr>
+        </p:nvSpPr>
+        <p:spPr>
+          <a:xfrm>
+            <a:off x="11421532" y="6510866"/>
+            <a:ext cx="770468" cy="347134"/>
+          </a:xfrm>
+        </p:spPr>
+        <p:txBody>
+          <a:bodyPr>
+            <a:normAutofit/>
+          </a:bodyPr>
+          <a:lstStyle>
+            <a:lvl1pPr marL="0" indent="0" algn="r">
               <a:lnSpc>
-                <a:spcPct val="90000"/>
+                <a:spcPct val="100000"/>
               </a:lnSpc>
               <a:spcBef>
                 <a:spcPts val="500"/>
               </a:spcBef>
-              <a:buFont typeface="Arial" panose="020B0604020202020204" pitchFamily="34" charset="0"/>
-              <a:buNone/>
-              <a:defRPr sz="1800" kern="1200">
-                <a:solidFill>
-                  <a:schemeClr val="tx1"/>
-                </a:solidFill>
-                <a:latin typeface="Arial" panose="020B0604020202020204" pitchFamily="34" charset="0"/>
-                <a:ea typeface="+mn-ea"/>
-                <a:cs typeface="Arial" panose="020B0604020202020204" pitchFamily="34" charset="0"/>
-              </a:defRPr>
-            </a:lvl3pPr>
-            <a:lvl4pPr marL="1371600" indent="0" algn="ctr" defTabSz="914400" rtl="0" eaLnBrk="1" latinLnBrk="0" hangingPunct="1">
-              <a:lnSpc>
-                <a:spcPct val="90000"/>
-              </a:lnSpc>
-              <a:spcBef>
-                <a:spcPts val="500"/>
-              </a:spcBef>
-              <a:buFont typeface="Arial" panose="020B0604020202020204" pitchFamily="34" charset="0"/>
-              <a:buNone/>
-              <a:defRPr sz="1600" kern="1200">
-                <a:solidFill>
-                  <a:schemeClr val="tx1"/>
-                </a:solidFill>
-                <a:latin typeface="Arial" panose="020B0604020202020204" pitchFamily="34" charset="0"/>
-                <a:ea typeface="+mn-ea"/>
-                <a:cs typeface="Arial" panose="020B0604020202020204" pitchFamily="34" charset="0"/>
-              </a:defRPr>
-            </a:lvl4pPr>
-            <a:lvl5pPr marL="1828800" indent="0" algn="ctr" defTabSz="914400" rtl="0" eaLnBrk="1" latinLnBrk="0" hangingPunct="1">
-              <a:lnSpc>
-                <a:spcPct val="90000"/>
-              </a:lnSpc>
-              <a:spcBef>
-                <a:spcPts val="500"/>
-              </a:spcBef>
-              <a:buFont typeface="Arial" panose="020B0604020202020204" pitchFamily="34" charset="0"/>
-              <a:buNone/>
-              <a:defRPr sz="1600" kern="1200">
-                <a:solidFill>
-                  <a:schemeClr val="tx1"/>
-                </a:solidFill>
-                <a:latin typeface="Arial" panose="020B0604020202020204" pitchFamily="34" charset="0"/>
-                <a:ea typeface="+mn-ea"/>
-                <a:cs typeface="Arial" panose="020B0604020202020204" pitchFamily="34" charset="0"/>
-              </a:defRPr>
-            </a:lvl5pPr>
-            <a:lvl6pPr marL="2286000" indent="0" algn="ctr" defTabSz="914400" rtl="0" eaLnBrk="1" latinLnBrk="0" hangingPunct="1">
-              <a:lnSpc>
-                <a:spcPct val="90000"/>
-              </a:lnSpc>
-              <a:spcBef>
-                <a:spcPts val="500"/>
-              </a:spcBef>
-              <a:buFont typeface="Arial" panose="020B0604020202020204" pitchFamily="34" charset="0"/>
-              <a:buNone/>
-              <a:defRPr sz="1600" kern="1200">
-                <a:solidFill>
-                  <a:schemeClr val="tx1"/>
-                </a:solidFill>
-                <a:latin typeface="+mn-lt"/>
-                <a:ea typeface="+mn-ea"/>
-                <a:cs typeface="+mn-cs"/>
-              </a:defRPr>
-            </a:lvl6pPr>
-            <a:lvl7pPr marL="2743200" indent="0" algn="ctr" defTabSz="914400" rtl="0" eaLnBrk="1" latinLnBrk="0" hangingPunct="1">
-              <a:lnSpc>
-                <a:spcPct val="90000"/>
-              </a:lnSpc>
-              <a:spcBef>
-                <a:spcPts val="500"/>
-              </a:spcBef>
-              <a:buFont typeface="Arial" panose="020B0604020202020204" pitchFamily="34" charset="0"/>
-              <a:buNone/>
-              <a:defRPr sz="1600" kern="1200">
-                <a:solidFill>
-                  <a:schemeClr val="tx1"/>
-                </a:solidFill>
-                <a:latin typeface="+mn-lt"/>
-                <a:ea typeface="+mn-ea"/>
-                <a:cs typeface="+mn-cs"/>
-              </a:defRPr>
-            </a:lvl7pPr>
-            <a:lvl8pPr marL="3200400" indent="0" algn="ctr" defTabSz="914400" rtl="0" eaLnBrk="1" latinLnBrk="0" hangingPunct="1">
-              <a:lnSpc>
-                <a:spcPct val="90000"/>
-              </a:lnSpc>
-              <a:spcBef>
-                <a:spcPts val="500"/>
-              </a:spcBef>
-              <a:buFont typeface="Arial" panose="020B0604020202020204" pitchFamily="34" charset="0"/>
-              <a:buNone/>
-              <a:defRPr sz="1600" kern="1200">
-                <a:solidFill>
-                  <a:schemeClr val="tx1"/>
-                </a:solidFill>
-                <a:latin typeface="+mn-lt"/>
-                <a:ea typeface="+mn-ea"/>
-                <a:cs typeface="+mn-cs"/>
-              </a:defRPr>
-            </a:lvl8pPr>
-            <a:lvl9pPr marL="3657600" indent="0" algn="ctr" defTabSz="914400" rtl="0" eaLnBrk="1" latinLnBrk="0" hangingPunct="1">
-              <a:lnSpc>
-                <a:spcPct val="90000"/>
-              </a:lnSpc>
-              <a:spcBef>
-                <a:spcPts val="500"/>
-              </a:spcBef>
-              <a:buFont typeface="Arial" panose="020B0604020202020204" pitchFamily="34" charset="0"/>
-              <a:buNone/>
-              <a:defRPr sz="1600" kern="1200">
-                <a:solidFill>
-                  <a:schemeClr val="tx1"/>
-                </a:solidFill>
-                <a:latin typeface="+mn-lt"/>
-                <a:ea typeface="+mn-ea"/>
-                <a:cs typeface="+mn-cs"/>
-              </a:defRPr>
-            </a:lvl9pPr>
+              <a:buNone/>
+              <a:defRPr sz="1400" i="1"/>
+            </a:lvl1pPr>
           </a:lstStyle>
           <a:p>
+            <a:pPr lvl="0"/>
             <a:r>
               <a:rPr lang="en-US" dirty="0" smtClean="0"/>
-              <a:t>OFO</a:t>
-            </a:r>
-            <a:r>
-              <a:rPr lang="en-US" baseline="0" dirty="0" smtClean="0"/>
-              <a:t> STATEMENT GOES HERE</a:t>
-            </a:r>
-            <a:r>
-              <a:rPr lang="mr-IN" baseline="0" dirty="0" smtClean="0"/>
-              <a:t>…</a:t>
-            </a:r>
-            <a:endParaRPr lang="en-US" dirty="0"/>
+              <a:t>Slide #</a:t>
+            </a:r>
           </a:p>
         </p:txBody>
       </p:sp>
@@ -3255,235 +2670,83 @@
       </p:sp>
       <p:sp>
         <p:nvSpPr>
-          <p:cNvPr id="8" name="Slide Number Placeholder 5"/>
-          <p:cNvSpPr>
-            <a:spLocks noGrp="1"/>
-          </p:cNvSpPr>
-          <p:nvPr>
-            <p:ph type="sldNum" sz="quarter" idx="12"/>
-          </p:nvPr>
-        </p:nvSpPr>
-        <p:spPr>
-          <a:xfrm>
-            <a:off x="10515602" y="6378580"/>
-            <a:ext cx="1578429" cy="365125"/>
-          </a:xfrm>
-          <a:prstGeom prst="rect">
-            <a:avLst/>
-          </a:prstGeom>
-        </p:spPr>
-        <p:txBody>
-          <a:bodyPr/>
-          <a:lstStyle/>
-          <a:p>
-            <a:fld id="{9138CEF9-5D5B-4151-AB46-3590332F1DB6}" type="slidenum">
-              <a:rPr lang="en-US" smtClean="0"/>
-              <a:pPr/>
-              <a:t>‹#›</a:t>
-            </a:fld>
-            <a:endParaRPr lang="en-US" dirty="0"/>
-          </a:p>
-        </p:txBody>
-      </p:sp>
-      <p:sp>
-        <p:nvSpPr>
-          <p:cNvPr id="4" name="Subtitle 2"/>
-          <p:cNvSpPr txBox="1">
-            <a:spLocks/>
-          </p:cNvSpPr>
-          <p:nvPr userDrawn="1"/>
-        </p:nvSpPr>
-        <p:spPr>
-          <a:xfrm>
-            <a:off x="835571" y="6101255"/>
-            <a:ext cx="9680031" cy="756745"/>
-          </a:xfrm>
-          <a:prstGeom prst="rect">
-            <a:avLst/>
-          </a:prstGeom>
-        </p:spPr>
-        <p:txBody>
-          <a:bodyPr vert="horz" lIns="91440" tIns="45720" rIns="91440" bIns="45720" rtlCol="0">
+          <p:cNvPr id="4" name="Text Placeholder 5"/>
+          <p:cNvSpPr>
+            <a:spLocks noGrp="1"/>
+          </p:cNvSpPr>
+          <p:nvPr>
+            <p:ph type="body" sz="quarter" idx="13"/>
+          </p:nvPr>
+        </p:nvSpPr>
+        <p:spPr>
+          <a:xfrm>
+            <a:off x="643467" y="5943600"/>
+            <a:ext cx="8568266" cy="914400"/>
+          </a:xfrm>
+        </p:spPr>
+        <p:txBody>
+          <a:bodyPr>
             <a:normAutofit/>
           </a:bodyPr>
           <a:lstStyle>
-            <a:lvl1pPr marL="0" indent="0" algn="ctr" defTabSz="914400" rtl="0" eaLnBrk="1" latinLnBrk="0" hangingPunct="1">
+            <a:lvl1pPr marL="0" indent="0" algn="l">
               <a:lnSpc>
-                <a:spcPct val="90000"/>
-              </a:lnSpc>
-              <a:spcBef>
-                <a:spcPts val="1000"/>
-              </a:spcBef>
-              <a:buFont typeface="Arial" panose="020B0604020202020204" pitchFamily="34" charset="0"/>
-              <a:buNone/>
-              <a:defRPr sz="2000" kern="1200">
-                <a:solidFill>
-                  <a:schemeClr val="tx1"/>
-                </a:solidFill>
-                <a:latin typeface="Arial" panose="020B0604020202020204" pitchFamily="34" charset="0"/>
-                <a:ea typeface="+mn-ea"/>
-                <a:cs typeface="Arial" panose="020B0604020202020204" pitchFamily="34" charset="0"/>
-              </a:defRPr>
-            </a:lvl1pPr>
-            <a:lvl2pPr marL="457200" indent="0" algn="ctr" defTabSz="914400" rtl="0" eaLnBrk="1" latinLnBrk="0" hangingPunct="1">
-              <a:lnSpc>
-                <a:spcPct val="90000"/>
+                <a:spcPct val="100000"/>
               </a:lnSpc>
               <a:spcBef>
                 <a:spcPts val="500"/>
               </a:spcBef>
-              <a:buFont typeface="Arial" panose="020B0604020202020204" pitchFamily="34" charset="0"/>
-              <a:buNone/>
-              <a:defRPr sz="2000" kern="1200">
-                <a:solidFill>
-                  <a:schemeClr val="tx1"/>
-                </a:solidFill>
-                <a:latin typeface="Arial" panose="020B0604020202020204" pitchFamily="34" charset="0"/>
-                <a:ea typeface="+mn-ea"/>
-                <a:cs typeface="Arial" panose="020B0604020202020204" pitchFamily="34" charset="0"/>
-              </a:defRPr>
-            </a:lvl2pPr>
-            <a:lvl3pPr marL="914400" indent="0" algn="ctr" defTabSz="914400" rtl="0" eaLnBrk="1" latinLnBrk="0" hangingPunct="1">
+              <a:buNone/>
+              <a:defRPr sz="1400" i="1"/>
+            </a:lvl1pPr>
+          </a:lstStyle>
+          <a:p>
+            <a:pPr lvl="0"/>
+            <a:r>
+              <a:rPr lang="en-US" dirty="0" smtClean="0"/>
+              <a:t>Edit Master text styles</a:t>
+            </a:r>
+          </a:p>
+        </p:txBody>
+      </p:sp>
+      <p:sp>
+        <p:nvSpPr>
+          <p:cNvPr id="5" name="Text Placeholder 5"/>
+          <p:cNvSpPr>
+            <a:spLocks noGrp="1"/>
+          </p:cNvSpPr>
+          <p:nvPr>
+            <p:ph type="body" sz="quarter" idx="14" hasCustomPrompt="1"/>
+          </p:nvPr>
+        </p:nvSpPr>
+        <p:spPr>
+          <a:xfrm>
+            <a:off x="11421532" y="6510866"/>
+            <a:ext cx="770468" cy="347134"/>
+          </a:xfrm>
+        </p:spPr>
+        <p:txBody>
+          <a:bodyPr>
+            <a:normAutofit/>
+          </a:bodyPr>
+          <a:lstStyle>
+            <a:lvl1pPr marL="0" indent="0" algn="r">
               <a:lnSpc>
-                <a:spcPct val="90000"/>
+                <a:spcPct val="100000"/>
               </a:lnSpc>
               <a:spcBef>
                 <a:spcPts val="500"/>
               </a:spcBef>
-              <a:buFont typeface="Arial" panose="020B0604020202020204" pitchFamily="34" charset="0"/>
-              <a:buNone/>
-              <a:defRPr sz="1800" kern="1200">
-                <a:solidFill>
-                  <a:schemeClr val="tx1"/>
-                </a:solidFill>
-                <a:latin typeface="Arial" panose="020B0604020202020204" pitchFamily="34" charset="0"/>
-                <a:ea typeface="+mn-ea"/>
-                <a:cs typeface="Arial" panose="020B0604020202020204" pitchFamily="34" charset="0"/>
-              </a:defRPr>
-            </a:lvl3pPr>
-            <a:lvl4pPr marL="1371600" indent="0" algn="ctr" defTabSz="914400" rtl="0" eaLnBrk="1" latinLnBrk="0" hangingPunct="1">
-              <a:lnSpc>
-                <a:spcPct val="90000"/>
-              </a:lnSpc>
-              <a:spcBef>
-                <a:spcPts val="500"/>
-              </a:spcBef>
-              <a:buFont typeface="Arial" panose="020B0604020202020204" pitchFamily="34" charset="0"/>
-              <a:buNone/>
-              <a:defRPr sz="1600" kern="1200">
-                <a:solidFill>
-                  <a:schemeClr val="tx1"/>
-                </a:solidFill>
-                <a:latin typeface="Arial" panose="020B0604020202020204" pitchFamily="34" charset="0"/>
-                <a:ea typeface="+mn-ea"/>
-                <a:cs typeface="Arial" panose="020B0604020202020204" pitchFamily="34" charset="0"/>
-              </a:defRPr>
-            </a:lvl4pPr>
-            <a:lvl5pPr marL="1828800" indent="0" algn="ctr" defTabSz="914400" rtl="0" eaLnBrk="1" latinLnBrk="0" hangingPunct="1">
-              <a:lnSpc>
-                <a:spcPct val="90000"/>
-              </a:lnSpc>
-              <a:spcBef>
-                <a:spcPts val="500"/>
-              </a:spcBef>
-              <a:buFont typeface="Arial" panose="020B0604020202020204" pitchFamily="34" charset="0"/>
-              <a:buNone/>
-              <a:defRPr sz="1600" kern="1200">
-                <a:solidFill>
-                  <a:schemeClr val="tx1"/>
-                </a:solidFill>
-                <a:latin typeface="Arial" panose="020B0604020202020204" pitchFamily="34" charset="0"/>
-                <a:ea typeface="+mn-ea"/>
-                <a:cs typeface="Arial" panose="020B0604020202020204" pitchFamily="34" charset="0"/>
-              </a:defRPr>
-            </a:lvl5pPr>
-            <a:lvl6pPr marL="2286000" indent="0" algn="ctr" defTabSz="914400" rtl="0" eaLnBrk="1" latinLnBrk="0" hangingPunct="1">
-              <a:lnSpc>
-                <a:spcPct val="90000"/>
-              </a:lnSpc>
-              <a:spcBef>
-                <a:spcPts val="500"/>
-              </a:spcBef>
-              <a:buFont typeface="Arial" panose="020B0604020202020204" pitchFamily="34" charset="0"/>
-              <a:buNone/>
-              <a:defRPr sz="1600" kern="1200">
-                <a:solidFill>
-                  <a:schemeClr val="tx1"/>
-                </a:solidFill>
-                <a:latin typeface="+mn-lt"/>
-                <a:ea typeface="+mn-ea"/>
-                <a:cs typeface="+mn-cs"/>
-              </a:defRPr>
-            </a:lvl6pPr>
-            <a:lvl7pPr marL="2743200" indent="0" algn="ctr" defTabSz="914400" rtl="0" eaLnBrk="1" latinLnBrk="0" hangingPunct="1">
-              <a:lnSpc>
-                <a:spcPct val="90000"/>
-              </a:lnSpc>
-              <a:spcBef>
-                <a:spcPts val="500"/>
-              </a:spcBef>
-              <a:buFont typeface="Arial" panose="020B0604020202020204" pitchFamily="34" charset="0"/>
-              <a:buNone/>
-              <a:defRPr sz="1600" kern="1200">
-                <a:solidFill>
-                  <a:schemeClr val="tx1"/>
-                </a:solidFill>
-                <a:latin typeface="+mn-lt"/>
-                <a:ea typeface="+mn-ea"/>
-                <a:cs typeface="+mn-cs"/>
-              </a:defRPr>
-            </a:lvl7pPr>
-            <a:lvl8pPr marL="3200400" indent="0" algn="ctr" defTabSz="914400" rtl="0" eaLnBrk="1" latinLnBrk="0" hangingPunct="1">
-              <a:lnSpc>
-                <a:spcPct val="90000"/>
-              </a:lnSpc>
-              <a:spcBef>
-                <a:spcPts val="500"/>
-              </a:spcBef>
-              <a:buFont typeface="Arial" panose="020B0604020202020204" pitchFamily="34" charset="0"/>
-              <a:buNone/>
-              <a:defRPr sz="1600" kern="1200">
-                <a:solidFill>
-                  <a:schemeClr val="tx1"/>
-                </a:solidFill>
-                <a:latin typeface="+mn-lt"/>
-                <a:ea typeface="+mn-ea"/>
-                <a:cs typeface="+mn-cs"/>
-              </a:defRPr>
-            </a:lvl8pPr>
-            <a:lvl9pPr marL="3657600" indent="0" algn="ctr" defTabSz="914400" rtl="0" eaLnBrk="1" latinLnBrk="0" hangingPunct="1">
-              <a:lnSpc>
-                <a:spcPct val="90000"/>
-              </a:lnSpc>
-              <a:spcBef>
-                <a:spcPts val="500"/>
-              </a:spcBef>
-              <a:buFont typeface="Arial" panose="020B0604020202020204" pitchFamily="34" charset="0"/>
-              <a:buNone/>
-              <a:defRPr sz="1600" kern="1200">
-                <a:solidFill>
-                  <a:schemeClr val="tx1"/>
-                </a:solidFill>
-                <a:latin typeface="+mn-lt"/>
-                <a:ea typeface="+mn-ea"/>
-                <a:cs typeface="+mn-cs"/>
-              </a:defRPr>
-            </a:lvl9pPr>
+              <a:buNone/>
+              <a:defRPr sz="1400" i="1"/>
+            </a:lvl1pPr>
           </a:lstStyle>
           <a:p>
+            <a:pPr lvl="0"/>
             <a:r>
               <a:rPr lang="en-US" dirty="0" smtClean="0"/>
-              <a:t>OFO</a:t>
-            </a:r>
-            <a:r>
-              <a:rPr lang="en-US" baseline="0" dirty="0" smtClean="0"/>
-              <a:t> STATEMENT GOES HERE</a:t>
-            </a:r>
-            <a:r>
-              <a:rPr lang="mr-IN" baseline="0" dirty="0" smtClean="0"/>
-              <a:t>…</a:t>
-            </a:r>
-            <a:endParaRPr lang="en-US" dirty="0"/>
+              <a:t>Slide #</a:t>
+            </a:r>
           </a:p>
         </p:txBody>
       </p:sp>
@@ -4036,42 +3299,6 @@
       </p:sp>
       <p:sp>
         <p:nvSpPr>
-          <p:cNvPr id="13" name="Slide Number Placeholder 5"/>
-          <p:cNvSpPr>
-            <a:spLocks noGrp="1"/>
-          </p:cNvSpPr>
-          <p:nvPr>
-            <p:ph type="sldNum" sz="quarter" idx="4"/>
-          </p:nvPr>
-        </p:nvSpPr>
-        <p:spPr>
-          <a:xfrm>
-            <a:off x="10515602" y="6378575"/>
-            <a:ext cx="1578429" cy="365125"/>
-          </a:xfrm>
-          <a:prstGeom prst="rect">
-            <a:avLst/>
-          </a:prstGeom>
-        </p:spPr>
-        <p:txBody>
-          <a:bodyPr/>
-          <a:lstStyle>
-            <a:lvl1pPr algn="r">
-              <a:defRPr/>
-            </a:lvl1pPr>
-          </a:lstStyle>
-          <a:p>
-            <a:fld id="{9138CEF9-5D5B-4151-AB46-3590332F1DB6}" type="slidenum">
-              <a:rPr lang="en-US" smtClean="0"/>
-              <a:pPr/>
-              <a:t>‹#›</a:t>
-            </a:fld>
-            <a:endParaRPr lang="en-US" dirty="0"/>
-          </a:p>
-        </p:txBody>
-      </p:sp>
-      <p:sp>
-        <p:nvSpPr>
           <p:cNvPr id="2" name="Title Placeholder 1"/>
           <p:cNvSpPr>
             <a:spLocks noGrp="1"/>
@@ -4132,7 +3359,7 @@
       </p:par>
     </p:tnLst>
   </p:timing>
-  <p:hf hdr="0" dt="0"/>
+  <p:hf sldNum="0" hdr="0" ftr="0" dt="0"/>
   <p:txStyles>
     <p:titleStyle>
       <a:lvl1pPr algn="l" defTabSz="914400" rtl="0" eaLnBrk="1" latinLnBrk="0" hangingPunct="1">

</xml_diff>

<commit_message>
Updating CPRA disclaimer for PPT slide deck.
</commit_message>
<xml_diff>
--- a/output/cpra_postproc/LSU_template.pptx
+++ b/output/cpra_postproc/LSU_template.pptx
@@ -211,7 +211,7 @@
           <a:p>
             <a:fld id="{D844CF58-73D2-4666-AB65-9E20151AB2CE}" type="datetimeFigureOut">
               <a:rPr lang="en-US" smtClean="0"/>
-              <a:t>6/11/2018</a:t>
+              <a:t>7/9/2018</a:t>
             </a:fld>
             <a:endParaRPr lang="en-US"/>
           </a:p>
@@ -376,7 +376,7 @@
           <a:p>
             <a:fld id="{A5C4824E-61BC-4FE8-B452-5DAE82D7E36E}" type="datetimeFigureOut">
               <a:rPr lang="en-US" smtClean="0"/>
-              <a:t>6/11/2018</a:t>
+              <a:t>7/9/2018</a:t>
             </a:fld>
             <a:endParaRPr lang="en-US"/>
           </a:p>
@@ -833,6 +833,288 @@
 </file>
 
 <file path=ppt/slideLayouts/slideLayout10.xml><?xml version="1.0" encoding="utf-8"?>
+<p:sldLayout xmlns:a="http://schemas.openxmlformats.org/drawingml/2006/main" xmlns:r="http://schemas.openxmlformats.org/officeDocument/2006/relationships" xmlns:p="http://schemas.openxmlformats.org/presentationml/2006/main" type="objTx" preserve="1">
+  <p:cSld name="Content with Caption">
+    <p:spTree>
+      <p:nvGrpSpPr>
+        <p:cNvPr id="1" name=""/>
+        <p:cNvGrpSpPr/>
+        <p:nvPr/>
+      </p:nvGrpSpPr>
+      <p:grpSpPr>
+        <a:xfrm>
+          <a:off x="0" y="0"/>
+          <a:ext cx="0" cy="0"/>
+          <a:chOff x="0" y="0"/>
+          <a:chExt cx="0" cy="0"/>
+        </a:xfrm>
+      </p:grpSpPr>
+      <p:sp>
+        <p:nvSpPr>
+          <p:cNvPr id="2" name="Title 1"/>
+          <p:cNvSpPr>
+            <a:spLocks noGrp="1"/>
+          </p:cNvSpPr>
+          <p:nvPr>
+            <p:ph type="title"/>
+          </p:nvPr>
+        </p:nvSpPr>
+        <p:spPr>
+          <a:xfrm>
+            <a:off x="839788" y="457200"/>
+            <a:ext cx="3932237" cy="1600200"/>
+          </a:xfrm>
+        </p:spPr>
+        <p:txBody>
+          <a:bodyPr anchor="b"/>
+          <a:lstStyle>
+            <a:lvl1pPr>
+              <a:defRPr sz="3200"/>
+            </a:lvl1pPr>
+          </a:lstStyle>
+          <a:p>
+            <a:r>
+              <a:rPr lang="en-US" smtClean="0"/>
+              <a:t>Click to edit Master title style</a:t>
+            </a:r>
+            <a:endParaRPr lang="en-US"/>
+          </a:p>
+        </p:txBody>
+      </p:sp>
+      <p:sp>
+        <p:nvSpPr>
+          <p:cNvPr id="3" name="Content Placeholder 2"/>
+          <p:cNvSpPr>
+            <a:spLocks noGrp="1"/>
+          </p:cNvSpPr>
+          <p:nvPr>
+            <p:ph idx="1"/>
+          </p:nvPr>
+        </p:nvSpPr>
+        <p:spPr>
+          <a:xfrm>
+            <a:off x="5183188" y="987425"/>
+            <a:ext cx="6172200" cy="4873625"/>
+          </a:xfrm>
+        </p:spPr>
+        <p:txBody>
+          <a:bodyPr/>
+          <a:lstStyle>
+            <a:lvl1pPr>
+              <a:defRPr sz="3200"/>
+            </a:lvl1pPr>
+            <a:lvl2pPr>
+              <a:defRPr sz="2800"/>
+            </a:lvl2pPr>
+            <a:lvl3pPr>
+              <a:defRPr sz="2400"/>
+            </a:lvl3pPr>
+            <a:lvl4pPr>
+              <a:defRPr sz="2000"/>
+            </a:lvl4pPr>
+            <a:lvl5pPr>
+              <a:defRPr sz="2000"/>
+            </a:lvl5pPr>
+            <a:lvl6pPr>
+              <a:defRPr sz="2000"/>
+            </a:lvl6pPr>
+            <a:lvl7pPr>
+              <a:defRPr sz="2000"/>
+            </a:lvl7pPr>
+            <a:lvl8pPr>
+              <a:defRPr sz="2000"/>
+            </a:lvl8pPr>
+            <a:lvl9pPr>
+              <a:defRPr sz="2000"/>
+            </a:lvl9pPr>
+          </a:lstStyle>
+          <a:p>
+            <a:pPr lvl="0"/>
+            <a:r>
+              <a:rPr lang="en-US" smtClean="0"/>
+              <a:t>Click to edit Master text styles</a:t>
+            </a:r>
+          </a:p>
+          <a:p>
+            <a:pPr lvl="1"/>
+            <a:r>
+              <a:rPr lang="en-US" smtClean="0"/>
+              <a:t>Second level</a:t>
+            </a:r>
+          </a:p>
+          <a:p>
+            <a:pPr lvl="2"/>
+            <a:r>
+              <a:rPr lang="en-US" smtClean="0"/>
+              <a:t>Third level</a:t>
+            </a:r>
+          </a:p>
+          <a:p>
+            <a:pPr lvl="3"/>
+            <a:r>
+              <a:rPr lang="en-US" smtClean="0"/>
+              <a:t>Fourth level</a:t>
+            </a:r>
+          </a:p>
+          <a:p>
+            <a:pPr lvl="4"/>
+            <a:r>
+              <a:rPr lang="en-US" smtClean="0"/>
+              <a:t>Fifth level</a:t>
+            </a:r>
+            <a:endParaRPr lang="en-US"/>
+          </a:p>
+        </p:txBody>
+      </p:sp>
+      <p:sp>
+        <p:nvSpPr>
+          <p:cNvPr id="4" name="Text Placeholder 3"/>
+          <p:cNvSpPr>
+            <a:spLocks noGrp="1"/>
+          </p:cNvSpPr>
+          <p:nvPr>
+            <p:ph type="body" sz="half" idx="2"/>
+          </p:nvPr>
+        </p:nvSpPr>
+        <p:spPr>
+          <a:xfrm>
+            <a:off x="839788" y="2057400"/>
+            <a:ext cx="3932237" cy="3811588"/>
+          </a:xfrm>
+        </p:spPr>
+        <p:txBody>
+          <a:bodyPr/>
+          <a:lstStyle>
+            <a:lvl1pPr marL="0" indent="0">
+              <a:buNone/>
+              <a:defRPr sz="1600"/>
+            </a:lvl1pPr>
+            <a:lvl2pPr marL="457200" indent="0">
+              <a:buNone/>
+              <a:defRPr sz="1400"/>
+            </a:lvl2pPr>
+            <a:lvl3pPr marL="914400" indent="0">
+              <a:buNone/>
+              <a:defRPr sz="1200"/>
+            </a:lvl3pPr>
+            <a:lvl4pPr marL="1371600" indent="0">
+              <a:buNone/>
+              <a:defRPr sz="1000"/>
+            </a:lvl4pPr>
+            <a:lvl5pPr marL="1828800" indent="0">
+              <a:buNone/>
+              <a:defRPr sz="1000"/>
+            </a:lvl5pPr>
+            <a:lvl6pPr marL="2286000" indent="0">
+              <a:buNone/>
+              <a:defRPr sz="1000"/>
+            </a:lvl6pPr>
+            <a:lvl7pPr marL="2743200" indent="0">
+              <a:buNone/>
+              <a:defRPr sz="1000"/>
+            </a:lvl7pPr>
+            <a:lvl8pPr marL="3200400" indent="0">
+              <a:buNone/>
+              <a:defRPr sz="1000"/>
+            </a:lvl8pPr>
+            <a:lvl9pPr marL="3657600" indent="0">
+              <a:buNone/>
+              <a:defRPr sz="1000"/>
+            </a:lvl9pPr>
+          </a:lstStyle>
+          <a:p>
+            <a:pPr lvl="0"/>
+            <a:r>
+              <a:rPr lang="en-US" smtClean="0"/>
+              <a:t>Click to edit Master text styles</a:t>
+            </a:r>
+          </a:p>
+        </p:txBody>
+      </p:sp>
+      <p:sp>
+        <p:nvSpPr>
+          <p:cNvPr id="8" name="Date Placeholder 3"/>
+          <p:cNvSpPr>
+            <a:spLocks noGrp="1"/>
+          </p:cNvSpPr>
+          <p:nvPr>
+            <p:ph type="dt" sz="half" idx="10"/>
+          </p:nvPr>
+        </p:nvSpPr>
+        <p:spPr>
+          <a:xfrm>
+            <a:off x="57150" y="6378580"/>
+            <a:ext cx="2743200" cy="365125"/>
+          </a:xfrm>
+          <a:prstGeom prst="rect">
+            <a:avLst/>
+          </a:prstGeom>
+        </p:spPr>
+        <p:txBody>
+          <a:bodyPr/>
+          <a:lstStyle>
+            <a:lvl1pPr>
+              <a:defRPr/>
+            </a:lvl1pPr>
+          </a:lstStyle>
+          <a:p>
+            <a:endParaRPr lang="en-US" dirty="0"/>
+          </a:p>
+        </p:txBody>
+      </p:sp>
+      <p:sp>
+        <p:nvSpPr>
+          <p:cNvPr id="10" name="Slide Number Placeholder 5"/>
+          <p:cNvSpPr>
+            <a:spLocks noGrp="1"/>
+          </p:cNvSpPr>
+          <p:nvPr>
+            <p:ph type="sldNum" sz="quarter" idx="12"/>
+          </p:nvPr>
+        </p:nvSpPr>
+        <p:spPr>
+          <a:xfrm>
+            <a:off x="10515602" y="6378580"/>
+            <a:ext cx="1578429" cy="365125"/>
+          </a:xfrm>
+          <a:prstGeom prst="rect">
+            <a:avLst/>
+          </a:prstGeom>
+        </p:spPr>
+        <p:txBody>
+          <a:bodyPr/>
+          <a:lstStyle/>
+          <a:p>
+            <a:fld id="{9138CEF9-5D5B-4151-AB46-3590332F1DB6}" type="slidenum">
+              <a:rPr lang="en-US" smtClean="0"/>
+              <a:pPr/>
+              <a:t>‹#›</a:t>
+            </a:fld>
+            <a:endParaRPr lang="en-US" dirty="0"/>
+          </a:p>
+        </p:txBody>
+      </p:sp>
+    </p:spTree>
+    <p:extLst>
+      <p:ext uri="{BB962C8B-B14F-4D97-AF65-F5344CB8AC3E}">
+        <p14:creationId xmlns:p14="http://schemas.microsoft.com/office/powerpoint/2010/main" val="2139077687"/>
+      </p:ext>
+    </p:extLst>
+  </p:cSld>
+  <p:clrMapOvr>
+    <a:masterClrMapping/>
+  </p:clrMapOvr>
+  <p:timing>
+    <p:tnLst>
+      <p:par>
+        <p:cTn id="1" dur="indefinite" restart="never" nodeType="tmRoot"/>
+      </p:par>
+    </p:tnLst>
+  </p:timing>
+</p:sldLayout>
+</file>
+
+<file path=ppt/slideLayouts/slideLayout11.xml><?xml version="1.0" encoding="utf-8"?>
 <p:sldLayout xmlns:a="http://schemas.openxmlformats.org/drawingml/2006/main" xmlns:r="http://schemas.openxmlformats.org/officeDocument/2006/relationships" xmlns:p="http://schemas.openxmlformats.org/presentationml/2006/main" type="picTx" preserve="1">
   <p:cSld name="Picture with Caption">
     <p:spTree>
@@ -1094,7 +1376,7 @@
 </p:sldLayout>
 </file>
 
-<file path=ppt/slideLayouts/slideLayout11.xml><?xml version="1.0" encoding="utf-8"?>
+<file path=ppt/slideLayouts/slideLayout12.xml><?xml version="1.0" encoding="utf-8"?>
 <p:sldLayout xmlns:a="http://schemas.openxmlformats.org/drawingml/2006/main" xmlns:r="http://schemas.openxmlformats.org/officeDocument/2006/relationships" xmlns:p="http://schemas.openxmlformats.org/presentationml/2006/main" type="vertTx" preserve="1">
   <p:cSld name="Title and Vertical Text">
     <p:spTree>
@@ -1274,7 +1556,7 @@
 </p:sldLayout>
 </file>
 
-<file path=ppt/slideLayouts/slideLayout12.xml><?xml version="1.0" encoding="utf-8"?>
+<file path=ppt/slideLayouts/slideLayout13.xml><?xml version="1.0" encoding="utf-8"?>
 <p:sldLayout xmlns:a="http://schemas.openxmlformats.org/drawingml/2006/main" xmlns:r="http://schemas.openxmlformats.org/officeDocument/2006/relationships" xmlns:p="http://schemas.openxmlformats.org/presentationml/2006/main" type="vertTitleAndTx" preserve="1">
   <p:cSld name="Vertical Title and Text">
     <p:spTree>
@@ -2533,8 +2815,8 @@
         </p:nvSpPr>
         <p:spPr>
           <a:xfrm>
-            <a:off x="643467" y="5943600"/>
-            <a:ext cx="8568266" cy="914400"/>
+            <a:off x="152400" y="5943600"/>
+            <a:ext cx="11065933" cy="914400"/>
           </a:xfrm>
         </p:spPr>
         <p:txBody>
@@ -2550,7 +2832,7 @@
                 <a:spcPts val="500"/>
               </a:spcBef>
               <a:buNone/>
-              <a:defRPr sz="1400" i="1"/>
+              <a:defRPr sz="1200" i="1"/>
             </a:lvl1pPr>
           </a:lstStyle>
           <a:p>
@@ -2680,8 +2962,8 @@
         </p:nvSpPr>
         <p:spPr>
           <a:xfrm>
-            <a:off x="643467" y="5943600"/>
-            <a:ext cx="8568266" cy="914400"/>
+            <a:off x="155448" y="5943600"/>
+            <a:ext cx="11064240" cy="914400"/>
           </a:xfrm>
         </p:spPr>
         <p:txBody>
@@ -2697,7 +2979,7 @@
                 <a:spcPts val="500"/>
               </a:spcBef>
               <a:buNone/>
-              <a:defRPr sz="1400" i="1"/>
+              <a:defRPr sz="1200" i="1"/>
             </a:lvl1pPr>
           </a:lstStyle>
           <a:p>
@@ -2771,8 +3053,8 @@
 </file>
 
 <file path=ppt/slideLayouts/slideLayout8.xml><?xml version="1.0" encoding="utf-8"?>
-<p:sldLayout xmlns:a="http://schemas.openxmlformats.org/drawingml/2006/main" xmlns:r="http://schemas.openxmlformats.org/officeDocument/2006/relationships" xmlns:p="http://schemas.openxmlformats.org/presentationml/2006/main" type="blank" preserve="1">
-  <p:cSld name="Blank">
+<p:sldLayout xmlns:a="http://schemas.openxmlformats.org/drawingml/2006/main" xmlns:r="http://schemas.openxmlformats.org/officeDocument/2006/relationships" xmlns:p="http://schemas.openxmlformats.org/presentationml/2006/main" preserve="1" userDrawn="1">
+  <p:cSld name="2_Title Only">
     <p:spTree>
       <p:nvGrpSpPr>
         <p:cNvPr id="1" name=""/>
@@ -2789,71 +3071,90 @@
       </p:grpSpPr>
       <p:sp>
         <p:nvSpPr>
-          <p:cNvPr id="5" name="Date Placeholder 3"/>
-          <p:cNvSpPr>
-            <a:spLocks noGrp="1"/>
-          </p:cNvSpPr>
-          <p:nvPr>
-            <p:ph type="dt" sz="half" idx="10"/>
-          </p:nvPr>
-        </p:nvSpPr>
-        <p:spPr>
-          <a:xfrm>
-            <a:off x="57150" y="6378580"/>
-            <a:ext cx="2743200" cy="365125"/>
-          </a:xfrm>
-          <a:prstGeom prst="rect">
-            <a:avLst/>
-          </a:prstGeom>
-        </p:spPr>
-        <p:txBody>
-          <a:bodyPr/>
+          <p:cNvPr id="4" name="Text Placeholder 5"/>
+          <p:cNvSpPr>
+            <a:spLocks noGrp="1"/>
+          </p:cNvSpPr>
+          <p:nvPr>
+            <p:ph type="body" sz="quarter" idx="13"/>
+          </p:nvPr>
+        </p:nvSpPr>
+        <p:spPr>
+          <a:xfrm>
+            <a:off x="155448" y="5943600"/>
+            <a:ext cx="11064240" cy="914400"/>
+          </a:xfrm>
+        </p:spPr>
+        <p:txBody>
+          <a:bodyPr>
+            <a:normAutofit/>
+          </a:bodyPr>
           <a:lstStyle>
-            <a:lvl1pPr>
-              <a:defRPr/>
+            <a:lvl1pPr marL="0" indent="0" algn="l">
+              <a:lnSpc>
+                <a:spcPct val="100000"/>
+              </a:lnSpc>
+              <a:spcBef>
+                <a:spcPts val="500"/>
+              </a:spcBef>
+              <a:buNone/>
+              <a:defRPr sz="1200" i="1"/>
             </a:lvl1pPr>
           </a:lstStyle>
           <a:p>
-            <a:endParaRPr lang="en-US" dirty="0"/>
-          </a:p>
-        </p:txBody>
-      </p:sp>
-      <p:sp>
-        <p:nvSpPr>
-          <p:cNvPr id="7" name="Slide Number Placeholder 5"/>
-          <p:cNvSpPr>
-            <a:spLocks noGrp="1"/>
-          </p:cNvSpPr>
-          <p:nvPr>
-            <p:ph type="sldNum" sz="quarter" idx="12"/>
-          </p:nvPr>
-        </p:nvSpPr>
-        <p:spPr>
-          <a:xfrm>
-            <a:off x="10515602" y="6378580"/>
-            <a:ext cx="1578429" cy="365125"/>
-          </a:xfrm>
-          <a:prstGeom prst="rect">
-            <a:avLst/>
-          </a:prstGeom>
-        </p:spPr>
-        <p:txBody>
-          <a:bodyPr/>
-          <a:lstStyle/>
-          <a:p>
-            <a:fld id="{9138CEF9-5D5B-4151-AB46-3590332F1DB6}" type="slidenum">
-              <a:rPr lang="en-US" smtClean="0"/>
-              <a:pPr/>
-              <a:t>‹#›</a:t>
-            </a:fld>
-            <a:endParaRPr lang="en-US" dirty="0"/>
+            <a:pPr lvl="0"/>
+            <a:r>
+              <a:rPr lang="en-US" dirty="0" smtClean="0"/>
+              <a:t>Edit Master text styles</a:t>
+            </a:r>
+          </a:p>
+        </p:txBody>
+      </p:sp>
+      <p:sp>
+        <p:nvSpPr>
+          <p:cNvPr id="5" name="Text Placeholder 5"/>
+          <p:cNvSpPr>
+            <a:spLocks noGrp="1"/>
+          </p:cNvSpPr>
+          <p:nvPr>
+            <p:ph type="body" sz="quarter" idx="14" hasCustomPrompt="1"/>
+          </p:nvPr>
+        </p:nvSpPr>
+        <p:spPr>
+          <a:xfrm>
+            <a:off x="11421532" y="6510866"/>
+            <a:ext cx="770468" cy="347134"/>
+          </a:xfrm>
+        </p:spPr>
+        <p:txBody>
+          <a:bodyPr>
+            <a:normAutofit/>
+          </a:bodyPr>
+          <a:lstStyle>
+            <a:lvl1pPr marL="0" indent="0" algn="r">
+              <a:lnSpc>
+                <a:spcPct val="100000"/>
+              </a:lnSpc>
+              <a:spcBef>
+                <a:spcPts val="500"/>
+              </a:spcBef>
+              <a:buNone/>
+              <a:defRPr sz="1400" i="1"/>
+            </a:lvl1pPr>
+          </a:lstStyle>
+          <a:p>
+            <a:pPr lvl="0"/>
+            <a:r>
+              <a:rPr lang="en-US" dirty="0" smtClean="0"/>
+              <a:t>Slide #</a:t>
+            </a:r>
           </a:p>
         </p:txBody>
       </p:sp>
     </p:spTree>
     <p:extLst>
       <p:ext uri="{BB962C8B-B14F-4D97-AF65-F5344CB8AC3E}">
-        <p14:creationId xmlns:p14="http://schemas.microsoft.com/office/powerpoint/2010/main" val="2356020106"/>
+        <p14:creationId xmlns:p14="http://schemas.microsoft.com/office/powerpoint/2010/main" val="879639591"/>
       </p:ext>
     </p:extLst>
   </p:cSld>
@@ -2871,8 +3172,8 @@
 </file>
 
 <file path=ppt/slideLayouts/slideLayout9.xml><?xml version="1.0" encoding="utf-8"?>
-<p:sldLayout xmlns:a="http://schemas.openxmlformats.org/drawingml/2006/main" xmlns:r="http://schemas.openxmlformats.org/officeDocument/2006/relationships" xmlns:p="http://schemas.openxmlformats.org/presentationml/2006/main" type="objTx" preserve="1">
-  <p:cSld name="Content with Caption">
+<p:sldLayout xmlns:a="http://schemas.openxmlformats.org/drawingml/2006/main" xmlns:r="http://schemas.openxmlformats.org/officeDocument/2006/relationships" xmlns:p="http://schemas.openxmlformats.org/presentationml/2006/main" type="blank" preserve="1">
+  <p:cSld name="Blank">
     <p:spTree>
       <p:nvGrpSpPr>
         <p:cNvPr id="1" name=""/>
@@ -2889,189 +3190,7 @@
       </p:grpSpPr>
       <p:sp>
         <p:nvSpPr>
-          <p:cNvPr id="2" name="Title 1"/>
-          <p:cNvSpPr>
-            <a:spLocks noGrp="1"/>
-          </p:cNvSpPr>
-          <p:nvPr>
-            <p:ph type="title"/>
-          </p:nvPr>
-        </p:nvSpPr>
-        <p:spPr>
-          <a:xfrm>
-            <a:off x="839788" y="457200"/>
-            <a:ext cx="3932237" cy="1600200"/>
-          </a:xfrm>
-        </p:spPr>
-        <p:txBody>
-          <a:bodyPr anchor="b"/>
-          <a:lstStyle>
-            <a:lvl1pPr>
-              <a:defRPr sz="3200"/>
-            </a:lvl1pPr>
-          </a:lstStyle>
-          <a:p>
-            <a:r>
-              <a:rPr lang="en-US" smtClean="0"/>
-              <a:t>Click to edit Master title style</a:t>
-            </a:r>
-            <a:endParaRPr lang="en-US"/>
-          </a:p>
-        </p:txBody>
-      </p:sp>
-      <p:sp>
-        <p:nvSpPr>
-          <p:cNvPr id="3" name="Content Placeholder 2"/>
-          <p:cNvSpPr>
-            <a:spLocks noGrp="1"/>
-          </p:cNvSpPr>
-          <p:nvPr>
-            <p:ph idx="1"/>
-          </p:nvPr>
-        </p:nvSpPr>
-        <p:spPr>
-          <a:xfrm>
-            <a:off x="5183188" y="987425"/>
-            <a:ext cx="6172200" cy="4873625"/>
-          </a:xfrm>
-        </p:spPr>
-        <p:txBody>
-          <a:bodyPr/>
-          <a:lstStyle>
-            <a:lvl1pPr>
-              <a:defRPr sz="3200"/>
-            </a:lvl1pPr>
-            <a:lvl2pPr>
-              <a:defRPr sz="2800"/>
-            </a:lvl2pPr>
-            <a:lvl3pPr>
-              <a:defRPr sz="2400"/>
-            </a:lvl3pPr>
-            <a:lvl4pPr>
-              <a:defRPr sz="2000"/>
-            </a:lvl4pPr>
-            <a:lvl5pPr>
-              <a:defRPr sz="2000"/>
-            </a:lvl5pPr>
-            <a:lvl6pPr>
-              <a:defRPr sz="2000"/>
-            </a:lvl6pPr>
-            <a:lvl7pPr>
-              <a:defRPr sz="2000"/>
-            </a:lvl7pPr>
-            <a:lvl8pPr>
-              <a:defRPr sz="2000"/>
-            </a:lvl8pPr>
-            <a:lvl9pPr>
-              <a:defRPr sz="2000"/>
-            </a:lvl9pPr>
-          </a:lstStyle>
-          <a:p>
-            <a:pPr lvl="0"/>
-            <a:r>
-              <a:rPr lang="en-US" smtClean="0"/>
-              <a:t>Click to edit Master text styles</a:t>
-            </a:r>
-          </a:p>
-          <a:p>
-            <a:pPr lvl="1"/>
-            <a:r>
-              <a:rPr lang="en-US" smtClean="0"/>
-              <a:t>Second level</a:t>
-            </a:r>
-          </a:p>
-          <a:p>
-            <a:pPr lvl="2"/>
-            <a:r>
-              <a:rPr lang="en-US" smtClean="0"/>
-              <a:t>Third level</a:t>
-            </a:r>
-          </a:p>
-          <a:p>
-            <a:pPr lvl="3"/>
-            <a:r>
-              <a:rPr lang="en-US" smtClean="0"/>
-              <a:t>Fourth level</a:t>
-            </a:r>
-          </a:p>
-          <a:p>
-            <a:pPr lvl="4"/>
-            <a:r>
-              <a:rPr lang="en-US" smtClean="0"/>
-              <a:t>Fifth level</a:t>
-            </a:r>
-            <a:endParaRPr lang="en-US"/>
-          </a:p>
-        </p:txBody>
-      </p:sp>
-      <p:sp>
-        <p:nvSpPr>
-          <p:cNvPr id="4" name="Text Placeholder 3"/>
-          <p:cNvSpPr>
-            <a:spLocks noGrp="1"/>
-          </p:cNvSpPr>
-          <p:nvPr>
-            <p:ph type="body" sz="half" idx="2"/>
-          </p:nvPr>
-        </p:nvSpPr>
-        <p:spPr>
-          <a:xfrm>
-            <a:off x="839788" y="2057400"/>
-            <a:ext cx="3932237" cy="3811588"/>
-          </a:xfrm>
-        </p:spPr>
-        <p:txBody>
-          <a:bodyPr/>
-          <a:lstStyle>
-            <a:lvl1pPr marL="0" indent="0">
-              <a:buNone/>
-              <a:defRPr sz="1600"/>
-            </a:lvl1pPr>
-            <a:lvl2pPr marL="457200" indent="0">
-              <a:buNone/>
-              <a:defRPr sz="1400"/>
-            </a:lvl2pPr>
-            <a:lvl3pPr marL="914400" indent="0">
-              <a:buNone/>
-              <a:defRPr sz="1200"/>
-            </a:lvl3pPr>
-            <a:lvl4pPr marL="1371600" indent="0">
-              <a:buNone/>
-              <a:defRPr sz="1000"/>
-            </a:lvl4pPr>
-            <a:lvl5pPr marL="1828800" indent="0">
-              <a:buNone/>
-              <a:defRPr sz="1000"/>
-            </a:lvl5pPr>
-            <a:lvl6pPr marL="2286000" indent="0">
-              <a:buNone/>
-              <a:defRPr sz="1000"/>
-            </a:lvl6pPr>
-            <a:lvl7pPr marL="2743200" indent="0">
-              <a:buNone/>
-              <a:defRPr sz="1000"/>
-            </a:lvl7pPr>
-            <a:lvl8pPr marL="3200400" indent="0">
-              <a:buNone/>
-              <a:defRPr sz="1000"/>
-            </a:lvl8pPr>
-            <a:lvl9pPr marL="3657600" indent="0">
-              <a:buNone/>
-              <a:defRPr sz="1000"/>
-            </a:lvl9pPr>
-          </a:lstStyle>
-          <a:p>
-            <a:pPr lvl="0"/>
-            <a:r>
-              <a:rPr lang="en-US" smtClean="0"/>
-              <a:t>Click to edit Master text styles</a:t>
-            </a:r>
-          </a:p>
-        </p:txBody>
-      </p:sp>
-      <p:sp>
-        <p:nvSpPr>
-          <p:cNvPr id="8" name="Date Placeholder 3"/>
+          <p:cNvPr id="5" name="Date Placeholder 3"/>
           <p:cNvSpPr>
             <a:spLocks noGrp="1"/>
           </p:cNvSpPr>
@@ -3102,7 +3221,7 @@
       </p:sp>
       <p:sp>
         <p:nvSpPr>
-          <p:cNvPr id="10" name="Slide Number Placeholder 5"/>
+          <p:cNvPr id="7" name="Slide Number Placeholder 5"/>
           <p:cNvSpPr>
             <a:spLocks noGrp="1"/>
           </p:cNvSpPr>
@@ -3135,7 +3254,7 @@
     </p:spTree>
     <p:extLst>
       <p:ext uri="{BB962C8B-B14F-4D97-AF65-F5344CB8AC3E}">
-        <p14:creationId xmlns:p14="http://schemas.microsoft.com/office/powerpoint/2010/main" val="2139077687"/>
+        <p14:creationId xmlns:p14="http://schemas.microsoft.com/office/powerpoint/2010/main" val="2356020106"/>
       </p:ext>
     </p:extLst>
   </p:cSld>
@@ -3346,11 +3465,12 @@
     <p:sldLayoutId id="2147483653" r:id="rId5"/>
     <p:sldLayoutId id="2147483654" r:id="rId6"/>
     <p:sldLayoutId id="2147483660" r:id="rId7"/>
-    <p:sldLayoutId id="2147483655" r:id="rId8"/>
-    <p:sldLayoutId id="2147483656" r:id="rId9"/>
-    <p:sldLayoutId id="2147483657" r:id="rId10"/>
-    <p:sldLayoutId id="2147483658" r:id="rId11"/>
-    <p:sldLayoutId id="2147483659" r:id="rId12"/>
+    <p:sldLayoutId id="2147483661" r:id="rId8"/>
+    <p:sldLayoutId id="2147483655" r:id="rId9"/>
+    <p:sldLayoutId id="2147483656" r:id="rId10"/>
+    <p:sldLayoutId id="2147483657" r:id="rId11"/>
+    <p:sldLayoutId id="2147483658" r:id="rId12"/>
+    <p:sldLayoutId id="2147483659" r:id="rId13"/>
   </p:sldLayoutIdLst>
   <p:timing>
     <p:tnLst>

</xml_diff>

<commit_message>
Adjusting names of some CPRA interest locations. Including text for no data. Trigger value defined in legend.
</commit_message>
<xml_diff>
--- a/output/cpra_postproc/LSU_template.pptx
+++ b/output/cpra_postproc/LSU_template.pptx
@@ -211,7 +211,7 @@
           <a:p>
             <a:fld id="{D844CF58-73D2-4666-AB65-9E20151AB2CE}" type="datetimeFigureOut">
               <a:rPr lang="en-US" smtClean="0"/>
-              <a:t>7/9/2018</a:t>
+              <a:t>8/28/2018</a:t>
             </a:fld>
             <a:endParaRPr lang="en-US"/>
           </a:p>
@@ -376,7 +376,7 @@
           <a:p>
             <a:fld id="{A5C4824E-61BC-4FE8-B452-5DAE82D7E36E}" type="datetimeFigureOut">
               <a:rPr lang="en-US" smtClean="0"/>
-              <a:t>7/9/2018</a:t>
+              <a:t>8/28/2018</a:t>
             </a:fld>
             <a:endParaRPr lang="en-US"/>
           </a:p>
@@ -833,288 +833,6 @@
 </file>
 
 <file path=ppt/slideLayouts/slideLayout10.xml><?xml version="1.0" encoding="utf-8"?>
-<p:sldLayout xmlns:a="http://schemas.openxmlformats.org/drawingml/2006/main" xmlns:r="http://schemas.openxmlformats.org/officeDocument/2006/relationships" xmlns:p="http://schemas.openxmlformats.org/presentationml/2006/main" type="objTx" preserve="1">
-  <p:cSld name="Content with Caption">
-    <p:spTree>
-      <p:nvGrpSpPr>
-        <p:cNvPr id="1" name=""/>
-        <p:cNvGrpSpPr/>
-        <p:nvPr/>
-      </p:nvGrpSpPr>
-      <p:grpSpPr>
-        <a:xfrm>
-          <a:off x="0" y="0"/>
-          <a:ext cx="0" cy="0"/>
-          <a:chOff x="0" y="0"/>
-          <a:chExt cx="0" cy="0"/>
-        </a:xfrm>
-      </p:grpSpPr>
-      <p:sp>
-        <p:nvSpPr>
-          <p:cNvPr id="2" name="Title 1"/>
-          <p:cNvSpPr>
-            <a:spLocks noGrp="1"/>
-          </p:cNvSpPr>
-          <p:nvPr>
-            <p:ph type="title"/>
-          </p:nvPr>
-        </p:nvSpPr>
-        <p:spPr>
-          <a:xfrm>
-            <a:off x="839788" y="457200"/>
-            <a:ext cx="3932237" cy="1600200"/>
-          </a:xfrm>
-        </p:spPr>
-        <p:txBody>
-          <a:bodyPr anchor="b"/>
-          <a:lstStyle>
-            <a:lvl1pPr>
-              <a:defRPr sz="3200"/>
-            </a:lvl1pPr>
-          </a:lstStyle>
-          <a:p>
-            <a:r>
-              <a:rPr lang="en-US" smtClean="0"/>
-              <a:t>Click to edit Master title style</a:t>
-            </a:r>
-            <a:endParaRPr lang="en-US"/>
-          </a:p>
-        </p:txBody>
-      </p:sp>
-      <p:sp>
-        <p:nvSpPr>
-          <p:cNvPr id="3" name="Content Placeholder 2"/>
-          <p:cNvSpPr>
-            <a:spLocks noGrp="1"/>
-          </p:cNvSpPr>
-          <p:nvPr>
-            <p:ph idx="1"/>
-          </p:nvPr>
-        </p:nvSpPr>
-        <p:spPr>
-          <a:xfrm>
-            <a:off x="5183188" y="987425"/>
-            <a:ext cx="6172200" cy="4873625"/>
-          </a:xfrm>
-        </p:spPr>
-        <p:txBody>
-          <a:bodyPr/>
-          <a:lstStyle>
-            <a:lvl1pPr>
-              <a:defRPr sz="3200"/>
-            </a:lvl1pPr>
-            <a:lvl2pPr>
-              <a:defRPr sz="2800"/>
-            </a:lvl2pPr>
-            <a:lvl3pPr>
-              <a:defRPr sz="2400"/>
-            </a:lvl3pPr>
-            <a:lvl4pPr>
-              <a:defRPr sz="2000"/>
-            </a:lvl4pPr>
-            <a:lvl5pPr>
-              <a:defRPr sz="2000"/>
-            </a:lvl5pPr>
-            <a:lvl6pPr>
-              <a:defRPr sz="2000"/>
-            </a:lvl6pPr>
-            <a:lvl7pPr>
-              <a:defRPr sz="2000"/>
-            </a:lvl7pPr>
-            <a:lvl8pPr>
-              <a:defRPr sz="2000"/>
-            </a:lvl8pPr>
-            <a:lvl9pPr>
-              <a:defRPr sz="2000"/>
-            </a:lvl9pPr>
-          </a:lstStyle>
-          <a:p>
-            <a:pPr lvl="0"/>
-            <a:r>
-              <a:rPr lang="en-US" smtClean="0"/>
-              <a:t>Click to edit Master text styles</a:t>
-            </a:r>
-          </a:p>
-          <a:p>
-            <a:pPr lvl="1"/>
-            <a:r>
-              <a:rPr lang="en-US" smtClean="0"/>
-              <a:t>Second level</a:t>
-            </a:r>
-          </a:p>
-          <a:p>
-            <a:pPr lvl="2"/>
-            <a:r>
-              <a:rPr lang="en-US" smtClean="0"/>
-              <a:t>Third level</a:t>
-            </a:r>
-          </a:p>
-          <a:p>
-            <a:pPr lvl="3"/>
-            <a:r>
-              <a:rPr lang="en-US" smtClean="0"/>
-              <a:t>Fourth level</a:t>
-            </a:r>
-          </a:p>
-          <a:p>
-            <a:pPr lvl="4"/>
-            <a:r>
-              <a:rPr lang="en-US" smtClean="0"/>
-              <a:t>Fifth level</a:t>
-            </a:r>
-            <a:endParaRPr lang="en-US"/>
-          </a:p>
-        </p:txBody>
-      </p:sp>
-      <p:sp>
-        <p:nvSpPr>
-          <p:cNvPr id="4" name="Text Placeholder 3"/>
-          <p:cNvSpPr>
-            <a:spLocks noGrp="1"/>
-          </p:cNvSpPr>
-          <p:nvPr>
-            <p:ph type="body" sz="half" idx="2"/>
-          </p:nvPr>
-        </p:nvSpPr>
-        <p:spPr>
-          <a:xfrm>
-            <a:off x="839788" y="2057400"/>
-            <a:ext cx="3932237" cy="3811588"/>
-          </a:xfrm>
-        </p:spPr>
-        <p:txBody>
-          <a:bodyPr/>
-          <a:lstStyle>
-            <a:lvl1pPr marL="0" indent="0">
-              <a:buNone/>
-              <a:defRPr sz="1600"/>
-            </a:lvl1pPr>
-            <a:lvl2pPr marL="457200" indent="0">
-              <a:buNone/>
-              <a:defRPr sz="1400"/>
-            </a:lvl2pPr>
-            <a:lvl3pPr marL="914400" indent="0">
-              <a:buNone/>
-              <a:defRPr sz="1200"/>
-            </a:lvl3pPr>
-            <a:lvl4pPr marL="1371600" indent="0">
-              <a:buNone/>
-              <a:defRPr sz="1000"/>
-            </a:lvl4pPr>
-            <a:lvl5pPr marL="1828800" indent="0">
-              <a:buNone/>
-              <a:defRPr sz="1000"/>
-            </a:lvl5pPr>
-            <a:lvl6pPr marL="2286000" indent="0">
-              <a:buNone/>
-              <a:defRPr sz="1000"/>
-            </a:lvl6pPr>
-            <a:lvl7pPr marL="2743200" indent="0">
-              <a:buNone/>
-              <a:defRPr sz="1000"/>
-            </a:lvl7pPr>
-            <a:lvl8pPr marL="3200400" indent="0">
-              <a:buNone/>
-              <a:defRPr sz="1000"/>
-            </a:lvl8pPr>
-            <a:lvl9pPr marL="3657600" indent="0">
-              <a:buNone/>
-              <a:defRPr sz="1000"/>
-            </a:lvl9pPr>
-          </a:lstStyle>
-          <a:p>
-            <a:pPr lvl="0"/>
-            <a:r>
-              <a:rPr lang="en-US" smtClean="0"/>
-              <a:t>Click to edit Master text styles</a:t>
-            </a:r>
-          </a:p>
-        </p:txBody>
-      </p:sp>
-      <p:sp>
-        <p:nvSpPr>
-          <p:cNvPr id="8" name="Date Placeholder 3"/>
-          <p:cNvSpPr>
-            <a:spLocks noGrp="1"/>
-          </p:cNvSpPr>
-          <p:nvPr>
-            <p:ph type="dt" sz="half" idx="10"/>
-          </p:nvPr>
-        </p:nvSpPr>
-        <p:spPr>
-          <a:xfrm>
-            <a:off x="57150" y="6378580"/>
-            <a:ext cx="2743200" cy="365125"/>
-          </a:xfrm>
-          <a:prstGeom prst="rect">
-            <a:avLst/>
-          </a:prstGeom>
-        </p:spPr>
-        <p:txBody>
-          <a:bodyPr/>
-          <a:lstStyle>
-            <a:lvl1pPr>
-              <a:defRPr/>
-            </a:lvl1pPr>
-          </a:lstStyle>
-          <a:p>
-            <a:endParaRPr lang="en-US" dirty="0"/>
-          </a:p>
-        </p:txBody>
-      </p:sp>
-      <p:sp>
-        <p:nvSpPr>
-          <p:cNvPr id="10" name="Slide Number Placeholder 5"/>
-          <p:cNvSpPr>
-            <a:spLocks noGrp="1"/>
-          </p:cNvSpPr>
-          <p:nvPr>
-            <p:ph type="sldNum" sz="quarter" idx="12"/>
-          </p:nvPr>
-        </p:nvSpPr>
-        <p:spPr>
-          <a:xfrm>
-            <a:off x="10515602" y="6378580"/>
-            <a:ext cx="1578429" cy="365125"/>
-          </a:xfrm>
-          <a:prstGeom prst="rect">
-            <a:avLst/>
-          </a:prstGeom>
-        </p:spPr>
-        <p:txBody>
-          <a:bodyPr/>
-          <a:lstStyle/>
-          <a:p>
-            <a:fld id="{9138CEF9-5D5B-4151-AB46-3590332F1DB6}" type="slidenum">
-              <a:rPr lang="en-US" smtClean="0"/>
-              <a:pPr/>
-              <a:t>‹#›</a:t>
-            </a:fld>
-            <a:endParaRPr lang="en-US" dirty="0"/>
-          </a:p>
-        </p:txBody>
-      </p:sp>
-    </p:spTree>
-    <p:extLst>
-      <p:ext uri="{BB962C8B-B14F-4D97-AF65-F5344CB8AC3E}">
-        <p14:creationId xmlns:p14="http://schemas.microsoft.com/office/powerpoint/2010/main" val="2139077687"/>
-      </p:ext>
-    </p:extLst>
-  </p:cSld>
-  <p:clrMapOvr>
-    <a:masterClrMapping/>
-  </p:clrMapOvr>
-  <p:timing>
-    <p:tnLst>
-      <p:par>
-        <p:cTn id="1" dur="indefinite" restart="never" nodeType="tmRoot"/>
-      </p:par>
-    </p:tnLst>
-  </p:timing>
-</p:sldLayout>
-</file>
-
-<file path=ppt/slideLayouts/slideLayout11.xml><?xml version="1.0" encoding="utf-8"?>
 <p:sldLayout xmlns:a="http://schemas.openxmlformats.org/drawingml/2006/main" xmlns:r="http://schemas.openxmlformats.org/officeDocument/2006/relationships" xmlns:p="http://schemas.openxmlformats.org/presentationml/2006/main" type="picTx" preserve="1">
   <p:cSld name="Picture with Caption">
     <p:spTree>
@@ -1376,7 +1094,7 @@
 </p:sldLayout>
 </file>
 
-<file path=ppt/slideLayouts/slideLayout12.xml><?xml version="1.0" encoding="utf-8"?>
+<file path=ppt/slideLayouts/slideLayout11.xml><?xml version="1.0" encoding="utf-8"?>
 <p:sldLayout xmlns:a="http://schemas.openxmlformats.org/drawingml/2006/main" xmlns:r="http://schemas.openxmlformats.org/officeDocument/2006/relationships" xmlns:p="http://schemas.openxmlformats.org/presentationml/2006/main" type="vertTx" preserve="1">
   <p:cSld name="Title and Vertical Text">
     <p:spTree>
@@ -1556,7 +1274,7 @@
 </p:sldLayout>
 </file>
 
-<file path=ppt/slideLayouts/slideLayout13.xml><?xml version="1.0" encoding="utf-8"?>
+<file path=ppt/slideLayouts/slideLayout12.xml><?xml version="1.0" encoding="utf-8"?>
 <p:sldLayout xmlns:a="http://schemas.openxmlformats.org/drawingml/2006/main" xmlns:r="http://schemas.openxmlformats.org/officeDocument/2006/relationships" xmlns:p="http://schemas.openxmlformats.org/presentationml/2006/main" type="vertTitleAndTx" preserve="1">
   <p:cSld name="Vertical Title and Text">
     <p:spTree>
@@ -2724,8 +2442,14 @@
           </a:xfrm>
         </p:spPr>
         <p:txBody>
-          <a:bodyPr/>
-          <a:lstStyle/>
+          <a:bodyPr>
+            <a:normAutofit/>
+          </a:bodyPr>
+          <a:lstStyle>
+            <a:lvl1pPr>
+              <a:defRPr sz="2600"/>
+            </a:lvl1pPr>
+          </a:lstStyle>
           <a:p>
             <a:r>
               <a:rPr lang="en-US" dirty="0" smtClean="0"/>
@@ -2747,7 +2471,7 @@
         </p:nvSpPr>
         <p:spPr>
           <a:xfrm>
-            <a:off x="1465168" y="745067"/>
+            <a:off x="1465168" y="621792"/>
             <a:ext cx="10185570" cy="702733"/>
           </a:xfrm>
         </p:spPr>
@@ -2815,8 +2539,8 @@
         </p:nvSpPr>
         <p:spPr>
           <a:xfrm>
-            <a:off x="152400" y="5943600"/>
-            <a:ext cx="11065933" cy="914400"/>
+            <a:off x="643467" y="5943600"/>
+            <a:ext cx="8568266" cy="914400"/>
           </a:xfrm>
         </p:spPr>
         <p:txBody>
@@ -2832,7 +2556,7 @@
                 <a:spcPts val="500"/>
               </a:spcBef>
               <a:buNone/>
-              <a:defRPr sz="1200" i="1"/>
+              <a:defRPr sz="1000" i="1"/>
             </a:lvl1pPr>
           </a:lstStyle>
           <a:p>
@@ -2939,8 +2663,14 @@
           </a:xfrm>
         </p:spPr>
         <p:txBody>
-          <a:bodyPr/>
-          <a:lstStyle/>
+          <a:bodyPr>
+            <a:normAutofit/>
+          </a:bodyPr>
+          <a:lstStyle>
+            <a:lvl1pPr>
+              <a:defRPr sz="2600"/>
+            </a:lvl1pPr>
+          </a:lstStyle>
           <a:p>
             <a:r>
               <a:rPr lang="en-US" dirty="0" smtClean="0"/>
@@ -2962,8 +2692,8 @@
         </p:nvSpPr>
         <p:spPr>
           <a:xfrm>
-            <a:off x="155448" y="5943600"/>
-            <a:ext cx="11064240" cy="914400"/>
+            <a:off x="643467" y="5943600"/>
+            <a:ext cx="8568266" cy="914400"/>
           </a:xfrm>
         </p:spPr>
         <p:txBody>
@@ -2979,7 +2709,7 @@
                 <a:spcPts val="500"/>
               </a:spcBef>
               <a:buNone/>
-              <a:defRPr sz="1200" i="1"/>
+              <a:defRPr sz="1000" i="1"/>
             </a:lvl1pPr>
           </a:lstStyle>
           <a:p>
@@ -3053,8 +2783,8 @@
 </file>
 
 <file path=ppt/slideLayouts/slideLayout8.xml><?xml version="1.0" encoding="utf-8"?>
-<p:sldLayout xmlns:a="http://schemas.openxmlformats.org/drawingml/2006/main" xmlns:r="http://schemas.openxmlformats.org/officeDocument/2006/relationships" xmlns:p="http://schemas.openxmlformats.org/presentationml/2006/main" preserve="1" userDrawn="1">
-  <p:cSld name="2_Title Only">
+<p:sldLayout xmlns:a="http://schemas.openxmlformats.org/drawingml/2006/main" xmlns:r="http://schemas.openxmlformats.org/officeDocument/2006/relationships" xmlns:p="http://schemas.openxmlformats.org/presentationml/2006/main" type="blank" preserve="1">
+  <p:cSld name="Blank">
     <p:spTree>
       <p:nvGrpSpPr>
         <p:cNvPr id="1" name=""/>
@@ -3071,90 +2801,71 @@
       </p:grpSpPr>
       <p:sp>
         <p:nvSpPr>
-          <p:cNvPr id="4" name="Text Placeholder 5"/>
-          <p:cNvSpPr>
-            <a:spLocks noGrp="1"/>
-          </p:cNvSpPr>
-          <p:nvPr>
-            <p:ph type="body" sz="quarter" idx="13"/>
-          </p:nvPr>
-        </p:nvSpPr>
-        <p:spPr>
-          <a:xfrm>
-            <a:off x="155448" y="5943600"/>
-            <a:ext cx="11064240" cy="914400"/>
-          </a:xfrm>
-        </p:spPr>
-        <p:txBody>
-          <a:bodyPr>
-            <a:normAutofit/>
-          </a:bodyPr>
+          <p:cNvPr id="5" name="Date Placeholder 3"/>
+          <p:cNvSpPr>
+            <a:spLocks noGrp="1"/>
+          </p:cNvSpPr>
+          <p:nvPr>
+            <p:ph type="dt" sz="half" idx="10"/>
+          </p:nvPr>
+        </p:nvSpPr>
+        <p:spPr>
+          <a:xfrm>
+            <a:off x="57150" y="6378580"/>
+            <a:ext cx="2743200" cy="365125"/>
+          </a:xfrm>
+          <a:prstGeom prst="rect">
+            <a:avLst/>
+          </a:prstGeom>
+        </p:spPr>
+        <p:txBody>
+          <a:bodyPr/>
           <a:lstStyle>
-            <a:lvl1pPr marL="0" indent="0" algn="l">
-              <a:lnSpc>
-                <a:spcPct val="100000"/>
-              </a:lnSpc>
-              <a:spcBef>
-                <a:spcPts val="500"/>
-              </a:spcBef>
-              <a:buNone/>
-              <a:defRPr sz="1200" i="1"/>
+            <a:lvl1pPr>
+              <a:defRPr/>
             </a:lvl1pPr>
           </a:lstStyle>
           <a:p>
-            <a:pPr lvl="0"/>
-            <a:r>
-              <a:rPr lang="en-US" dirty="0" smtClean="0"/>
-              <a:t>Edit Master text styles</a:t>
-            </a:r>
-          </a:p>
-        </p:txBody>
-      </p:sp>
-      <p:sp>
-        <p:nvSpPr>
-          <p:cNvPr id="5" name="Text Placeholder 5"/>
-          <p:cNvSpPr>
-            <a:spLocks noGrp="1"/>
-          </p:cNvSpPr>
-          <p:nvPr>
-            <p:ph type="body" sz="quarter" idx="14" hasCustomPrompt="1"/>
-          </p:nvPr>
-        </p:nvSpPr>
-        <p:spPr>
-          <a:xfrm>
-            <a:off x="11421532" y="6510866"/>
-            <a:ext cx="770468" cy="347134"/>
-          </a:xfrm>
-        </p:spPr>
-        <p:txBody>
-          <a:bodyPr>
-            <a:normAutofit/>
-          </a:bodyPr>
-          <a:lstStyle>
-            <a:lvl1pPr marL="0" indent="0" algn="r">
-              <a:lnSpc>
-                <a:spcPct val="100000"/>
-              </a:lnSpc>
-              <a:spcBef>
-                <a:spcPts val="500"/>
-              </a:spcBef>
-              <a:buNone/>
-              <a:defRPr sz="1400" i="1"/>
-            </a:lvl1pPr>
-          </a:lstStyle>
-          <a:p>
-            <a:pPr lvl="0"/>
-            <a:r>
-              <a:rPr lang="en-US" dirty="0" smtClean="0"/>
-              <a:t>Slide #</a:t>
-            </a:r>
+            <a:endParaRPr lang="en-US" dirty="0"/>
+          </a:p>
+        </p:txBody>
+      </p:sp>
+      <p:sp>
+        <p:nvSpPr>
+          <p:cNvPr id="7" name="Slide Number Placeholder 5"/>
+          <p:cNvSpPr>
+            <a:spLocks noGrp="1"/>
+          </p:cNvSpPr>
+          <p:nvPr>
+            <p:ph type="sldNum" sz="quarter" idx="12"/>
+          </p:nvPr>
+        </p:nvSpPr>
+        <p:spPr>
+          <a:xfrm>
+            <a:off x="10515602" y="6378580"/>
+            <a:ext cx="1578429" cy="365125"/>
+          </a:xfrm>
+          <a:prstGeom prst="rect">
+            <a:avLst/>
+          </a:prstGeom>
+        </p:spPr>
+        <p:txBody>
+          <a:bodyPr/>
+          <a:lstStyle/>
+          <a:p>
+            <a:fld id="{9138CEF9-5D5B-4151-AB46-3590332F1DB6}" type="slidenum">
+              <a:rPr lang="en-US" smtClean="0"/>
+              <a:pPr/>
+              <a:t>‹#›</a:t>
+            </a:fld>
+            <a:endParaRPr lang="en-US" dirty="0"/>
           </a:p>
         </p:txBody>
       </p:sp>
     </p:spTree>
     <p:extLst>
       <p:ext uri="{BB962C8B-B14F-4D97-AF65-F5344CB8AC3E}">
-        <p14:creationId xmlns:p14="http://schemas.microsoft.com/office/powerpoint/2010/main" val="879639591"/>
+        <p14:creationId xmlns:p14="http://schemas.microsoft.com/office/powerpoint/2010/main" val="2356020106"/>
       </p:ext>
     </p:extLst>
   </p:cSld>
@@ -3172,8 +2883,8 @@
 </file>
 
 <file path=ppt/slideLayouts/slideLayout9.xml><?xml version="1.0" encoding="utf-8"?>
-<p:sldLayout xmlns:a="http://schemas.openxmlformats.org/drawingml/2006/main" xmlns:r="http://schemas.openxmlformats.org/officeDocument/2006/relationships" xmlns:p="http://schemas.openxmlformats.org/presentationml/2006/main" type="blank" preserve="1">
-  <p:cSld name="Blank">
+<p:sldLayout xmlns:a="http://schemas.openxmlformats.org/drawingml/2006/main" xmlns:r="http://schemas.openxmlformats.org/officeDocument/2006/relationships" xmlns:p="http://schemas.openxmlformats.org/presentationml/2006/main" type="objTx" preserve="1">
+  <p:cSld name="Content with Caption">
     <p:spTree>
       <p:nvGrpSpPr>
         <p:cNvPr id="1" name=""/>
@@ -3190,7 +2901,189 @@
       </p:grpSpPr>
       <p:sp>
         <p:nvSpPr>
-          <p:cNvPr id="5" name="Date Placeholder 3"/>
+          <p:cNvPr id="2" name="Title 1"/>
+          <p:cNvSpPr>
+            <a:spLocks noGrp="1"/>
+          </p:cNvSpPr>
+          <p:nvPr>
+            <p:ph type="title"/>
+          </p:nvPr>
+        </p:nvSpPr>
+        <p:spPr>
+          <a:xfrm>
+            <a:off x="839788" y="457200"/>
+            <a:ext cx="3932237" cy="1600200"/>
+          </a:xfrm>
+        </p:spPr>
+        <p:txBody>
+          <a:bodyPr anchor="b"/>
+          <a:lstStyle>
+            <a:lvl1pPr>
+              <a:defRPr sz="3200"/>
+            </a:lvl1pPr>
+          </a:lstStyle>
+          <a:p>
+            <a:r>
+              <a:rPr lang="en-US" smtClean="0"/>
+              <a:t>Click to edit Master title style</a:t>
+            </a:r>
+            <a:endParaRPr lang="en-US"/>
+          </a:p>
+        </p:txBody>
+      </p:sp>
+      <p:sp>
+        <p:nvSpPr>
+          <p:cNvPr id="3" name="Content Placeholder 2"/>
+          <p:cNvSpPr>
+            <a:spLocks noGrp="1"/>
+          </p:cNvSpPr>
+          <p:nvPr>
+            <p:ph idx="1"/>
+          </p:nvPr>
+        </p:nvSpPr>
+        <p:spPr>
+          <a:xfrm>
+            <a:off x="5183188" y="987425"/>
+            <a:ext cx="6172200" cy="4873625"/>
+          </a:xfrm>
+        </p:spPr>
+        <p:txBody>
+          <a:bodyPr/>
+          <a:lstStyle>
+            <a:lvl1pPr>
+              <a:defRPr sz="3200"/>
+            </a:lvl1pPr>
+            <a:lvl2pPr>
+              <a:defRPr sz="2800"/>
+            </a:lvl2pPr>
+            <a:lvl3pPr>
+              <a:defRPr sz="2400"/>
+            </a:lvl3pPr>
+            <a:lvl4pPr>
+              <a:defRPr sz="2000"/>
+            </a:lvl4pPr>
+            <a:lvl5pPr>
+              <a:defRPr sz="2000"/>
+            </a:lvl5pPr>
+            <a:lvl6pPr>
+              <a:defRPr sz="2000"/>
+            </a:lvl6pPr>
+            <a:lvl7pPr>
+              <a:defRPr sz="2000"/>
+            </a:lvl7pPr>
+            <a:lvl8pPr>
+              <a:defRPr sz="2000"/>
+            </a:lvl8pPr>
+            <a:lvl9pPr>
+              <a:defRPr sz="2000"/>
+            </a:lvl9pPr>
+          </a:lstStyle>
+          <a:p>
+            <a:pPr lvl="0"/>
+            <a:r>
+              <a:rPr lang="en-US" smtClean="0"/>
+              <a:t>Click to edit Master text styles</a:t>
+            </a:r>
+          </a:p>
+          <a:p>
+            <a:pPr lvl="1"/>
+            <a:r>
+              <a:rPr lang="en-US" smtClean="0"/>
+              <a:t>Second level</a:t>
+            </a:r>
+          </a:p>
+          <a:p>
+            <a:pPr lvl="2"/>
+            <a:r>
+              <a:rPr lang="en-US" smtClean="0"/>
+              <a:t>Third level</a:t>
+            </a:r>
+          </a:p>
+          <a:p>
+            <a:pPr lvl="3"/>
+            <a:r>
+              <a:rPr lang="en-US" smtClean="0"/>
+              <a:t>Fourth level</a:t>
+            </a:r>
+          </a:p>
+          <a:p>
+            <a:pPr lvl="4"/>
+            <a:r>
+              <a:rPr lang="en-US" smtClean="0"/>
+              <a:t>Fifth level</a:t>
+            </a:r>
+            <a:endParaRPr lang="en-US"/>
+          </a:p>
+        </p:txBody>
+      </p:sp>
+      <p:sp>
+        <p:nvSpPr>
+          <p:cNvPr id="4" name="Text Placeholder 3"/>
+          <p:cNvSpPr>
+            <a:spLocks noGrp="1"/>
+          </p:cNvSpPr>
+          <p:nvPr>
+            <p:ph type="body" sz="half" idx="2"/>
+          </p:nvPr>
+        </p:nvSpPr>
+        <p:spPr>
+          <a:xfrm>
+            <a:off x="839788" y="2057400"/>
+            <a:ext cx="3932237" cy="3811588"/>
+          </a:xfrm>
+        </p:spPr>
+        <p:txBody>
+          <a:bodyPr/>
+          <a:lstStyle>
+            <a:lvl1pPr marL="0" indent="0">
+              <a:buNone/>
+              <a:defRPr sz="1600"/>
+            </a:lvl1pPr>
+            <a:lvl2pPr marL="457200" indent="0">
+              <a:buNone/>
+              <a:defRPr sz="1400"/>
+            </a:lvl2pPr>
+            <a:lvl3pPr marL="914400" indent="0">
+              <a:buNone/>
+              <a:defRPr sz="1200"/>
+            </a:lvl3pPr>
+            <a:lvl4pPr marL="1371600" indent="0">
+              <a:buNone/>
+              <a:defRPr sz="1000"/>
+            </a:lvl4pPr>
+            <a:lvl5pPr marL="1828800" indent="0">
+              <a:buNone/>
+              <a:defRPr sz="1000"/>
+            </a:lvl5pPr>
+            <a:lvl6pPr marL="2286000" indent="0">
+              <a:buNone/>
+              <a:defRPr sz="1000"/>
+            </a:lvl6pPr>
+            <a:lvl7pPr marL="2743200" indent="0">
+              <a:buNone/>
+              <a:defRPr sz="1000"/>
+            </a:lvl7pPr>
+            <a:lvl8pPr marL="3200400" indent="0">
+              <a:buNone/>
+              <a:defRPr sz="1000"/>
+            </a:lvl8pPr>
+            <a:lvl9pPr marL="3657600" indent="0">
+              <a:buNone/>
+              <a:defRPr sz="1000"/>
+            </a:lvl9pPr>
+          </a:lstStyle>
+          <a:p>
+            <a:pPr lvl="0"/>
+            <a:r>
+              <a:rPr lang="en-US" smtClean="0"/>
+              <a:t>Click to edit Master text styles</a:t>
+            </a:r>
+          </a:p>
+        </p:txBody>
+      </p:sp>
+      <p:sp>
+        <p:nvSpPr>
+          <p:cNvPr id="8" name="Date Placeholder 3"/>
           <p:cNvSpPr>
             <a:spLocks noGrp="1"/>
           </p:cNvSpPr>
@@ -3221,7 +3114,7 @@
       </p:sp>
       <p:sp>
         <p:nvSpPr>
-          <p:cNvPr id="7" name="Slide Number Placeholder 5"/>
+          <p:cNvPr id="10" name="Slide Number Placeholder 5"/>
           <p:cNvSpPr>
             <a:spLocks noGrp="1"/>
           </p:cNvSpPr>
@@ -3254,7 +3147,7 @@
     </p:spTree>
     <p:extLst>
       <p:ext uri="{BB962C8B-B14F-4D97-AF65-F5344CB8AC3E}">
-        <p14:creationId xmlns:p14="http://schemas.microsoft.com/office/powerpoint/2010/main" val="2356020106"/>
+        <p14:creationId xmlns:p14="http://schemas.microsoft.com/office/powerpoint/2010/main" val="2139077687"/>
       </p:ext>
     </p:extLst>
   </p:cSld>
@@ -3465,12 +3358,11 @@
     <p:sldLayoutId id="2147483653" r:id="rId5"/>
     <p:sldLayoutId id="2147483654" r:id="rId6"/>
     <p:sldLayoutId id="2147483660" r:id="rId7"/>
-    <p:sldLayoutId id="2147483661" r:id="rId8"/>
-    <p:sldLayoutId id="2147483655" r:id="rId9"/>
-    <p:sldLayoutId id="2147483656" r:id="rId10"/>
-    <p:sldLayoutId id="2147483657" r:id="rId11"/>
-    <p:sldLayoutId id="2147483658" r:id="rId12"/>
-    <p:sldLayoutId id="2147483659" r:id="rId13"/>
+    <p:sldLayoutId id="2147483655" r:id="rId8"/>
+    <p:sldLayoutId id="2147483656" r:id="rId9"/>
+    <p:sldLayoutId id="2147483657" r:id="rId10"/>
+    <p:sldLayoutId id="2147483658" r:id="rId11"/>
+    <p:sldLayoutId id="2147483659" r:id="rId12"/>
   </p:sldLayoutIdLst>
   <p:timing>
     <p:tnLst>

</xml_diff>

<commit_message>
Updating CPRA slide deck generation tools. Re-order of slide deck; change in text; additional triggers.
</commit_message>
<xml_diff>
--- a/output/cpra_postproc/LSU_template.pptx
+++ b/output/cpra_postproc/LSU_template.pptx
@@ -211,7 +211,7 @@
           <a:p>
             <a:fld id="{D844CF58-73D2-4666-AB65-9E20151AB2CE}" type="datetimeFigureOut">
               <a:rPr lang="en-US" smtClean="0"/>
-              <a:t>8/28/2018</a:t>
+              <a:t>7/2/2020</a:t>
             </a:fld>
             <a:endParaRPr lang="en-US"/>
           </a:p>
@@ -376,7 +376,7 @@
           <a:p>
             <a:fld id="{A5C4824E-61BC-4FE8-B452-5DAE82D7E36E}" type="datetimeFigureOut">
               <a:rPr lang="en-US" smtClean="0"/>
-              <a:t>8/28/2018</a:t>
+              <a:t>7/2/2020</a:t>
             </a:fld>
             <a:endParaRPr lang="en-US"/>
           </a:p>
@@ -833,6 +833,288 @@
 </file>
 
 <file path=ppt/slideLayouts/slideLayout10.xml><?xml version="1.0" encoding="utf-8"?>
+<p:sldLayout xmlns:a="http://schemas.openxmlformats.org/drawingml/2006/main" xmlns:r="http://schemas.openxmlformats.org/officeDocument/2006/relationships" xmlns:p="http://schemas.openxmlformats.org/presentationml/2006/main" type="objTx" preserve="1">
+  <p:cSld name="Content with Caption">
+    <p:spTree>
+      <p:nvGrpSpPr>
+        <p:cNvPr id="1" name=""/>
+        <p:cNvGrpSpPr/>
+        <p:nvPr/>
+      </p:nvGrpSpPr>
+      <p:grpSpPr>
+        <a:xfrm>
+          <a:off x="0" y="0"/>
+          <a:ext cx="0" cy="0"/>
+          <a:chOff x="0" y="0"/>
+          <a:chExt cx="0" cy="0"/>
+        </a:xfrm>
+      </p:grpSpPr>
+      <p:sp>
+        <p:nvSpPr>
+          <p:cNvPr id="2" name="Title 1"/>
+          <p:cNvSpPr>
+            <a:spLocks noGrp="1"/>
+          </p:cNvSpPr>
+          <p:nvPr>
+            <p:ph type="title"/>
+          </p:nvPr>
+        </p:nvSpPr>
+        <p:spPr>
+          <a:xfrm>
+            <a:off x="839788" y="457200"/>
+            <a:ext cx="3932237" cy="1600200"/>
+          </a:xfrm>
+        </p:spPr>
+        <p:txBody>
+          <a:bodyPr anchor="b"/>
+          <a:lstStyle>
+            <a:lvl1pPr>
+              <a:defRPr sz="3200"/>
+            </a:lvl1pPr>
+          </a:lstStyle>
+          <a:p>
+            <a:r>
+              <a:rPr lang="en-US" smtClean="0"/>
+              <a:t>Click to edit Master title style</a:t>
+            </a:r>
+            <a:endParaRPr lang="en-US"/>
+          </a:p>
+        </p:txBody>
+      </p:sp>
+      <p:sp>
+        <p:nvSpPr>
+          <p:cNvPr id="3" name="Content Placeholder 2"/>
+          <p:cNvSpPr>
+            <a:spLocks noGrp="1"/>
+          </p:cNvSpPr>
+          <p:nvPr>
+            <p:ph idx="1"/>
+          </p:nvPr>
+        </p:nvSpPr>
+        <p:spPr>
+          <a:xfrm>
+            <a:off x="5183188" y="987425"/>
+            <a:ext cx="6172200" cy="4873625"/>
+          </a:xfrm>
+        </p:spPr>
+        <p:txBody>
+          <a:bodyPr/>
+          <a:lstStyle>
+            <a:lvl1pPr>
+              <a:defRPr sz="3200"/>
+            </a:lvl1pPr>
+            <a:lvl2pPr>
+              <a:defRPr sz="2800"/>
+            </a:lvl2pPr>
+            <a:lvl3pPr>
+              <a:defRPr sz="2400"/>
+            </a:lvl3pPr>
+            <a:lvl4pPr>
+              <a:defRPr sz="2000"/>
+            </a:lvl4pPr>
+            <a:lvl5pPr>
+              <a:defRPr sz="2000"/>
+            </a:lvl5pPr>
+            <a:lvl6pPr>
+              <a:defRPr sz="2000"/>
+            </a:lvl6pPr>
+            <a:lvl7pPr>
+              <a:defRPr sz="2000"/>
+            </a:lvl7pPr>
+            <a:lvl8pPr>
+              <a:defRPr sz="2000"/>
+            </a:lvl8pPr>
+            <a:lvl9pPr>
+              <a:defRPr sz="2000"/>
+            </a:lvl9pPr>
+          </a:lstStyle>
+          <a:p>
+            <a:pPr lvl="0"/>
+            <a:r>
+              <a:rPr lang="en-US" smtClean="0"/>
+              <a:t>Click to edit Master text styles</a:t>
+            </a:r>
+          </a:p>
+          <a:p>
+            <a:pPr lvl="1"/>
+            <a:r>
+              <a:rPr lang="en-US" smtClean="0"/>
+              <a:t>Second level</a:t>
+            </a:r>
+          </a:p>
+          <a:p>
+            <a:pPr lvl="2"/>
+            <a:r>
+              <a:rPr lang="en-US" smtClean="0"/>
+              <a:t>Third level</a:t>
+            </a:r>
+          </a:p>
+          <a:p>
+            <a:pPr lvl="3"/>
+            <a:r>
+              <a:rPr lang="en-US" smtClean="0"/>
+              <a:t>Fourth level</a:t>
+            </a:r>
+          </a:p>
+          <a:p>
+            <a:pPr lvl="4"/>
+            <a:r>
+              <a:rPr lang="en-US" smtClean="0"/>
+              <a:t>Fifth level</a:t>
+            </a:r>
+            <a:endParaRPr lang="en-US"/>
+          </a:p>
+        </p:txBody>
+      </p:sp>
+      <p:sp>
+        <p:nvSpPr>
+          <p:cNvPr id="4" name="Text Placeholder 3"/>
+          <p:cNvSpPr>
+            <a:spLocks noGrp="1"/>
+          </p:cNvSpPr>
+          <p:nvPr>
+            <p:ph type="body" sz="half" idx="2"/>
+          </p:nvPr>
+        </p:nvSpPr>
+        <p:spPr>
+          <a:xfrm>
+            <a:off x="839788" y="2057400"/>
+            <a:ext cx="3932237" cy="3811588"/>
+          </a:xfrm>
+        </p:spPr>
+        <p:txBody>
+          <a:bodyPr/>
+          <a:lstStyle>
+            <a:lvl1pPr marL="0" indent="0">
+              <a:buNone/>
+              <a:defRPr sz="1600"/>
+            </a:lvl1pPr>
+            <a:lvl2pPr marL="457200" indent="0">
+              <a:buNone/>
+              <a:defRPr sz="1400"/>
+            </a:lvl2pPr>
+            <a:lvl3pPr marL="914400" indent="0">
+              <a:buNone/>
+              <a:defRPr sz="1200"/>
+            </a:lvl3pPr>
+            <a:lvl4pPr marL="1371600" indent="0">
+              <a:buNone/>
+              <a:defRPr sz="1000"/>
+            </a:lvl4pPr>
+            <a:lvl5pPr marL="1828800" indent="0">
+              <a:buNone/>
+              <a:defRPr sz="1000"/>
+            </a:lvl5pPr>
+            <a:lvl6pPr marL="2286000" indent="0">
+              <a:buNone/>
+              <a:defRPr sz="1000"/>
+            </a:lvl6pPr>
+            <a:lvl7pPr marL="2743200" indent="0">
+              <a:buNone/>
+              <a:defRPr sz="1000"/>
+            </a:lvl7pPr>
+            <a:lvl8pPr marL="3200400" indent="0">
+              <a:buNone/>
+              <a:defRPr sz="1000"/>
+            </a:lvl8pPr>
+            <a:lvl9pPr marL="3657600" indent="0">
+              <a:buNone/>
+              <a:defRPr sz="1000"/>
+            </a:lvl9pPr>
+          </a:lstStyle>
+          <a:p>
+            <a:pPr lvl="0"/>
+            <a:r>
+              <a:rPr lang="en-US" smtClean="0"/>
+              <a:t>Click to edit Master text styles</a:t>
+            </a:r>
+          </a:p>
+        </p:txBody>
+      </p:sp>
+      <p:sp>
+        <p:nvSpPr>
+          <p:cNvPr id="8" name="Date Placeholder 3"/>
+          <p:cNvSpPr>
+            <a:spLocks noGrp="1"/>
+          </p:cNvSpPr>
+          <p:nvPr>
+            <p:ph type="dt" sz="half" idx="10"/>
+          </p:nvPr>
+        </p:nvSpPr>
+        <p:spPr>
+          <a:xfrm>
+            <a:off x="57150" y="6378580"/>
+            <a:ext cx="2743200" cy="365125"/>
+          </a:xfrm>
+          <a:prstGeom prst="rect">
+            <a:avLst/>
+          </a:prstGeom>
+        </p:spPr>
+        <p:txBody>
+          <a:bodyPr/>
+          <a:lstStyle>
+            <a:lvl1pPr>
+              <a:defRPr/>
+            </a:lvl1pPr>
+          </a:lstStyle>
+          <a:p>
+            <a:endParaRPr lang="en-US" dirty="0"/>
+          </a:p>
+        </p:txBody>
+      </p:sp>
+      <p:sp>
+        <p:nvSpPr>
+          <p:cNvPr id="10" name="Slide Number Placeholder 5"/>
+          <p:cNvSpPr>
+            <a:spLocks noGrp="1"/>
+          </p:cNvSpPr>
+          <p:nvPr>
+            <p:ph type="sldNum" sz="quarter" idx="12"/>
+          </p:nvPr>
+        </p:nvSpPr>
+        <p:spPr>
+          <a:xfrm>
+            <a:off x="10515602" y="6378580"/>
+            <a:ext cx="1578429" cy="365125"/>
+          </a:xfrm>
+          <a:prstGeom prst="rect">
+            <a:avLst/>
+          </a:prstGeom>
+        </p:spPr>
+        <p:txBody>
+          <a:bodyPr/>
+          <a:lstStyle/>
+          <a:p>
+            <a:fld id="{9138CEF9-5D5B-4151-AB46-3590332F1DB6}" type="slidenum">
+              <a:rPr lang="en-US" smtClean="0"/>
+              <a:pPr/>
+              <a:t>‹#›</a:t>
+            </a:fld>
+            <a:endParaRPr lang="en-US" dirty="0"/>
+          </a:p>
+        </p:txBody>
+      </p:sp>
+    </p:spTree>
+    <p:extLst>
+      <p:ext uri="{BB962C8B-B14F-4D97-AF65-F5344CB8AC3E}">
+        <p14:creationId xmlns:p14="http://schemas.microsoft.com/office/powerpoint/2010/main" val="2139077687"/>
+      </p:ext>
+    </p:extLst>
+  </p:cSld>
+  <p:clrMapOvr>
+    <a:masterClrMapping/>
+  </p:clrMapOvr>
+  <p:timing>
+    <p:tnLst>
+      <p:par>
+        <p:cTn id="1" dur="indefinite" restart="never" nodeType="tmRoot"/>
+      </p:par>
+    </p:tnLst>
+  </p:timing>
+</p:sldLayout>
+</file>
+
+<file path=ppt/slideLayouts/slideLayout11.xml><?xml version="1.0" encoding="utf-8"?>
 <p:sldLayout xmlns:a="http://schemas.openxmlformats.org/drawingml/2006/main" xmlns:r="http://schemas.openxmlformats.org/officeDocument/2006/relationships" xmlns:p="http://schemas.openxmlformats.org/presentationml/2006/main" type="picTx" preserve="1">
   <p:cSld name="Picture with Caption">
     <p:spTree>
@@ -1094,7 +1376,7 @@
 </p:sldLayout>
 </file>
 
-<file path=ppt/slideLayouts/slideLayout11.xml><?xml version="1.0" encoding="utf-8"?>
+<file path=ppt/slideLayouts/slideLayout12.xml><?xml version="1.0" encoding="utf-8"?>
 <p:sldLayout xmlns:a="http://schemas.openxmlformats.org/drawingml/2006/main" xmlns:r="http://schemas.openxmlformats.org/officeDocument/2006/relationships" xmlns:p="http://schemas.openxmlformats.org/presentationml/2006/main" type="vertTx" preserve="1">
   <p:cSld name="Title and Vertical Text">
     <p:spTree>
@@ -1274,7 +1556,7 @@
 </p:sldLayout>
 </file>
 
-<file path=ppt/slideLayouts/slideLayout12.xml><?xml version="1.0" encoding="utf-8"?>
+<file path=ppt/slideLayouts/slideLayout13.xml><?xml version="1.0" encoding="utf-8"?>
 <p:sldLayout xmlns:a="http://schemas.openxmlformats.org/drawingml/2006/main" xmlns:r="http://schemas.openxmlformats.org/officeDocument/2006/relationships" xmlns:p="http://schemas.openxmlformats.org/presentationml/2006/main" type="vertTitleAndTx" preserve="1">
   <p:cSld name="Vertical Title and Text">
     <p:spTree>
@@ -2783,8 +3065,8 @@
 </file>
 
 <file path=ppt/slideLayouts/slideLayout8.xml><?xml version="1.0" encoding="utf-8"?>
-<p:sldLayout xmlns:a="http://schemas.openxmlformats.org/drawingml/2006/main" xmlns:r="http://schemas.openxmlformats.org/officeDocument/2006/relationships" xmlns:p="http://schemas.openxmlformats.org/presentationml/2006/main" type="blank" preserve="1">
-  <p:cSld name="Blank">
+<p:sldLayout xmlns:a="http://schemas.openxmlformats.org/drawingml/2006/main" xmlns:r="http://schemas.openxmlformats.org/officeDocument/2006/relationships" xmlns:p="http://schemas.openxmlformats.org/presentationml/2006/main" preserve="1" userDrawn="1">
+  <p:cSld name="2_Title Only">
     <p:spTree>
       <p:nvGrpSpPr>
         <p:cNvPr id="1" name=""/>
@@ -2801,71 +3083,149 @@
       </p:grpSpPr>
       <p:sp>
         <p:nvSpPr>
-          <p:cNvPr id="5" name="Date Placeholder 3"/>
-          <p:cNvSpPr>
-            <a:spLocks noGrp="1"/>
-          </p:cNvSpPr>
-          <p:nvPr>
-            <p:ph type="dt" sz="half" idx="10"/>
-          </p:nvPr>
-        </p:nvSpPr>
-        <p:spPr>
-          <a:xfrm>
-            <a:off x="57150" y="6378580"/>
-            <a:ext cx="2743200" cy="365125"/>
-          </a:xfrm>
-          <a:prstGeom prst="rect">
-            <a:avLst/>
-          </a:prstGeom>
-        </p:spPr>
-        <p:txBody>
-          <a:bodyPr/>
+          <p:cNvPr id="2" name="Title 1"/>
+          <p:cNvSpPr>
+            <a:spLocks noGrp="1"/>
+          </p:cNvSpPr>
+          <p:nvPr>
+            <p:ph type="title"/>
+          </p:nvPr>
+        </p:nvSpPr>
+        <p:spPr>
+          <a:xfrm>
+            <a:off x="0" y="1"/>
+            <a:ext cx="12191999" cy="745066"/>
+          </a:xfrm>
+        </p:spPr>
+        <p:txBody>
+          <a:bodyPr>
+            <a:normAutofit/>
+          </a:bodyPr>
           <a:lstStyle>
             <a:lvl1pPr>
-              <a:defRPr/>
+              <a:defRPr sz="2600"/>
             </a:lvl1pPr>
           </a:lstStyle>
           <a:p>
+            <a:r>
+              <a:rPr lang="en-US" dirty="0" smtClean="0"/>
+              <a:t>Click to edit Master title style</a:t>
+            </a:r>
             <a:endParaRPr lang="en-US" dirty="0"/>
           </a:p>
         </p:txBody>
       </p:sp>
       <p:sp>
         <p:nvSpPr>
-          <p:cNvPr id="7" name="Slide Number Placeholder 5"/>
-          <p:cNvSpPr>
-            <a:spLocks noGrp="1"/>
-          </p:cNvSpPr>
-          <p:nvPr>
-            <p:ph type="sldNum" sz="quarter" idx="12"/>
-          </p:nvPr>
-        </p:nvSpPr>
-        <p:spPr>
-          <a:xfrm>
-            <a:off x="10515602" y="6378580"/>
-            <a:ext cx="1578429" cy="365125"/>
-          </a:xfrm>
-          <a:prstGeom prst="rect">
-            <a:avLst/>
-          </a:prstGeom>
-        </p:spPr>
-        <p:txBody>
-          <a:bodyPr/>
-          <a:lstStyle/>
-          <a:p>
-            <a:fld id="{9138CEF9-5D5B-4151-AB46-3590332F1DB6}" type="slidenum">
-              <a:rPr lang="en-US" smtClean="0"/>
-              <a:pPr/>
-              <a:t>‹#›</a:t>
-            </a:fld>
-            <a:endParaRPr lang="en-US" dirty="0"/>
+          <p:cNvPr id="5" name="Text Placeholder 5"/>
+          <p:cNvSpPr>
+            <a:spLocks noGrp="1"/>
+          </p:cNvSpPr>
+          <p:nvPr>
+            <p:ph type="body" sz="quarter" idx="14" hasCustomPrompt="1"/>
+          </p:nvPr>
+        </p:nvSpPr>
+        <p:spPr>
+          <a:xfrm>
+            <a:off x="11421532" y="6510866"/>
+            <a:ext cx="770468" cy="347134"/>
+          </a:xfrm>
+        </p:spPr>
+        <p:txBody>
+          <a:bodyPr>
+            <a:normAutofit/>
+          </a:bodyPr>
+          <a:lstStyle>
+            <a:lvl1pPr marL="0" indent="0" algn="r">
+              <a:lnSpc>
+                <a:spcPct val="100000"/>
+              </a:lnSpc>
+              <a:spcBef>
+                <a:spcPts val="500"/>
+              </a:spcBef>
+              <a:buNone/>
+              <a:defRPr sz="1400" i="1"/>
+            </a:lvl1pPr>
+          </a:lstStyle>
+          <a:p>
+            <a:pPr lvl="0"/>
+            <a:r>
+              <a:rPr lang="en-US" dirty="0" smtClean="0"/>
+              <a:t>Slide #</a:t>
+            </a:r>
+          </a:p>
+        </p:txBody>
+      </p:sp>
+      <p:sp>
+        <p:nvSpPr>
+          <p:cNvPr id="6" name="Content Placeholder 2"/>
+          <p:cNvSpPr>
+            <a:spLocks noGrp="1"/>
+          </p:cNvSpPr>
+          <p:nvPr>
+            <p:ph idx="1" hasCustomPrompt="1"/>
+          </p:nvPr>
+        </p:nvSpPr>
+        <p:spPr>
+          <a:xfrm>
+            <a:off x="225451" y="941832"/>
+            <a:ext cx="11741099" cy="5352642"/>
+          </a:xfrm>
+        </p:spPr>
+        <p:txBody>
+          <a:bodyPr numCol="2">
+            <a:normAutofit/>
+          </a:bodyPr>
+          <a:lstStyle>
+            <a:lvl1pPr marL="0" indent="0">
+              <a:buFont typeface="+mj-lt"/>
+              <a:buNone/>
+              <a:defRPr sz="1800">
+                <a:latin typeface="Franklin Gothic Book" panose="020B0503020102020204" pitchFamily="34" charset="0"/>
+              </a:defRPr>
+            </a:lvl1pPr>
+            <a:lvl2pPr marL="914400" indent="-457200">
+              <a:buFont typeface="+mj-lt"/>
+              <a:buAutoNum type="arabicPeriod"/>
+              <a:defRPr>
+                <a:latin typeface="Franklin Gothic Book" panose="020B0503020102020204" pitchFamily="34" charset="0"/>
+              </a:defRPr>
+            </a:lvl2pPr>
+            <a:lvl3pPr marL="1371600" indent="-457200">
+              <a:buFont typeface="+mj-lt"/>
+              <a:buAutoNum type="arabicPeriod"/>
+              <a:defRPr>
+                <a:latin typeface="Franklin Gothic Book" panose="020B0503020102020204" pitchFamily="34" charset="0"/>
+              </a:defRPr>
+            </a:lvl3pPr>
+            <a:lvl4pPr marL="1714500" indent="-342900">
+              <a:buFont typeface="+mj-lt"/>
+              <a:buAutoNum type="arabicPeriod"/>
+              <a:defRPr>
+                <a:latin typeface="Franklin Gothic Book" panose="020B0503020102020204" pitchFamily="34" charset="0"/>
+              </a:defRPr>
+            </a:lvl4pPr>
+            <a:lvl5pPr marL="2171700" indent="-342900">
+              <a:buFont typeface="+mj-lt"/>
+              <a:buAutoNum type="arabicPeriod"/>
+              <a:defRPr>
+                <a:latin typeface="Franklin Gothic Book" panose="020B0503020102020204" pitchFamily="34" charset="0"/>
+              </a:defRPr>
+            </a:lvl5pPr>
+          </a:lstStyle>
+          <a:p>
+            <a:pPr lvl="0"/>
+            <a:r>
+              <a:rPr lang="en-US" dirty="0" smtClean="0"/>
+              <a:t>Click to edit Master text styles</a:t>
+            </a:r>
           </a:p>
         </p:txBody>
       </p:sp>
     </p:spTree>
     <p:extLst>
       <p:ext uri="{BB962C8B-B14F-4D97-AF65-F5344CB8AC3E}">
-        <p14:creationId xmlns:p14="http://schemas.microsoft.com/office/powerpoint/2010/main" val="2356020106"/>
+        <p14:creationId xmlns:p14="http://schemas.microsoft.com/office/powerpoint/2010/main" val="4042496348"/>
       </p:ext>
     </p:extLst>
   </p:cSld>
@@ -2883,8 +3243,8 @@
 </file>
 
 <file path=ppt/slideLayouts/slideLayout9.xml><?xml version="1.0" encoding="utf-8"?>
-<p:sldLayout xmlns:a="http://schemas.openxmlformats.org/drawingml/2006/main" xmlns:r="http://schemas.openxmlformats.org/officeDocument/2006/relationships" xmlns:p="http://schemas.openxmlformats.org/presentationml/2006/main" type="objTx" preserve="1">
-  <p:cSld name="Content with Caption">
+<p:sldLayout xmlns:a="http://schemas.openxmlformats.org/drawingml/2006/main" xmlns:r="http://schemas.openxmlformats.org/officeDocument/2006/relationships" xmlns:p="http://schemas.openxmlformats.org/presentationml/2006/main" type="blank" preserve="1">
+  <p:cSld name="Blank">
     <p:spTree>
       <p:nvGrpSpPr>
         <p:cNvPr id="1" name=""/>
@@ -2901,189 +3261,7 @@
       </p:grpSpPr>
       <p:sp>
         <p:nvSpPr>
-          <p:cNvPr id="2" name="Title 1"/>
-          <p:cNvSpPr>
-            <a:spLocks noGrp="1"/>
-          </p:cNvSpPr>
-          <p:nvPr>
-            <p:ph type="title"/>
-          </p:nvPr>
-        </p:nvSpPr>
-        <p:spPr>
-          <a:xfrm>
-            <a:off x="839788" y="457200"/>
-            <a:ext cx="3932237" cy="1600200"/>
-          </a:xfrm>
-        </p:spPr>
-        <p:txBody>
-          <a:bodyPr anchor="b"/>
-          <a:lstStyle>
-            <a:lvl1pPr>
-              <a:defRPr sz="3200"/>
-            </a:lvl1pPr>
-          </a:lstStyle>
-          <a:p>
-            <a:r>
-              <a:rPr lang="en-US" smtClean="0"/>
-              <a:t>Click to edit Master title style</a:t>
-            </a:r>
-            <a:endParaRPr lang="en-US"/>
-          </a:p>
-        </p:txBody>
-      </p:sp>
-      <p:sp>
-        <p:nvSpPr>
-          <p:cNvPr id="3" name="Content Placeholder 2"/>
-          <p:cNvSpPr>
-            <a:spLocks noGrp="1"/>
-          </p:cNvSpPr>
-          <p:nvPr>
-            <p:ph idx="1"/>
-          </p:nvPr>
-        </p:nvSpPr>
-        <p:spPr>
-          <a:xfrm>
-            <a:off x="5183188" y="987425"/>
-            <a:ext cx="6172200" cy="4873625"/>
-          </a:xfrm>
-        </p:spPr>
-        <p:txBody>
-          <a:bodyPr/>
-          <a:lstStyle>
-            <a:lvl1pPr>
-              <a:defRPr sz="3200"/>
-            </a:lvl1pPr>
-            <a:lvl2pPr>
-              <a:defRPr sz="2800"/>
-            </a:lvl2pPr>
-            <a:lvl3pPr>
-              <a:defRPr sz="2400"/>
-            </a:lvl3pPr>
-            <a:lvl4pPr>
-              <a:defRPr sz="2000"/>
-            </a:lvl4pPr>
-            <a:lvl5pPr>
-              <a:defRPr sz="2000"/>
-            </a:lvl5pPr>
-            <a:lvl6pPr>
-              <a:defRPr sz="2000"/>
-            </a:lvl6pPr>
-            <a:lvl7pPr>
-              <a:defRPr sz="2000"/>
-            </a:lvl7pPr>
-            <a:lvl8pPr>
-              <a:defRPr sz="2000"/>
-            </a:lvl8pPr>
-            <a:lvl9pPr>
-              <a:defRPr sz="2000"/>
-            </a:lvl9pPr>
-          </a:lstStyle>
-          <a:p>
-            <a:pPr lvl="0"/>
-            <a:r>
-              <a:rPr lang="en-US" smtClean="0"/>
-              <a:t>Click to edit Master text styles</a:t>
-            </a:r>
-          </a:p>
-          <a:p>
-            <a:pPr lvl="1"/>
-            <a:r>
-              <a:rPr lang="en-US" smtClean="0"/>
-              <a:t>Second level</a:t>
-            </a:r>
-          </a:p>
-          <a:p>
-            <a:pPr lvl="2"/>
-            <a:r>
-              <a:rPr lang="en-US" smtClean="0"/>
-              <a:t>Third level</a:t>
-            </a:r>
-          </a:p>
-          <a:p>
-            <a:pPr lvl="3"/>
-            <a:r>
-              <a:rPr lang="en-US" smtClean="0"/>
-              <a:t>Fourth level</a:t>
-            </a:r>
-          </a:p>
-          <a:p>
-            <a:pPr lvl="4"/>
-            <a:r>
-              <a:rPr lang="en-US" smtClean="0"/>
-              <a:t>Fifth level</a:t>
-            </a:r>
-            <a:endParaRPr lang="en-US"/>
-          </a:p>
-        </p:txBody>
-      </p:sp>
-      <p:sp>
-        <p:nvSpPr>
-          <p:cNvPr id="4" name="Text Placeholder 3"/>
-          <p:cNvSpPr>
-            <a:spLocks noGrp="1"/>
-          </p:cNvSpPr>
-          <p:nvPr>
-            <p:ph type="body" sz="half" idx="2"/>
-          </p:nvPr>
-        </p:nvSpPr>
-        <p:spPr>
-          <a:xfrm>
-            <a:off x="839788" y="2057400"/>
-            <a:ext cx="3932237" cy="3811588"/>
-          </a:xfrm>
-        </p:spPr>
-        <p:txBody>
-          <a:bodyPr/>
-          <a:lstStyle>
-            <a:lvl1pPr marL="0" indent="0">
-              <a:buNone/>
-              <a:defRPr sz="1600"/>
-            </a:lvl1pPr>
-            <a:lvl2pPr marL="457200" indent="0">
-              <a:buNone/>
-              <a:defRPr sz="1400"/>
-            </a:lvl2pPr>
-            <a:lvl3pPr marL="914400" indent="0">
-              <a:buNone/>
-              <a:defRPr sz="1200"/>
-            </a:lvl3pPr>
-            <a:lvl4pPr marL="1371600" indent="0">
-              <a:buNone/>
-              <a:defRPr sz="1000"/>
-            </a:lvl4pPr>
-            <a:lvl5pPr marL="1828800" indent="0">
-              <a:buNone/>
-              <a:defRPr sz="1000"/>
-            </a:lvl5pPr>
-            <a:lvl6pPr marL="2286000" indent="0">
-              <a:buNone/>
-              <a:defRPr sz="1000"/>
-            </a:lvl6pPr>
-            <a:lvl7pPr marL="2743200" indent="0">
-              <a:buNone/>
-              <a:defRPr sz="1000"/>
-            </a:lvl7pPr>
-            <a:lvl8pPr marL="3200400" indent="0">
-              <a:buNone/>
-              <a:defRPr sz="1000"/>
-            </a:lvl8pPr>
-            <a:lvl9pPr marL="3657600" indent="0">
-              <a:buNone/>
-              <a:defRPr sz="1000"/>
-            </a:lvl9pPr>
-          </a:lstStyle>
-          <a:p>
-            <a:pPr lvl="0"/>
-            <a:r>
-              <a:rPr lang="en-US" smtClean="0"/>
-              <a:t>Click to edit Master text styles</a:t>
-            </a:r>
-          </a:p>
-        </p:txBody>
-      </p:sp>
-      <p:sp>
-        <p:nvSpPr>
-          <p:cNvPr id="8" name="Date Placeholder 3"/>
+          <p:cNvPr id="5" name="Date Placeholder 3"/>
           <p:cNvSpPr>
             <a:spLocks noGrp="1"/>
           </p:cNvSpPr>
@@ -3114,7 +3292,7 @@
       </p:sp>
       <p:sp>
         <p:nvSpPr>
-          <p:cNvPr id="10" name="Slide Number Placeholder 5"/>
+          <p:cNvPr id="7" name="Slide Number Placeholder 5"/>
           <p:cNvSpPr>
             <a:spLocks noGrp="1"/>
           </p:cNvSpPr>
@@ -3147,7 +3325,7 @@
     </p:spTree>
     <p:extLst>
       <p:ext uri="{BB962C8B-B14F-4D97-AF65-F5344CB8AC3E}">
-        <p14:creationId xmlns:p14="http://schemas.microsoft.com/office/powerpoint/2010/main" val="2139077687"/>
+        <p14:creationId xmlns:p14="http://schemas.microsoft.com/office/powerpoint/2010/main" val="2356020106"/>
       </p:ext>
     </p:extLst>
   </p:cSld>
@@ -3358,11 +3536,12 @@
     <p:sldLayoutId id="2147483653" r:id="rId5"/>
     <p:sldLayoutId id="2147483654" r:id="rId6"/>
     <p:sldLayoutId id="2147483660" r:id="rId7"/>
-    <p:sldLayoutId id="2147483655" r:id="rId8"/>
-    <p:sldLayoutId id="2147483656" r:id="rId9"/>
-    <p:sldLayoutId id="2147483657" r:id="rId10"/>
-    <p:sldLayoutId id="2147483658" r:id="rId11"/>
-    <p:sldLayoutId id="2147483659" r:id="rId12"/>
+    <p:sldLayoutId id="2147483661" r:id="rId8"/>
+    <p:sldLayoutId id="2147483655" r:id="rId9"/>
+    <p:sldLayoutId id="2147483656" r:id="rId10"/>
+    <p:sldLayoutId id="2147483657" r:id="rId11"/>
+    <p:sldLayoutId id="2147483658" r:id="rId12"/>
+    <p:sldLayoutId id="2147483659" r:id="rId13"/>
   </p:sldLayoutIdLst>
   <p:timing>
     <p:tnLst>

</xml_diff>